<commit_message>
Fixed typos in lecture 5
</commit_message>
<xml_diff>
--- a/lectures/pptx/5_Lecture_five.pptx
+++ b/lectures/pptx/5_Lecture_five.pptx
@@ -9719,20 +9719,12 @@
               </a:lnSpc>
             </a:pPr>
             <a:r>
-              <a:rPr lang="en-US" sz="2400" kern="0" smtClean="0">
+              <a:rPr lang="en-US" sz="2400" kern="0" dirty="0" smtClean="0">
                 <a:solidFill>
                   <a:srgbClr val="000000"/>
                 </a:solidFill>
               </a:rPr>
-              <a:t>Lecture </a:t>
-            </a:r>
-            <a:r>
-              <a:rPr lang="en-US" sz="2400" kern="0" smtClean="0">
-                <a:solidFill>
-                  <a:srgbClr val="000000"/>
-                </a:solidFill>
-              </a:rPr>
-              <a:t>five</a:t>
+              <a:t>Lecture five</a:t>
             </a:r>
             <a:r>
               <a:rPr lang="en-US" sz="2400" kern="0" dirty="0">
@@ -9987,7 +9979,7 @@
             <a:effectLst/>
             <a:extLst>
               <a:ext uri="{AF507438-7753-43e0-B8FC-AC1667EBCBE1}">
-                <a14:hiddenEffects xmlns="" xmlns:a14="http://schemas.microsoft.com/office/drawing/2010/main">
+                <a14:hiddenEffects xmlns:a14="http://schemas.microsoft.com/office/drawing/2010/main" xmlns="">
                   <a:effectLst>
                     <a:outerShdw blurRad="63500" dist="38099" dir="2700000" algn="ctr" rotWithShape="0">
                       <a:schemeClr val="bg2">
@@ -10086,7 +10078,7 @@
             <a:effectLst/>
             <a:extLst>
               <a:ext uri="{AF507438-7753-43e0-B8FC-AC1667EBCBE1}">
-                <a14:hiddenEffects xmlns="" xmlns:a14="http://schemas.microsoft.com/office/drawing/2010/main">
+                <a14:hiddenEffects xmlns:a14="http://schemas.microsoft.com/office/drawing/2010/main" xmlns="">
                   <a:effectLst>
                     <a:outerShdw blurRad="63500" dist="38099" dir="2700000" algn="ctr" rotWithShape="0">
                       <a:schemeClr val="bg2">
@@ -10185,7 +10177,7 @@
             <a:effectLst/>
             <a:extLst>
               <a:ext uri="{AF507438-7753-43e0-B8FC-AC1667EBCBE1}">
-                <a14:hiddenEffects xmlns="" xmlns:a14="http://schemas.microsoft.com/office/drawing/2010/main">
+                <a14:hiddenEffects xmlns:a14="http://schemas.microsoft.com/office/drawing/2010/main" xmlns="">
                   <a:effectLst>
                     <a:outerShdw blurRad="63500" dist="38099" dir="2700000" algn="ctr" rotWithShape="0">
                       <a:schemeClr val="bg2">
@@ -10284,7 +10276,7 @@
             <a:effectLst/>
             <a:extLst>
               <a:ext uri="{AF507438-7753-43e0-B8FC-AC1667EBCBE1}">
-                <a14:hiddenEffects xmlns="" xmlns:a14="http://schemas.microsoft.com/office/drawing/2010/main">
+                <a14:hiddenEffects xmlns:a14="http://schemas.microsoft.com/office/drawing/2010/main" xmlns="">
                   <a:effectLst>
                     <a:outerShdw blurRad="63500" dist="38099" dir="2700000" algn="ctr" rotWithShape="0">
                       <a:schemeClr val="bg2">
@@ -10370,7 +10362,7 @@
             <a:effectLst/>
             <a:extLst>
               <a:ext uri="{AF507438-7753-43e0-B8FC-AC1667EBCBE1}">
-                <a14:hiddenEffects xmlns="" xmlns:a14="http://schemas.microsoft.com/office/drawing/2010/main">
+                <a14:hiddenEffects xmlns:a14="http://schemas.microsoft.com/office/drawing/2010/main" xmlns="">
                   <a:effectLst>
                     <a:outerShdw blurRad="63500" dist="38099" dir="2700000" algn="ctr" rotWithShape="0">
                       <a:schemeClr val="bg2">
@@ -10406,7 +10398,7 @@
                 <a:buNone/>
                 <a:tabLst/>
               </a:pPr>
-              <a:endParaRPr kumimoji="0" lang="en-GB" sz="2000" b="0" i="0" u="none" strike="noStrike" cap="none" normalizeH="0" baseline="0">
+              <a:endParaRPr kumimoji="0" lang="en-GB" sz="2000" b="0" i="0" u="none" strike="noStrike" cap="none" normalizeH="0" baseline="0" dirty="0">
                 <a:ln>
                   <a:noFill/>
                 </a:ln>
@@ -10448,7 +10440,7 @@
             <a:effectLst/>
             <a:extLst>
               <a:ext uri="{AF507438-7753-43e0-B8FC-AC1667EBCBE1}">
-                <a14:hiddenEffects xmlns="" xmlns:a14="http://schemas.microsoft.com/office/drawing/2010/main">
+                <a14:hiddenEffects xmlns:a14="http://schemas.microsoft.com/office/drawing/2010/main" xmlns="">
                   <a:effectLst>
                     <a:outerShdw blurRad="63500" dist="38099" dir="2700000" algn="ctr" rotWithShape="0">
                       <a:schemeClr val="bg2">
@@ -10484,7 +10476,7 @@
                 <a:buNone/>
                 <a:tabLst/>
               </a:pPr>
-              <a:endParaRPr kumimoji="0" lang="en-GB" sz="2000" b="0" i="0" u="none" strike="noStrike" cap="none" normalizeH="0" baseline="0">
+              <a:endParaRPr kumimoji="0" lang="en-GB" sz="2000" b="0" i="0" u="none" strike="noStrike" cap="none" normalizeH="0" baseline="0" dirty="0">
                 <a:ln>
                   <a:noFill/>
                 </a:ln>
@@ -10526,7 +10518,7 @@
             <a:effectLst/>
             <a:extLst>
               <a:ext uri="{AF507438-7753-43e0-B8FC-AC1667EBCBE1}">
-                <a14:hiddenEffects xmlns="" xmlns:a14="http://schemas.microsoft.com/office/drawing/2010/main">
+                <a14:hiddenEffects xmlns:a14="http://schemas.microsoft.com/office/drawing/2010/main" xmlns="">
                   <a:effectLst>
                     <a:outerShdw blurRad="63500" dist="38099" dir="2700000" algn="ctr" rotWithShape="0">
                       <a:schemeClr val="bg2">
@@ -10562,7 +10554,7 @@
                 <a:buNone/>
                 <a:tabLst/>
               </a:pPr>
-              <a:endParaRPr kumimoji="0" lang="en-GB" sz="2000" b="0" i="0" u="none" strike="noStrike" cap="none" normalizeH="0" baseline="0">
+              <a:endParaRPr kumimoji="0" lang="en-GB" sz="2000" b="0" i="0" u="none" strike="noStrike" cap="none" normalizeH="0" baseline="0" dirty="0">
                 <a:ln>
                   <a:noFill/>
                 </a:ln>
@@ -10691,7 +10683,7 @@
             <a:p>
               <a:pPr algn="ctr"/>
               <a:r>
-                <a:rPr lang="en-GB" sz="1600" dirty="0" err="1">
+                <a:rPr lang="en-GB" sz="1600" dirty="0">
                   <a:solidFill>
                     <a:srgbClr val="000000"/>
                   </a:solidFill>
@@ -10702,17 +10694,6 @@
                 <a:t>i</a:t>
               </a:r>
               <a:r>
-                <a:rPr lang="en-GB" sz="1600" dirty="0" err="1" smtClean="0">
-                  <a:solidFill>
-                    <a:srgbClr val="000000"/>
-                  </a:solidFill>
-                  <a:latin typeface="Courier New" panose="02070309020205020404" pitchFamily="49" charset="0"/>
-                  <a:ea typeface="ＭＳ Ｐゴシック" charset="0"/>
-                  <a:cs typeface="Courier New" panose="02070309020205020404" pitchFamily="49" charset="0"/>
-                </a:rPr>
-                <a:t>nt</a:t>
-              </a:r>
-              <a:r>
                 <a:rPr lang="en-GB" sz="1600" dirty="0" smtClean="0">
                   <a:solidFill>
                     <a:srgbClr val="000000"/>
@@ -10721,7 +10702,7 @@
                   <a:ea typeface="ＭＳ Ｐゴシック" charset="0"/>
                   <a:cs typeface="Courier New" panose="02070309020205020404" pitchFamily="49" charset="0"/>
                 </a:rPr>
-                <a:t> array[n]</a:t>
+                <a:t>nt array[n]</a:t>
               </a:r>
               <a:endParaRPr lang="en-GB" sz="1600" dirty="0">
                 <a:solidFill>
@@ -11053,7 +11034,7 @@
             <a:effectLst/>
             <a:extLst>
               <a:ext uri="{AF507438-7753-43e0-B8FC-AC1667EBCBE1}">
-                <a14:hiddenEffects xmlns="" xmlns:a14="http://schemas.microsoft.com/office/drawing/2010/main">
+                <a14:hiddenEffects xmlns:a14="http://schemas.microsoft.com/office/drawing/2010/main" xmlns="">
                   <a:effectLst>
                     <a:outerShdw blurRad="63500" dist="38099" dir="2700000" algn="ctr" rotWithShape="0">
                       <a:schemeClr val="bg2">
@@ -11456,7 +11437,7 @@
             <a:effectLst/>
             <a:extLst>
               <a:ext uri="{AF507438-7753-43e0-B8FC-AC1667EBCBE1}">
-                <a14:hiddenEffects xmlns="" xmlns:a14="http://schemas.microsoft.com/office/drawing/2010/main">
+                <a14:hiddenEffects xmlns:a14="http://schemas.microsoft.com/office/drawing/2010/main" xmlns="">
                   <a:effectLst>
                     <a:outerShdw blurRad="63500" dist="38099" dir="2700000" algn="ctr" rotWithShape="0">
                       <a:schemeClr val="bg2">
@@ -11540,7 +11521,7 @@
             <a:effectLst/>
             <a:extLst>
               <a:ext uri="{AF507438-7753-43e0-B8FC-AC1667EBCBE1}">
-                <a14:hiddenEffects xmlns="" xmlns:a14="http://schemas.microsoft.com/office/drawing/2010/main">
+                <a14:hiddenEffects xmlns:a14="http://schemas.microsoft.com/office/drawing/2010/main" xmlns="">
                   <a:effectLst>
                     <a:outerShdw blurRad="63500" dist="38099" dir="2700000" algn="ctr" rotWithShape="0">
                       <a:schemeClr val="bg2">
@@ -11624,7 +11605,7 @@
             <a:effectLst/>
             <a:extLst>
               <a:ext uri="{AF507438-7753-43e0-B8FC-AC1667EBCBE1}">
-                <a14:hiddenEffects xmlns="" xmlns:a14="http://schemas.microsoft.com/office/drawing/2010/main">
+                <a14:hiddenEffects xmlns:a14="http://schemas.microsoft.com/office/drawing/2010/main" xmlns="">
                   <a:effectLst>
                     <a:outerShdw blurRad="63500" dist="38099" dir="2700000" algn="ctr" rotWithShape="0">
                       <a:schemeClr val="bg2">
@@ -11723,7 +11704,7 @@
             <a:effectLst/>
             <a:extLst>
               <a:ext uri="{AF507438-7753-43e0-B8FC-AC1667EBCBE1}">
-                <a14:hiddenEffects xmlns="" xmlns:a14="http://schemas.microsoft.com/office/drawing/2010/main">
+                <a14:hiddenEffects xmlns:a14="http://schemas.microsoft.com/office/drawing/2010/main" xmlns="">
                   <a:effectLst>
                     <a:outerShdw blurRad="63500" dist="38099" dir="2700000" algn="ctr" rotWithShape="0">
                       <a:schemeClr val="bg2">
@@ -11809,7 +11790,7 @@
             <a:effectLst/>
             <a:extLst>
               <a:ext uri="{AF507438-7753-43e0-B8FC-AC1667EBCBE1}">
-                <a14:hiddenEffects xmlns="" xmlns:a14="http://schemas.microsoft.com/office/drawing/2010/main">
+                <a14:hiddenEffects xmlns:a14="http://schemas.microsoft.com/office/drawing/2010/main" xmlns="">
                   <a:effectLst>
                     <a:outerShdw blurRad="63500" dist="38099" dir="2700000" algn="ctr" rotWithShape="0">
                       <a:schemeClr val="bg2">
@@ -11845,7 +11826,7 @@
                 <a:buNone/>
                 <a:tabLst/>
               </a:pPr>
-              <a:endParaRPr kumimoji="0" lang="en-GB" sz="2000" b="0" i="0" u="none" strike="noStrike" cap="none" normalizeH="0" baseline="0">
+              <a:endParaRPr kumimoji="0" lang="en-GB" sz="2000" b="0" i="0" u="none" strike="noStrike" cap="none" normalizeH="0" baseline="0" dirty="0">
                 <a:ln>
                   <a:noFill/>
                 </a:ln>
@@ -11887,7 +11868,7 @@
             <a:effectLst/>
             <a:extLst>
               <a:ext uri="{AF507438-7753-43e0-B8FC-AC1667EBCBE1}">
-                <a14:hiddenEffects xmlns="" xmlns:a14="http://schemas.microsoft.com/office/drawing/2010/main">
+                <a14:hiddenEffects xmlns:a14="http://schemas.microsoft.com/office/drawing/2010/main" xmlns="">
                   <a:effectLst>
                     <a:outerShdw blurRad="63500" dist="38099" dir="2700000" algn="ctr" rotWithShape="0">
                       <a:schemeClr val="bg2">
@@ -11923,7 +11904,7 @@
                 <a:buNone/>
                 <a:tabLst/>
               </a:pPr>
-              <a:endParaRPr kumimoji="0" lang="en-GB" sz="2000" b="0" i="0" u="none" strike="noStrike" cap="none" normalizeH="0" baseline="0">
+              <a:endParaRPr kumimoji="0" lang="en-GB" sz="2000" b="0" i="0" u="none" strike="noStrike" cap="none" normalizeH="0" baseline="0" dirty="0">
                 <a:ln>
                   <a:noFill/>
                 </a:ln>
@@ -11965,7 +11946,7 @@
             <a:effectLst/>
             <a:extLst>
               <a:ext uri="{AF507438-7753-43e0-B8FC-AC1667EBCBE1}">
-                <a14:hiddenEffects xmlns="" xmlns:a14="http://schemas.microsoft.com/office/drawing/2010/main">
+                <a14:hiddenEffects xmlns:a14="http://schemas.microsoft.com/office/drawing/2010/main" xmlns="">
                   <a:effectLst>
                     <a:outerShdw blurRad="63500" dist="38099" dir="2700000" algn="ctr" rotWithShape="0">
                       <a:schemeClr val="bg2">
@@ -12001,7 +11982,7 @@
                 <a:buNone/>
                 <a:tabLst/>
               </a:pPr>
-              <a:endParaRPr kumimoji="0" lang="en-GB" sz="2000" b="0" i="0" u="none" strike="noStrike" cap="none" normalizeH="0" baseline="0">
+              <a:endParaRPr kumimoji="0" lang="en-GB" sz="2000" b="0" i="0" u="none" strike="noStrike" cap="none" normalizeH="0" baseline="0" dirty="0">
                 <a:ln>
                   <a:noFill/>
                 </a:ln>
@@ -12130,7 +12111,7 @@
             <a:p>
               <a:pPr algn="ctr"/>
               <a:r>
-                <a:rPr lang="en-GB" sz="1600" dirty="0" err="1">
+                <a:rPr lang="en-GB" sz="1600" dirty="0">
                   <a:solidFill>
                     <a:srgbClr val="000000"/>
                   </a:solidFill>
@@ -12141,17 +12122,6 @@
                 <a:t>i</a:t>
               </a:r>
               <a:r>
-                <a:rPr lang="en-GB" sz="1600" dirty="0" err="1" smtClean="0">
-                  <a:solidFill>
-                    <a:srgbClr val="000000"/>
-                  </a:solidFill>
-                  <a:latin typeface="Courier New" panose="02070309020205020404" pitchFamily="49" charset="0"/>
-                  <a:ea typeface="ＭＳ Ｐゴシック" charset="0"/>
-                  <a:cs typeface="Courier New" panose="02070309020205020404" pitchFamily="49" charset="0"/>
-                </a:rPr>
-                <a:t>nt</a:t>
-              </a:r>
-              <a:r>
                 <a:rPr lang="en-GB" sz="1600" dirty="0" smtClean="0">
                   <a:solidFill>
                     <a:srgbClr val="000000"/>
@@ -12160,7 +12130,7 @@
                   <a:ea typeface="ＭＳ Ｐゴシック" charset="0"/>
                   <a:cs typeface="Courier New" panose="02070309020205020404" pitchFamily="49" charset="0"/>
                 </a:rPr>
-                <a:t> array[5]</a:t>
+                <a:t>nt array[5]</a:t>
               </a:r>
               <a:endParaRPr lang="en-GB" sz="1600" dirty="0">
                 <a:solidFill>
@@ -12492,7 +12462,7 @@
             <a:effectLst/>
             <a:extLst>
               <a:ext uri="{AF507438-7753-43e0-B8FC-AC1667EBCBE1}">
-                <a14:hiddenEffects xmlns="" xmlns:a14="http://schemas.microsoft.com/office/drawing/2010/main">
+                <a14:hiddenEffects xmlns:a14="http://schemas.microsoft.com/office/drawing/2010/main" xmlns="">
                   <a:effectLst>
                     <a:outerShdw blurRad="63500" dist="38099" dir="2700000" algn="ctr" rotWithShape="0">
                       <a:schemeClr val="bg2">
@@ -12620,7 +12590,7 @@
               <a:t>Next we declare a variable (called </a:t>
             </a:r>
             <a:r>
-              <a:rPr lang="en-GB" sz="1400" dirty="0" err="1" smtClean="0">
+              <a:rPr lang="en-GB" sz="1400" dirty="0" smtClean="0">
                 <a:solidFill>
                   <a:srgbClr val="000000"/>
                 </a:solidFill>
@@ -12728,7 +12698,7 @@
               <a:effectLst/>
               <a:extLst>
                 <a:ext uri="{AF507438-7753-43e0-B8FC-AC1667EBCBE1}">
-                  <a14:hiddenEffects xmlns="" xmlns:a14="http://schemas.microsoft.com/office/drawing/2010/main">
+                  <a14:hiddenEffects xmlns:a14="http://schemas.microsoft.com/office/drawing/2010/main" xmlns="">
                     <a:effectLst>
                       <a:outerShdw blurRad="63500" dist="38099" dir="2700000" algn="ctr" rotWithShape="0">
                         <a:schemeClr val="bg2">
@@ -12812,7 +12782,7 @@
               <a:effectLst/>
               <a:extLst>
                 <a:ext uri="{AF507438-7753-43e0-B8FC-AC1667EBCBE1}">
-                  <a14:hiddenEffects xmlns="" xmlns:a14="http://schemas.microsoft.com/office/drawing/2010/main">
+                  <a14:hiddenEffects xmlns:a14="http://schemas.microsoft.com/office/drawing/2010/main" xmlns="">
                     <a:effectLst>
                       <a:outerShdw blurRad="63500" dist="38099" dir="2700000" algn="ctr" rotWithShape="0">
                         <a:schemeClr val="bg2">
@@ -12911,7 +12881,7 @@
               <a:effectLst/>
               <a:extLst>
                 <a:ext uri="{AF507438-7753-43e0-B8FC-AC1667EBCBE1}">
-                  <a14:hiddenEffects xmlns="" xmlns:a14="http://schemas.microsoft.com/office/drawing/2010/main">
+                  <a14:hiddenEffects xmlns:a14="http://schemas.microsoft.com/office/drawing/2010/main" xmlns="">
                     <a:effectLst>
                       <a:outerShdw blurRad="63500" dist="38099" dir="2700000" algn="ctr" rotWithShape="0">
                         <a:schemeClr val="bg2">
@@ -13010,7 +12980,7 @@
               <a:effectLst/>
               <a:extLst>
                 <a:ext uri="{AF507438-7753-43e0-B8FC-AC1667EBCBE1}">
-                  <a14:hiddenEffects xmlns="" xmlns:a14="http://schemas.microsoft.com/office/drawing/2010/main">
+                  <a14:hiddenEffects xmlns:a14="http://schemas.microsoft.com/office/drawing/2010/main" xmlns="">
                     <a:effectLst>
                       <a:outerShdw blurRad="63500" dist="38099" dir="2700000" algn="ctr" rotWithShape="0">
                         <a:schemeClr val="bg2">
@@ -13096,7 +13066,7 @@
               <a:effectLst/>
               <a:extLst>
                 <a:ext uri="{AF507438-7753-43e0-B8FC-AC1667EBCBE1}">
-                  <a14:hiddenEffects xmlns="" xmlns:a14="http://schemas.microsoft.com/office/drawing/2010/main">
+                  <a14:hiddenEffects xmlns:a14="http://schemas.microsoft.com/office/drawing/2010/main" xmlns="">
                     <a:effectLst>
                       <a:outerShdw blurRad="63500" dist="38099" dir="2700000" algn="ctr" rotWithShape="0">
                         <a:schemeClr val="bg2">
@@ -13132,7 +13102,7 @@
                   <a:buNone/>
                   <a:tabLst/>
                 </a:pPr>
-                <a:endParaRPr kumimoji="0" lang="en-GB" sz="2000" b="0" i="0" u="none" strike="noStrike" cap="none" normalizeH="0" baseline="0">
+                <a:endParaRPr kumimoji="0" lang="en-GB" sz="2000" b="0" i="0" u="none" strike="noStrike" cap="none" normalizeH="0" baseline="0" dirty="0">
                   <a:ln>
                     <a:noFill/>
                   </a:ln>
@@ -13174,7 +13144,7 @@
               <a:effectLst/>
               <a:extLst>
                 <a:ext uri="{AF507438-7753-43e0-B8FC-AC1667EBCBE1}">
-                  <a14:hiddenEffects xmlns="" xmlns:a14="http://schemas.microsoft.com/office/drawing/2010/main">
+                  <a14:hiddenEffects xmlns:a14="http://schemas.microsoft.com/office/drawing/2010/main" xmlns="">
                     <a:effectLst>
                       <a:outerShdw blurRad="63500" dist="38099" dir="2700000" algn="ctr" rotWithShape="0">
                         <a:schemeClr val="bg2">
@@ -13210,7 +13180,7 @@
                   <a:buNone/>
                   <a:tabLst/>
                 </a:pPr>
-                <a:endParaRPr kumimoji="0" lang="en-GB" sz="2000" b="0" i="0" u="none" strike="noStrike" cap="none" normalizeH="0" baseline="0">
+                <a:endParaRPr kumimoji="0" lang="en-GB" sz="2000" b="0" i="0" u="none" strike="noStrike" cap="none" normalizeH="0" baseline="0" dirty="0">
                   <a:ln>
                     <a:noFill/>
                   </a:ln>
@@ -13252,7 +13222,7 @@
               <a:effectLst/>
               <a:extLst>
                 <a:ext uri="{AF507438-7753-43e0-B8FC-AC1667EBCBE1}">
-                  <a14:hiddenEffects xmlns="" xmlns:a14="http://schemas.microsoft.com/office/drawing/2010/main">
+                  <a14:hiddenEffects xmlns:a14="http://schemas.microsoft.com/office/drawing/2010/main" xmlns="">
                     <a:effectLst>
                       <a:outerShdw blurRad="63500" dist="38099" dir="2700000" algn="ctr" rotWithShape="0">
                         <a:schemeClr val="bg2">
@@ -13288,7 +13258,7 @@
                   <a:buNone/>
                   <a:tabLst/>
                 </a:pPr>
-                <a:endParaRPr kumimoji="0" lang="en-GB" sz="2000" b="0" i="0" u="none" strike="noStrike" cap="none" normalizeH="0" baseline="0">
+                <a:endParaRPr kumimoji="0" lang="en-GB" sz="2000" b="0" i="0" u="none" strike="noStrike" cap="none" normalizeH="0" baseline="0" dirty="0">
                   <a:ln>
                     <a:noFill/>
                   </a:ln>
@@ -13417,7 +13387,7 @@
               <a:p>
                 <a:pPr algn="ctr"/>
                 <a:r>
-                  <a:rPr lang="en-GB" sz="1600" dirty="0" err="1">
+                  <a:rPr lang="en-GB" sz="1600" dirty="0">
                     <a:solidFill>
                       <a:srgbClr val="000000"/>
                     </a:solidFill>
@@ -13428,17 +13398,6 @@
                   <a:t>i</a:t>
                 </a:r>
                 <a:r>
-                  <a:rPr lang="en-GB" sz="1600" dirty="0" err="1" smtClean="0">
-                    <a:solidFill>
-                      <a:srgbClr val="000000"/>
-                    </a:solidFill>
-                    <a:latin typeface="Courier New" panose="02070309020205020404" pitchFamily="49" charset="0"/>
-                    <a:ea typeface="ＭＳ Ｐゴシック" charset="0"/>
-                    <a:cs typeface="Courier New" panose="02070309020205020404" pitchFamily="49" charset="0"/>
-                  </a:rPr>
-                  <a:t>nt</a:t>
-                </a:r>
-                <a:r>
                   <a:rPr lang="en-GB" sz="1600" dirty="0" smtClean="0">
                     <a:solidFill>
                       <a:srgbClr val="000000"/>
@@ -13447,7 +13406,7 @@
                     <a:ea typeface="ＭＳ Ｐゴシック" charset="0"/>
                     <a:cs typeface="Courier New" panose="02070309020205020404" pitchFamily="49" charset="0"/>
                   </a:rPr>
-                  <a:t> array[5]</a:t>
+                  <a:t>nt array[5]</a:t>
                 </a:r>
                 <a:endParaRPr lang="en-GB" sz="1600" dirty="0">
                   <a:solidFill>
@@ -13779,7 +13738,7 @@
               <a:effectLst/>
               <a:extLst>
                 <a:ext uri="{AF507438-7753-43e0-B8FC-AC1667EBCBE1}">
-                  <a14:hiddenEffects xmlns="" xmlns:a14="http://schemas.microsoft.com/office/drawing/2010/main">
+                  <a14:hiddenEffects xmlns:a14="http://schemas.microsoft.com/office/drawing/2010/main" xmlns="">
                     <a:effectLst>
                       <a:outerShdw blurRad="63500" dist="38099" dir="2700000" algn="ctr" rotWithShape="0">
                         <a:schemeClr val="bg2">
@@ -13817,7 +13776,7 @@
             <a:p>
               <a:pPr algn="ctr"/>
               <a:r>
-                <a:rPr lang="en-GB" sz="1600" dirty="0" err="1" smtClean="0">
+                <a:rPr lang="en-GB" sz="1600" dirty="0" smtClean="0">
                   <a:solidFill>
                     <a:srgbClr val="000000"/>
                   </a:solidFill>
@@ -13865,7 +13824,7 @@
             <a:effectLst/>
             <a:extLst>
               <a:ext uri="{AF507438-7753-43e0-B8FC-AC1667EBCBE1}">
-                <a14:hiddenEffects xmlns="" xmlns:a14="http://schemas.microsoft.com/office/drawing/2010/main">
+                <a14:hiddenEffects xmlns:a14="http://schemas.microsoft.com/office/drawing/2010/main" xmlns="">
                   <a:effectLst>
                     <a:outerShdw blurRad="63500" dist="38099" dir="2700000" algn="ctr" rotWithShape="0">
                       <a:schemeClr val="bg2">
@@ -13901,7 +13860,7 @@
                 <a:buNone/>
                 <a:tabLst/>
               </a:pPr>
-              <a:endParaRPr kumimoji="0" lang="en-GB" sz="2000" b="0" i="0" u="none" strike="noStrike" cap="none" normalizeH="0" baseline="0">
+              <a:endParaRPr kumimoji="0" lang="en-GB" sz="2000" b="0" i="0" u="none" strike="noStrike" cap="none" normalizeH="0" baseline="0" dirty="0">
                 <a:ln>
                   <a:noFill/>
                 </a:ln>
@@ -14049,7 +14008,7 @@
               <a:t>in the variable </a:t>
             </a:r>
             <a:r>
-              <a:rPr lang="en-GB" sz="1400" dirty="0" err="1" smtClean="0">
+              <a:rPr lang="en-GB" sz="1400" dirty="0" smtClean="0">
                 <a:solidFill>
                   <a:srgbClr val="000000"/>
                 </a:solidFill>
@@ -14059,6 +14018,8 @@
               </a:rPr>
               <a:t>ptr_array</a:t>
             </a:r>
+          </a:p>
+          <a:p>
             <a:endParaRPr lang="en-GB" sz="1400" dirty="0" smtClean="0">
               <a:solidFill>
                 <a:srgbClr val="000000"/>
@@ -14069,16 +14030,6 @@
             </a:endParaRPr>
           </a:p>
           <a:p>
-            <a:endParaRPr lang="en-GB" sz="1400" dirty="0" smtClean="0">
-              <a:solidFill>
-                <a:srgbClr val="000000"/>
-              </a:solidFill>
-              <a:latin typeface="Courier New" panose="02070309020205020404" pitchFamily="49" charset="0"/>
-              <a:ea typeface="ＭＳ Ｐゴシック" charset="0"/>
-              <a:cs typeface="Courier New" panose="02070309020205020404" pitchFamily="49" charset="0"/>
-            </a:endParaRPr>
-          </a:p>
-          <a:p>
             <a:r>
               <a:rPr lang="en-GB" sz="1400" dirty="0" smtClean="0">
                 <a:latin typeface="+mn-lt"/>
@@ -14087,7 +14038,7 @@
               <a:t>Because </a:t>
             </a:r>
             <a:r>
-              <a:rPr lang="en-GB" sz="1400" dirty="0" err="1">
+              <a:rPr lang="en-GB" sz="1400" dirty="0">
                 <a:solidFill>
                   <a:srgbClr val="000000"/>
                 </a:solidFill>
@@ -14098,7 +14049,7 @@
               <a:t>p</a:t>
             </a:r>
             <a:r>
-              <a:rPr lang="en-GB" sz="1400" dirty="0" err="1" smtClean="0">
+              <a:rPr lang="en-GB" sz="1400" dirty="0" smtClean="0">
                 <a:solidFill>
                   <a:srgbClr val="000000"/>
                 </a:solidFill>
@@ -14200,7 +14151,7 @@
               <a:t>Hence </a:t>
             </a:r>
             <a:r>
-              <a:rPr lang="en-GB" sz="1600" b="1" dirty="0" err="1">
+              <a:rPr lang="en-GB" sz="1600" b="1" dirty="0">
                 <a:solidFill>
                   <a:srgbClr val="000000"/>
                 </a:solidFill>
@@ -14322,7 +14273,7 @@
                 <a:effectLst/>
                 <a:extLst>
                   <a:ext uri="{AF507438-7753-43e0-B8FC-AC1667EBCBE1}">
-                    <a14:hiddenEffects xmlns="" xmlns:a14="http://schemas.microsoft.com/office/drawing/2010/main">
+                    <a14:hiddenEffects xmlns:a14="http://schemas.microsoft.com/office/drawing/2010/main" xmlns="">
                       <a:effectLst>
                         <a:outerShdw blurRad="63500" dist="38099" dir="2700000" algn="ctr" rotWithShape="0">
                           <a:schemeClr val="bg2">
@@ -14406,7 +14357,7 @@
                 <a:effectLst/>
                 <a:extLst>
                   <a:ext uri="{AF507438-7753-43e0-B8FC-AC1667EBCBE1}">
-                    <a14:hiddenEffects xmlns="" xmlns:a14="http://schemas.microsoft.com/office/drawing/2010/main">
+                    <a14:hiddenEffects xmlns:a14="http://schemas.microsoft.com/office/drawing/2010/main" xmlns="">
                       <a:effectLst>
                         <a:outerShdw blurRad="63500" dist="38099" dir="2700000" algn="ctr" rotWithShape="0">
                           <a:schemeClr val="bg2">
@@ -14498,7 +14449,7 @@
                 <a:effectLst/>
                 <a:extLst>
                   <a:ext uri="{AF507438-7753-43e0-B8FC-AC1667EBCBE1}">
-                    <a14:hiddenEffects xmlns="" xmlns:a14="http://schemas.microsoft.com/office/drawing/2010/main">
+                    <a14:hiddenEffects xmlns:a14="http://schemas.microsoft.com/office/drawing/2010/main" xmlns="">
                       <a:effectLst>
                         <a:outerShdw blurRad="63500" dist="38099" dir="2700000" algn="ctr" rotWithShape="0">
                           <a:schemeClr val="bg2">
@@ -14597,7 +14548,7 @@
                 <a:effectLst/>
                 <a:extLst>
                   <a:ext uri="{AF507438-7753-43e0-B8FC-AC1667EBCBE1}">
-                    <a14:hiddenEffects xmlns="" xmlns:a14="http://schemas.microsoft.com/office/drawing/2010/main">
+                    <a14:hiddenEffects xmlns:a14="http://schemas.microsoft.com/office/drawing/2010/main" xmlns="">
                       <a:effectLst>
                         <a:outerShdw blurRad="63500" dist="38099" dir="2700000" algn="ctr" rotWithShape="0">
                           <a:schemeClr val="bg2">
@@ -14683,7 +14634,7 @@
                 <a:effectLst/>
                 <a:extLst>
                   <a:ext uri="{AF507438-7753-43e0-B8FC-AC1667EBCBE1}">
-                    <a14:hiddenEffects xmlns="" xmlns:a14="http://schemas.microsoft.com/office/drawing/2010/main">
+                    <a14:hiddenEffects xmlns:a14="http://schemas.microsoft.com/office/drawing/2010/main" xmlns="">
                       <a:effectLst>
                         <a:outerShdw blurRad="63500" dist="38099" dir="2700000" algn="ctr" rotWithShape="0">
                           <a:schemeClr val="bg2">
@@ -14719,7 +14670,7 @@
                     <a:buNone/>
                     <a:tabLst/>
                   </a:pPr>
-                  <a:endParaRPr kumimoji="0" lang="en-GB" sz="2000" b="0" i="0" u="none" strike="noStrike" cap="none" normalizeH="0" baseline="0">
+                  <a:endParaRPr kumimoji="0" lang="en-GB" sz="2000" b="0" i="0" u="none" strike="noStrike" cap="none" normalizeH="0" baseline="0" dirty="0">
                     <a:ln>
                       <a:noFill/>
                     </a:ln>
@@ -14848,7 +14799,7 @@
                 <a:p>
                   <a:pPr algn="ctr"/>
                   <a:r>
-                    <a:rPr lang="en-GB" sz="1600" dirty="0" err="1">
+                    <a:rPr lang="en-GB" sz="1600" dirty="0">
                       <a:solidFill>
                         <a:srgbClr val="000000"/>
                       </a:solidFill>
@@ -14859,17 +14810,6 @@
                     <a:t>i</a:t>
                   </a:r>
                   <a:r>
-                    <a:rPr lang="en-GB" sz="1600" dirty="0" err="1" smtClean="0">
-                      <a:solidFill>
-                        <a:srgbClr val="000000"/>
-                      </a:solidFill>
-                      <a:latin typeface="Courier New" panose="02070309020205020404" pitchFamily="49" charset="0"/>
-                      <a:ea typeface="ＭＳ Ｐゴシック" charset="0"/>
-                      <a:cs typeface="Courier New" panose="02070309020205020404" pitchFamily="49" charset="0"/>
-                    </a:rPr>
-                    <a:t>nt</a:t>
-                  </a:r>
-                  <a:r>
                     <a:rPr lang="en-GB" sz="1600" dirty="0" smtClean="0">
                       <a:solidFill>
                         <a:srgbClr val="000000"/>
@@ -14878,7 +14818,7 @@
                       <a:ea typeface="ＭＳ Ｐゴシック" charset="0"/>
                       <a:cs typeface="Courier New" panose="02070309020205020404" pitchFamily="49" charset="0"/>
                     </a:rPr>
-                    <a:t> array[5]</a:t>
+                    <a:t>nt array[5]</a:t>
                   </a:r>
                   <a:endParaRPr lang="en-GB" sz="1600" dirty="0">
                     <a:solidFill>
@@ -15210,7 +15150,7 @@
                 <a:effectLst/>
                 <a:extLst>
                   <a:ext uri="{AF507438-7753-43e0-B8FC-AC1667EBCBE1}">
-                    <a14:hiddenEffects xmlns="" xmlns:a14="http://schemas.microsoft.com/office/drawing/2010/main">
+                    <a14:hiddenEffects xmlns:a14="http://schemas.microsoft.com/office/drawing/2010/main" xmlns="">
                       <a:effectLst>
                         <a:outerShdw blurRad="63500" dist="38099" dir="2700000" algn="ctr" rotWithShape="0">
                           <a:schemeClr val="bg2">
@@ -15248,7 +15188,7 @@
               <a:p>
                 <a:pPr algn="ctr"/>
                 <a:r>
-                  <a:rPr lang="en-GB" sz="1600" dirty="0" err="1" smtClean="0">
+                  <a:rPr lang="en-GB" sz="1600" dirty="0" smtClean="0">
                     <a:solidFill>
                       <a:srgbClr val="000000"/>
                     </a:solidFill>
@@ -15299,7 +15239,7 @@
             <a:effectLst/>
             <a:extLst>
               <a:ext uri="{AF507438-7753-43e0-B8FC-AC1667EBCBE1}">
-                <a14:hiddenEffects xmlns="" xmlns:a14="http://schemas.microsoft.com/office/drawing/2010/main">
+                <a14:hiddenEffects xmlns:a14="http://schemas.microsoft.com/office/drawing/2010/main" xmlns="">
                   <a:effectLst>
                     <a:outerShdw blurRad="63500" dist="38099" dir="2700000" algn="ctr" rotWithShape="0">
                       <a:schemeClr val="bg2">
@@ -15343,7 +15283,7 @@
             <a:effectLst/>
             <a:extLst>
               <a:ext uri="{AF507438-7753-43e0-B8FC-AC1667EBCBE1}">
-                <a14:hiddenEffects xmlns="" xmlns:a14="http://schemas.microsoft.com/office/drawing/2010/main">
+                <a14:hiddenEffects xmlns:a14="http://schemas.microsoft.com/office/drawing/2010/main" xmlns="">
                   <a:effectLst>
                     <a:outerShdw blurRad="63500" dist="38099" dir="2700000" algn="ctr" rotWithShape="0">
                       <a:schemeClr val="bg2">
@@ -15385,7 +15325,7 @@
             <a:effectLst/>
             <a:extLst>
               <a:ext uri="{AF507438-7753-43e0-B8FC-AC1667EBCBE1}">
-                <a14:hiddenEffects xmlns="" xmlns:a14="http://schemas.microsoft.com/office/drawing/2010/main">
+                <a14:hiddenEffects xmlns:a14="http://schemas.microsoft.com/office/drawing/2010/main" xmlns="">
                   <a:effectLst>
                     <a:outerShdw blurRad="63500" dist="38099" dir="2700000" algn="ctr" rotWithShape="0">
                       <a:schemeClr val="bg2">
@@ -15432,7 +15372,7 @@
             <a:effectLst/>
             <a:extLst>
               <a:ext uri="{AF507438-7753-43e0-B8FC-AC1667EBCBE1}">
-                <a14:hiddenEffects xmlns="" xmlns:a14="http://schemas.microsoft.com/office/drawing/2010/main">
+                <a14:hiddenEffects xmlns:a14="http://schemas.microsoft.com/office/drawing/2010/main" xmlns="">
                   <a:effectLst>
                     <a:outerShdw blurRad="63500" dist="38099" dir="2700000" algn="ctr" rotWithShape="0">
                       <a:schemeClr val="bg2">
@@ -16909,7 +16849,7 @@
             <a:effectLst/>
             <a:extLst>
               <a:ext uri="{AF507438-7753-43e0-B8FC-AC1667EBCBE1}">
-                <a14:hiddenEffects xmlns="" xmlns:a14="http://schemas.microsoft.com/office/drawing/2010/main">
+                <a14:hiddenEffects xmlns:a14="http://schemas.microsoft.com/office/drawing/2010/main" xmlns="">
                   <a:effectLst>
                     <a:outerShdw blurRad="63500" dist="38099" dir="2700000" algn="ctr" rotWithShape="0">
                       <a:schemeClr val="bg2">
@@ -17008,7 +16948,7 @@
             <a:effectLst/>
             <a:extLst>
               <a:ext uri="{AF507438-7753-43e0-B8FC-AC1667EBCBE1}">
-                <a14:hiddenEffects xmlns="" xmlns:a14="http://schemas.microsoft.com/office/drawing/2010/main">
+                <a14:hiddenEffects xmlns:a14="http://schemas.microsoft.com/office/drawing/2010/main" xmlns="">
                   <a:effectLst>
                     <a:outerShdw blurRad="63500" dist="38099" dir="2700000" algn="ctr" rotWithShape="0">
                       <a:schemeClr val="bg2">
@@ -17107,7 +17047,7 @@
             <a:effectLst/>
             <a:extLst>
               <a:ext uri="{AF507438-7753-43e0-B8FC-AC1667EBCBE1}">
-                <a14:hiddenEffects xmlns="" xmlns:a14="http://schemas.microsoft.com/office/drawing/2010/main">
+                <a14:hiddenEffects xmlns:a14="http://schemas.microsoft.com/office/drawing/2010/main" xmlns="">
                   <a:effectLst>
                     <a:outerShdw blurRad="63500" dist="38099" dir="2700000" algn="ctr" rotWithShape="0">
                       <a:schemeClr val="bg2">
@@ -17206,7 +17146,7 @@
             <a:effectLst/>
             <a:extLst>
               <a:ext uri="{AF507438-7753-43e0-B8FC-AC1667EBCBE1}">
-                <a14:hiddenEffects xmlns="" xmlns:a14="http://schemas.microsoft.com/office/drawing/2010/main">
+                <a14:hiddenEffects xmlns:a14="http://schemas.microsoft.com/office/drawing/2010/main" xmlns="">
                   <a:effectLst>
                     <a:outerShdw blurRad="63500" dist="38099" dir="2700000" algn="ctr" rotWithShape="0">
                       <a:schemeClr val="bg2">
@@ -17292,7 +17232,7 @@
             <a:effectLst/>
             <a:extLst>
               <a:ext uri="{AF507438-7753-43e0-B8FC-AC1667EBCBE1}">
-                <a14:hiddenEffects xmlns="" xmlns:a14="http://schemas.microsoft.com/office/drawing/2010/main">
+                <a14:hiddenEffects xmlns:a14="http://schemas.microsoft.com/office/drawing/2010/main" xmlns="">
                   <a:effectLst>
                     <a:outerShdw blurRad="63500" dist="38099" dir="2700000" algn="ctr" rotWithShape="0">
                       <a:schemeClr val="bg2">
@@ -17328,7 +17268,7 @@
                 <a:buNone/>
                 <a:tabLst/>
               </a:pPr>
-              <a:endParaRPr kumimoji="0" lang="en-GB" sz="1200" b="0" i="0" u="none" strike="noStrike" cap="none" normalizeH="0" baseline="0">
+              <a:endParaRPr kumimoji="0" lang="en-GB" sz="1200" b="0" i="0" u="none" strike="noStrike" cap="none" normalizeH="0" baseline="0" dirty="0">
                 <a:ln>
                   <a:noFill/>
                 </a:ln>
@@ -17370,7 +17310,7 @@
             <a:effectLst/>
             <a:extLst>
               <a:ext uri="{AF507438-7753-43e0-B8FC-AC1667EBCBE1}">
-                <a14:hiddenEffects xmlns="" xmlns:a14="http://schemas.microsoft.com/office/drawing/2010/main">
+                <a14:hiddenEffects xmlns:a14="http://schemas.microsoft.com/office/drawing/2010/main" xmlns="">
                   <a:effectLst>
                     <a:outerShdw blurRad="63500" dist="38099" dir="2700000" algn="ctr" rotWithShape="0">
                       <a:schemeClr val="bg2">
@@ -17406,7 +17346,7 @@
                 <a:buNone/>
                 <a:tabLst/>
               </a:pPr>
-              <a:endParaRPr kumimoji="0" lang="en-GB" sz="1200" b="0" i="0" u="none" strike="noStrike" cap="none" normalizeH="0" baseline="0">
+              <a:endParaRPr kumimoji="0" lang="en-GB" sz="1200" b="0" i="0" u="none" strike="noStrike" cap="none" normalizeH="0" baseline="0" dirty="0">
                 <a:ln>
                   <a:noFill/>
                 </a:ln>
@@ -17596,7 +17536,7 @@
             <a:effectLst/>
             <a:extLst>
               <a:ext uri="{AF507438-7753-43e0-B8FC-AC1667EBCBE1}">
-                <a14:hiddenEffects xmlns="" xmlns:a14="http://schemas.microsoft.com/office/drawing/2010/main">
+                <a14:hiddenEffects xmlns:a14="http://schemas.microsoft.com/office/drawing/2010/main" xmlns="">
                   <a:effectLst>
                     <a:outerShdw blurRad="63500" dist="38099" dir="2700000" algn="ctr" rotWithShape="0">
                       <a:schemeClr val="bg2">
@@ -17632,7 +17572,7 @@
                 <a:buNone/>
                 <a:tabLst/>
               </a:pPr>
-              <a:endParaRPr kumimoji="0" lang="en-GB" sz="1200" b="0" i="0" u="none" strike="noStrike" cap="none" normalizeH="0" baseline="0">
+              <a:endParaRPr kumimoji="0" lang="en-GB" sz="1200" b="0" i="0" u="none" strike="noStrike" cap="none" normalizeH="0" baseline="0" dirty="0">
                 <a:ln>
                   <a:noFill/>
                 </a:ln>
@@ -17733,7 +17673,7 @@
             <a:effectLst/>
             <a:extLst>
               <a:ext uri="{AF507438-7753-43e0-B8FC-AC1667EBCBE1}">
-                <a14:hiddenEffects xmlns="" xmlns:a14="http://schemas.microsoft.com/office/drawing/2010/main">
+                <a14:hiddenEffects xmlns:a14="http://schemas.microsoft.com/office/drawing/2010/main" xmlns="">
                   <a:effectLst>
                     <a:outerShdw blurRad="63500" dist="38099" dir="2700000" algn="ctr" rotWithShape="0">
                       <a:schemeClr val="bg2">
@@ -17769,7 +17709,7 @@
                 <a:buNone/>
                 <a:tabLst/>
               </a:pPr>
-              <a:endParaRPr kumimoji="0" lang="en-GB" sz="1200" b="0" i="0" u="none" strike="noStrike" cap="none" normalizeH="0" baseline="0">
+              <a:endParaRPr kumimoji="0" lang="en-GB" sz="1200" b="0" i="0" u="none" strike="noStrike" cap="none" normalizeH="0" baseline="0" dirty="0">
                 <a:ln>
                   <a:noFill/>
                 </a:ln>
@@ -20071,27 +20011,7 @@
                 <a:latin typeface="Arial" panose="020B0604020202020204"/>
                 <a:cs typeface="Courier New" panose="02070309020205020404" pitchFamily="49" charset="0"/>
               </a:rPr>
-              <a:t>The second is the </a:t>
-            </a:r>
-            <a:r>
-              <a:rPr lang="en-GB" sz="1400" dirty="0" err="1" smtClean="0">
-                <a:solidFill>
-                  <a:srgbClr val="C2470C"/>
-                </a:solidFill>
-                <a:latin typeface="Arial" panose="020B0604020202020204"/>
-                <a:cs typeface="Courier New" panose="02070309020205020404" pitchFamily="49" charset="0"/>
-              </a:rPr>
-              <a:t>scanf</a:t>
-            </a:r>
-            <a:r>
-              <a:rPr lang="en-GB" sz="1400" dirty="0" smtClean="0">
-                <a:solidFill>
-                  <a:srgbClr val="C2470C"/>
-                </a:solidFill>
-                <a:latin typeface="Arial" panose="020B0604020202020204"/>
-                <a:cs typeface="Courier New" panose="02070309020205020404" pitchFamily="49" charset="0"/>
-              </a:rPr>
-              <a:t>() function, this requires the programmer to specify the format of the input using conversion specifiers. </a:t>
+              <a:t>The second is the scanf() function, this requires the programmer to specify the format of the input using conversion specifiers. </a:t>
             </a:r>
           </a:p>
           <a:p>
@@ -23614,7 +23534,7 @@
               </a:lnSpc>
             </a:pPr>
             <a:r>
-              <a:rPr lang="en-GB" sz="1400" dirty="0" err="1">
+              <a:rPr lang="en-GB" sz="1400" dirty="0">
                 <a:solidFill>
                   <a:srgbClr val="000000"/>
                 </a:solidFill>
@@ -23624,24 +23544,14 @@
               <a:t>f</a:t>
             </a:r>
             <a:r>
-              <a:rPr lang="en-GB" sz="1400" dirty="0" err="1" smtClean="0">
+              <a:rPr lang="en-GB" sz="1400" dirty="0" smtClean="0">
                 <a:solidFill>
                   <a:srgbClr val="000000"/>
                 </a:solidFill>
                 <a:latin typeface="+mn-lt"/>
                 <a:cs typeface="Courier New" panose="02070309020205020404" pitchFamily="49" charset="0"/>
               </a:rPr>
-              <a:t>open</a:t>
-            </a:r>
-            <a:r>
-              <a:rPr lang="en-GB" sz="1400" dirty="0" smtClean="0">
-                <a:solidFill>
-                  <a:srgbClr val="000000"/>
-                </a:solidFill>
-                <a:latin typeface="+mn-lt"/>
-                <a:cs typeface="Courier New" panose="02070309020205020404" pitchFamily="49" charset="0"/>
-              </a:rPr>
-              <a:t>()</a:t>
+              <a:t>open()</a:t>
             </a:r>
           </a:p>
           <a:p>
@@ -23651,7 +23561,7 @@
               </a:lnSpc>
             </a:pPr>
             <a:r>
-              <a:rPr lang="en-GB" sz="1400" dirty="0" err="1">
+              <a:rPr lang="en-GB" sz="1400" dirty="0">
                 <a:solidFill>
                   <a:srgbClr val="000000"/>
                 </a:solidFill>
@@ -23661,24 +23571,14 @@
               <a:t>f</a:t>
             </a:r>
             <a:r>
-              <a:rPr lang="en-GB" sz="1400" dirty="0" err="1" smtClean="0">
+              <a:rPr lang="en-GB" sz="1400" dirty="0" smtClean="0">
                 <a:solidFill>
                   <a:srgbClr val="000000"/>
                 </a:solidFill>
                 <a:latin typeface="+mn-lt"/>
                 <a:cs typeface="Courier New" panose="02070309020205020404" pitchFamily="49" charset="0"/>
               </a:rPr>
-              <a:t>close</a:t>
-            </a:r>
-            <a:r>
-              <a:rPr lang="en-GB" sz="1400" dirty="0" smtClean="0">
-                <a:solidFill>
-                  <a:srgbClr val="000000"/>
-                </a:solidFill>
-                <a:latin typeface="+mn-lt"/>
-                <a:cs typeface="Courier New" panose="02070309020205020404" pitchFamily="49" charset="0"/>
-              </a:rPr>
-              <a:t>()</a:t>
+              <a:t>close()</a:t>
             </a:r>
           </a:p>
           <a:p>
@@ -23688,7 +23588,7 @@
               </a:lnSpc>
             </a:pPr>
             <a:r>
-              <a:rPr lang="en-GB" sz="1400" dirty="0" err="1">
+              <a:rPr lang="en-GB" sz="1400" dirty="0">
                 <a:solidFill>
                   <a:srgbClr val="000000"/>
                 </a:solidFill>
@@ -23698,24 +23598,14 @@
               <a:t>f</a:t>
             </a:r>
             <a:r>
-              <a:rPr lang="en-GB" sz="1400" dirty="0" err="1" smtClean="0">
+              <a:rPr lang="en-GB" sz="1400" dirty="0" smtClean="0">
                 <a:solidFill>
                   <a:srgbClr val="000000"/>
                 </a:solidFill>
                 <a:latin typeface="+mn-lt"/>
                 <a:cs typeface="Courier New" panose="02070309020205020404" pitchFamily="49" charset="0"/>
               </a:rPr>
-              <a:t>printf</a:t>
-            </a:r>
-            <a:r>
-              <a:rPr lang="en-GB" sz="1400" dirty="0" smtClean="0">
-                <a:solidFill>
-                  <a:srgbClr val="000000"/>
-                </a:solidFill>
-                <a:latin typeface="+mn-lt"/>
-                <a:cs typeface="Courier New" panose="02070309020205020404" pitchFamily="49" charset="0"/>
-              </a:rPr>
-              <a:t>()</a:t>
+              <a:t>printf()</a:t>
             </a:r>
           </a:p>
           <a:p>
@@ -23725,7 +23615,7 @@
               </a:lnSpc>
             </a:pPr>
             <a:r>
-              <a:rPr lang="en-GB" sz="1400" dirty="0" err="1">
+              <a:rPr lang="en-GB" sz="1400" dirty="0">
                 <a:solidFill>
                   <a:srgbClr val="000000"/>
                 </a:solidFill>
@@ -23735,24 +23625,14 @@
               <a:t>f</a:t>
             </a:r>
             <a:r>
-              <a:rPr lang="en-GB" sz="1400" dirty="0" err="1" smtClean="0">
+              <a:rPr lang="en-GB" sz="1400" dirty="0" smtClean="0">
                 <a:solidFill>
                   <a:srgbClr val="000000"/>
                 </a:solidFill>
                 <a:latin typeface="+mn-lt"/>
                 <a:cs typeface="Courier New" panose="02070309020205020404" pitchFamily="49" charset="0"/>
               </a:rPr>
-              <a:t>scanf</a:t>
-            </a:r>
-            <a:r>
-              <a:rPr lang="en-GB" sz="1400" dirty="0" smtClean="0">
-                <a:solidFill>
-                  <a:srgbClr val="000000"/>
-                </a:solidFill>
-                <a:latin typeface="+mn-lt"/>
-                <a:cs typeface="Courier New" panose="02070309020205020404" pitchFamily="49" charset="0"/>
-              </a:rPr>
-              <a:t>()</a:t>
+              <a:t>scanf()</a:t>
             </a:r>
           </a:p>
         </p:txBody>
@@ -23957,34 +23837,7 @@
                 </a:solidFill>
                 <a:latin typeface="Arial" panose="020B0604020202020204" pitchFamily="34" charset="0"/>
               </a:rPr>
-              <a:t>Using files – </a:t>
-            </a:r>
-            <a:r>
-              <a:rPr lang="en-GB" b="1" dirty="0" err="1" smtClean="0">
-                <a:solidFill>
-                  <a:schemeClr val="bg1"/>
-                </a:solidFill>
-                <a:latin typeface="Arial" panose="020B0604020202020204" pitchFamily="34" charset="0"/>
-              </a:rPr>
-              <a:t>fopen</a:t>
-            </a:r>
-            <a:r>
-              <a:rPr lang="en-GB" b="1" dirty="0" smtClean="0">
-                <a:solidFill>
-                  <a:schemeClr val="bg1"/>
-                </a:solidFill>
-                <a:latin typeface="Arial" panose="020B0604020202020204" pitchFamily="34" charset="0"/>
-              </a:rPr>
-              <a:t> and </a:t>
-            </a:r>
-            <a:r>
-              <a:rPr lang="en-GB" b="1" dirty="0" err="1" smtClean="0">
-                <a:solidFill>
-                  <a:schemeClr val="bg1"/>
-                </a:solidFill>
-                <a:latin typeface="Arial" panose="020B0604020202020204" pitchFamily="34" charset="0"/>
-              </a:rPr>
-              <a:t>fclose</a:t>
+              <a:t>Using files – fopen and fclose</a:t>
             </a:r>
             <a:endParaRPr lang="en-GB" b="1" dirty="0">
               <a:solidFill>
@@ -24118,54 +23971,24 @@
               <a:t>We then use </a:t>
             </a:r>
             <a:r>
-              <a:rPr lang="en-GB" sz="1400" dirty="0" err="1" smtClean="0">
+              <a:rPr lang="en-GB" sz="1400" dirty="0" smtClean="0">
                 <a:solidFill>
                   <a:srgbClr val="000000"/>
                 </a:solidFill>
                 <a:latin typeface="Courier New" panose="02070309020205020404" pitchFamily="49" charset="0"/>
                 <a:cs typeface="Courier New" panose="02070309020205020404" pitchFamily="49" charset="0"/>
               </a:rPr>
-              <a:t>fopen</a:t>
+              <a:t>fopen() </a:t>
             </a:r>
             <a:r>
               <a:rPr lang="en-GB" sz="1400" dirty="0" smtClean="0">
                 <a:solidFill>
-                  <a:srgbClr val="000000"/>
-                </a:solidFill>
-                <a:latin typeface="Courier New" panose="02070309020205020404" pitchFamily="49" charset="0"/>
-                <a:cs typeface="Courier New" panose="02070309020205020404" pitchFamily="49" charset="0"/>
-              </a:rPr>
-              <a:t>() </a:t>
-            </a:r>
-            <a:r>
-              <a:rPr lang="en-GB" sz="1400" dirty="0" smtClean="0">
-                <a:solidFill>
                   <a:srgbClr val="C2470C"/>
                 </a:solidFill>
                 <a:latin typeface="Arial" panose="020B0604020202020204"/>
                 <a:cs typeface="Courier New" panose="02070309020205020404" pitchFamily="49" charset="0"/>
               </a:rPr>
-              <a:t>to try and open the requested file. If the file opens successfully then the pointer </a:t>
-            </a:r>
-            <a:r>
-              <a:rPr lang="en-GB" sz="1400" dirty="0" err="1" smtClean="0">
-                <a:solidFill>
-                  <a:srgbClr val="C2470C"/>
-                </a:solidFill>
-                <a:latin typeface="Arial" panose="020B0604020202020204"/>
-                <a:cs typeface="Courier New" panose="02070309020205020404" pitchFamily="49" charset="0"/>
-              </a:rPr>
-              <a:t>fp</a:t>
-            </a:r>
-            <a:r>
-              <a:rPr lang="en-GB" sz="1400" dirty="0" smtClean="0">
-                <a:solidFill>
-                  <a:srgbClr val="C2470C"/>
-                </a:solidFill>
-                <a:latin typeface="Arial" panose="020B0604020202020204"/>
-                <a:cs typeface="Courier New" panose="02070309020205020404" pitchFamily="49" charset="0"/>
-              </a:rPr>
-              <a:t> is initialised. If not the pointer is set to NULL and we print an error. </a:t>
+              <a:t>to try and open the requested file. If the file opens successfully then the pointer fp is initialised. If not the pointer is set to NULL and we print an error. </a:t>
             </a:r>
           </a:p>
           <a:p>
@@ -24191,24 +24014,14 @@
               <a:t>Finally we close the file using the </a:t>
             </a:r>
             <a:r>
-              <a:rPr lang="en-GB" sz="1400" dirty="0" err="1" smtClean="0">
+              <a:rPr lang="en-GB" sz="1400" dirty="0" smtClean="0">
                 <a:solidFill>
                   <a:srgbClr val="000000"/>
                 </a:solidFill>
                 <a:latin typeface="Courier New" panose="02070309020205020404" pitchFamily="49" charset="0"/>
                 <a:cs typeface="Courier New" panose="02070309020205020404" pitchFamily="49" charset="0"/>
               </a:rPr>
-              <a:t>fclose</a:t>
-            </a:r>
-            <a:r>
-              <a:rPr lang="en-GB" sz="1400" dirty="0" smtClean="0">
-                <a:solidFill>
-                  <a:srgbClr val="000000"/>
-                </a:solidFill>
-                <a:latin typeface="Courier New" panose="02070309020205020404" pitchFamily="49" charset="0"/>
-                <a:cs typeface="Courier New" panose="02070309020205020404" pitchFamily="49" charset="0"/>
-              </a:rPr>
-              <a:t>() </a:t>
+              <a:t>fclose() </a:t>
             </a:r>
             <a:r>
               <a:rPr lang="en-GB" sz="1400" dirty="0" smtClean="0">
@@ -24677,34 +24490,7 @@
                 </a:solidFill>
                 <a:latin typeface="Arial" panose="020B0604020202020204" pitchFamily="34" charset="0"/>
               </a:rPr>
-              <a:t>Using files – </a:t>
-            </a:r>
-            <a:r>
-              <a:rPr lang="en-GB" b="1" dirty="0" err="1" smtClean="0">
-                <a:solidFill>
-                  <a:schemeClr val="bg1"/>
-                </a:solidFill>
-                <a:latin typeface="Arial" panose="020B0604020202020204" pitchFamily="34" charset="0"/>
-              </a:rPr>
-              <a:t>fopen</a:t>
-            </a:r>
-            <a:r>
-              <a:rPr lang="en-GB" b="1" dirty="0" smtClean="0">
-                <a:solidFill>
-                  <a:schemeClr val="bg1"/>
-                </a:solidFill>
-                <a:latin typeface="Arial" panose="020B0604020202020204" pitchFamily="34" charset="0"/>
-              </a:rPr>
-              <a:t> and </a:t>
-            </a:r>
-            <a:r>
-              <a:rPr lang="en-GB" b="1" dirty="0" err="1" smtClean="0">
-                <a:solidFill>
-                  <a:schemeClr val="bg1"/>
-                </a:solidFill>
-                <a:latin typeface="Arial" panose="020B0604020202020204" pitchFamily="34" charset="0"/>
-              </a:rPr>
-              <a:t>fclose</a:t>
+              <a:t>Using files – fopen and fclose</a:t>
             </a:r>
             <a:endParaRPr lang="en-GB" b="1" dirty="0">
               <a:solidFill>
@@ -24782,24 +24568,14 @@
               <a:t>The table on the right outlines different modes and the and the associated return value of </a:t>
             </a:r>
             <a:r>
-              <a:rPr lang="en-GB" sz="1400" dirty="0" err="1" smtClean="0">
+              <a:rPr lang="en-GB" sz="1400" dirty="0" smtClean="0">
                 <a:solidFill>
                   <a:srgbClr val="000000"/>
                 </a:solidFill>
                 <a:latin typeface="Courier New" panose="02070309020205020404" pitchFamily="49" charset="0"/>
                 <a:cs typeface="Courier New" panose="02070309020205020404" pitchFamily="49" charset="0"/>
               </a:rPr>
-              <a:t>fopen</a:t>
-            </a:r>
-            <a:r>
-              <a:rPr lang="en-GB" sz="1400" dirty="0" smtClean="0">
-                <a:solidFill>
-                  <a:srgbClr val="000000"/>
-                </a:solidFill>
-                <a:latin typeface="Courier New" panose="02070309020205020404" pitchFamily="49" charset="0"/>
-                <a:cs typeface="Courier New" panose="02070309020205020404" pitchFamily="49" charset="0"/>
-              </a:rPr>
-              <a:t>()</a:t>
+              <a:t>fopen()</a:t>
             </a:r>
           </a:p>
         </p:txBody>
@@ -24961,19 +24737,7 @@
                         <a:rPr lang="en-GB" sz="1400" b="1" dirty="0" smtClean="0">
                           <a:effectLst/>
                         </a:rPr>
-                        <a:t>Return value from </a:t>
-                      </a:r>
-                      <a:r>
-                        <a:rPr lang="en-GB" sz="1400" b="1" dirty="0" err="1" smtClean="0">
-                          <a:effectLst/>
-                        </a:rPr>
-                        <a:t>fopen</a:t>
-                      </a:r>
-                      <a:r>
-                        <a:rPr lang="en-GB" sz="1400" b="1" dirty="0" smtClean="0">
-                          <a:effectLst/>
-                        </a:rPr>
-                        <a:t> if</a:t>
+                        <a:t>Return value from fopen if</a:t>
                       </a:r>
                       <a:r>
                         <a:rPr lang="en-GB" sz="1400" b="1" dirty="0">
@@ -25192,7 +24956,7 @@
                     <a:lstStyle/>
                     <a:p>
                       <a:r>
-                        <a:rPr lang="en-GB" sz="1400">
+                        <a:rPr lang="en-GB" sz="1400" dirty="0">
                           <a:effectLst/>
                         </a:rPr>
                         <a:t>r</a:t>
@@ -25247,7 +25011,7 @@
                     <a:lstStyle/>
                     <a:p>
                       <a:r>
-                        <a:rPr lang="en-GB" sz="1400">
+                        <a:rPr lang="en-GB" sz="1400" dirty="0">
                           <a:effectLst/>
                         </a:rPr>
                         <a:t>Reading</a:t>
@@ -25357,7 +25121,7 @@
                     <a:lstStyle/>
                     <a:p>
                       <a:r>
-                        <a:rPr lang="en-GB" sz="1400">
+                        <a:rPr lang="en-GB" sz="1400" dirty="0">
                           <a:effectLst/>
                         </a:rPr>
                         <a:t>NULL</a:t>
@@ -25414,7 +25178,7 @@
                     <a:lstStyle/>
                     <a:p>
                       <a:r>
-                        <a:rPr lang="en-GB" sz="1400">
+                        <a:rPr lang="en-GB" sz="1400" dirty="0">
                           <a:effectLst/>
                         </a:rPr>
                         <a:t>w</a:t>
@@ -25469,7 +25233,7 @@
                     <a:lstStyle/>
                     <a:p>
                       <a:r>
-                        <a:rPr lang="en-GB" sz="1400">
+                        <a:rPr lang="en-GB" sz="1400" dirty="0">
                           <a:effectLst/>
                         </a:rPr>
                         <a:t>Writing</a:t>
@@ -25660,7 +25424,7 @@
                     <a:lstStyle/>
                     <a:p>
                       <a:r>
-                        <a:rPr lang="en-GB" sz="1400">
+                        <a:rPr lang="en-GB" sz="1400" dirty="0">
                           <a:effectLst/>
                         </a:rPr>
                         <a:t>a</a:t>
@@ -25715,7 +25479,7 @@
                     <a:lstStyle/>
                     <a:p>
                       <a:r>
-                        <a:rPr lang="en-GB" sz="1400">
+                        <a:rPr lang="en-GB" sz="1400" dirty="0">
                           <a:effectLst/>
                         </a:rPr>
                         <a:t>Append</a:t>
@@ -25908,7 +25672,7 @@
                     <a:lstStyle/>
                     <a:p>
                       <a:r>
-                        <a:rPr lang="en-GB" sz="1400">
+                        <a:rPr lang="en-GB" sz="1400" dirty="0">
                           <a:effectLst/>
                         </a:rPr>
                         <a:t>r+</a:t>
@@ -25963,7 +25727,7 @@
                     <a:lstStyle/>
                     <a:p>
                       <a:r>
-                        <a:rPr lang="en-GB" sz="1400">
+                        <a:rPr lang="en-GB" sz="1400" dirty="0">
                           <a:effectLst/>
                         </a:rPr>
                         <a:t>Reading + Writing</a:t>
@@ -26151,7 +25915,7 @@
                     <a:lstStyle/>
                     <a:p>
                       <a:r>
-                        <a:rPr lang="en-GB" sz="1400">
+                        <a:rPr lang="en-GB" sz="1400" dirty="0">
                           <a:effectLst/>
                         </a:rPr>
                         <a:t>w+</a:t>
@@ -26206,7 +25970,7 @@
                     <a:lstStyle/>
                     <a:p>
                       <a:r>
-                        <a:rPr lang="en-GB" sz="1400">
+                        <a:rPr lang="en-GB" sz="1400" dirty="0">
                           <a:effectLst/>
                         </a:rPr>
                         <a:t>Reading + Writing</a:t>
@@ -26411,7 +26175,7 @@
                     <a:lstStyle/>
                     <a:p>
                       <a:r>
-                        <a:rPr lang="en-GB" sz="1400">
+                        <a:rPr lang="en-GB" sz="1400" dirty="0">
                           <a:effectLst/>
                         </a:rPr>
                         <a:t>a+</a:t>
@@ -26466,7 +26230,7 @@
                     <a:lstStyle/>
                     <a:p>
                       <a:r>
-                        <a:rPr lang="en-GB" sz="1400">
+                        <a:rPr lang="en-GB" sz="1400" dirty="0">
                           <a:effectLst/>
                         </a:rPr>
                         <a:t>Reading + Appending</a:t>
@@ -26861,23 +26625,23 @@
               <a:t>Arrays can be </a:t>
             </a:r>
             <a:r>
-              <a:rPr lang="en-GB" sz="1400" dirty="0" err="1" smtClean="0">
-                <a:latin typeface="+mn-lt"/>
-                <a:cs typeface="Courier New" panose="02070309020205020404" pitchFamily="49" charset="0"/>
-              </a:rPr>
-              <a:t>initilaised</a:t>
-            </a:r>
-            <a:r>
               <a:rPr lang="en-GB" sz="1400" dirty="0" smtClean="0">
                 <a:latin typeface="+mn-lt"/>
                 <a:cs typeface="Courier New" panose="02070309020205020404" pitchFamily="49" charset="0"/>
               </a:rPr>
-              <a:t> using braces: </a:t>
-            </a:r>
-          </a:p>
-          <a:p>
+              <a:t>initialised </a:t>
+            </a:r>
             <a:r>
               <a:rPr lang="en-GB" sz="1400" dirty="0" smtClean="0">
+                <a:latin typeface="+mn-lt"/>
+                <a:cs typeface="Courier New" panose="02070309020205020404" pitchFamily="49" charset="0"/>
+              </a:rPr>
+              <a:t>using braces: </a:t>
+            </a:r>
+          </a:p>
+          <a:p>
+            <a:r>
+              <a:rPr lang="en-GB" sz="1400" dirty="0" smtClean="0">
                 <a:solidFill>
                   <a:srgbClr val="000000"/>
                 </a:solidFill>
@@ -26891,7 +26655,7 @@
           <a:p>
             <a:pPr algn="ctr"/>
             <a:r>
-              <a:rPr lang="en-GB" sz="1400" dirty="0" err="1" smtClean="0">
+              <a:rPr lang="en-GB" sz="1400" dirty="0" smtClean="0">
                 <a:solidFill>
                   <a:srgbClr val="000000"/>
                 </a:solidFill>
@@ -26899,18 +26663,7 @@
                 <a:ea typeface="ＭＳ Ｐゴシック" charset="0"/>
                 <a:cs typeface="Courier New" panose="02070309020205020404" pitchFamily="49" charset="0"/>
               </a:rPr>
-              <a:t>int</a:t>
-            </a:r>
-            <a:r>
-              <a:rPr lang="en-GB" sz="1400" dirty="0" smtClean="0">
-                <a:solidFill>
-                  <a:srgbClr val="000000"/>
-                </a:solidFill>
-                <a:latin typeface="Courier New" panose="02070309020205020404" pitchFamily="49" charset="0"/>
-                <a:ea typeface="ＭＳ Ｐゴシック" charset="0"/>
-                <a:cs typeface="Courier New" panose="02070309020205020404" pitchFamily="49" charset="0"/>
-              </a:rPr>
-              <a:t> array[3] = {1,3,5};</a:t>
+              <a:t>int array[3] = {1,3,5};</a:t>
             </a:r>
             <a:endParaRPr lang="en-GB" sz="1400" dirty="0">
               <a:solidFill>
@@ -27227,34 +26980,7 @@
                 </a:solidFill>
                 <a:latin typeface="Arial" panose="020B0604020202020204" pitchFamily="34" charset="0"/>
               </a:rPr>
-              <a:t>Using files – </a:t>
-            </a:r>
-            <a:r>
-              <a:rPr lang="en-GB" b="1" dirty="0" err="1" smtClean="0">
-                <a:solidFill>
-                  <a:schemeClr val="bg1"/>
-                </a:solidFill>
-                <a:latin typeface="Arial" panose="020B0604020202020204" pitchFamily="34" charset="0"/>
-              </a:rPr>
-              <a:t>fprintf</a:t>
-            </a:r>
-            <a:r>
-              <a:rPr lang="en-GB" b="1" dirty="0" smtClean="0">
-                <a:solidFill>
-                  <a:schemeClr val="bg1"/>
-                </a:solidFill>
-                <a:latin typeface="Arial" panose="020B0604020202020204" pitchFamily="34" charset="0"/>
-              </a:rPr>
-              <a:t> and </a:t>
-            </a:r>
-            <a:r>
-              <a:rPr lang="en-GB" b="1" dirty="0" err="1" smtClean="0">
-                <a:solidFill>
-                  <a:schemeClr val="bg1"/>
-                </a:solidFill>
-                <a:latin typeface="Arial" panose="020B0604020202020204" pitchFamily="34" charset="0"/>
-              </a:rPr>
-              <a:t>fscanf</a:t>
+              <a:t>Using files – fprintf and fscanf</a:t>
             </a:r>
             <a:endParaRPr lang="en-GB" b="1" dirty="0">
               <a:solidFill>
@@ -27299,24 +27025,14 @@
               <a:t>The code on the right gives examples of using the </a:t>
             </a:r>
             <a:r>
-              <a:rPr lang="en-GB" sz="1400" dirty="0" err="1" smtClean="0">
+              <a:rPr lang="en-GB" sz="1400" dirty="0" smtClean="0">
                 <a:solidFill>
                   <a:srgbClr val="000000"/>
                 </a:solidFill>
                 <a:latin typeface="Courier New" panose="02070309020205020404" pitchFamily="49" charset="0"/>
                 <a:cs typeface="Courier New" panose="02070309020205020404" pitchFamily="49" charset="0"/>
               </a:rPr>
-              <a:t>fprintf</a:t>
-            </a:r>
-            <a:r>
-              <a:rPr lang="en-GB" sz="1400" dirty="0" smtClean="0">
-                <a:solidFill>
-                  <a:srgbClr val="000000"/>
-                </a:solidFill>
-                <a:latin typeface="Courier New" panose="02070309020205020404" pitchFamily="49" charset="0"/>
-                <a:cs typeface="Courier New" panose="02070309020205020404" pitchFamily="49" charset="0"/>
-              </a:rPr>
-              <a:t>()</a:t>
+              <a:t>fprintf()</a:t>
             </a:r>
             <a:r>
               <a:rPr lang="en-GB" sz="1400" dirty="0" smtClean="0">
@@ -27333,27 +27049,7 @@
                 <a:latin typeface="Courier New" panose="02070309020205020404" pitchFamily="49" charset="0"/>
                 <a:cs typeface="Courier New" panose="02070309020205020404" pitchFamily="49" charset="0"/>
               </a:rPr>
-              <a:t> </a:t>
-            </a:r>
-            <a:r>
-              <a:rPr lang="en-GB" sz="1400" dirty="0" err="1" smtClean="0">
-                <a:solidFill>
-                  <a:srgbClr val="000000"/>
-                </a:solidFill>
-                <a:latin typeface="Courier New" panose="02070309020205020404" pitchFamily="49" charset="0"/>
-                <a:cs typeface="Courier New" panose="02070309020205020404" pitchFamily="49" charset="0"/>
-              </a:rPr>
-              <a:t>fscanf</a:t>
-            </a:r>
-            <a:r>
-              <a:rPr lang="en-GB" sz="1400" dirty="0" smtClean="0">
-                <a:solidFill>
-                  <a:srgbClr val="000000"/>
-                </a:solidFill>
-                <a:latin typeface="Courier New" panose="02070309020205020404" pitchFamily="49" charset="0"/>
-                <a:cs typeface="Courier New" panose="02070309020205020404" pitchFamily="49" charset="0"/>
-              </a:rPr>
-              <a:t>() </a:t>
+              <a:t> fscanf() </a:t>
             </a:r>
             <a:r>
               <a:rPr lang="en-GB" sz="1400" dirty="0" smtClean="0">
@@ -27380,24 +27076,14 @@
               <a:t>We open a file as before (note the bad coding practice, the code fails silently if </a:t>
             </a:r>
             <a:r>
-              <a:rPr lang="en-GB" sz="1400" dirty="0" err="1" smtClean="0">
+              <a:rPr lang="en-GB" sz="1400" dirty="0" smtClean="0">
                 <a:solidFill>
                   <a:srgbClr val="000000"/>
                 </a:solidFill>
                 <a:latin typeface="Courier New" panose="02070309020205020404" pitchFamily="49" charset="0"/>
                 <a:cs typeface="Courier New" panose="02070309020205020404" pitchFamily="49" charset="0"/>
               </a:rPr>
-              <a:t>fopen</a:t>
-            </a:r>
-            <a:r>
-              <a:rPr lang="en-GB" sz="1400" dirty="0" smtClean="0">
-                <a:solidFill>
-                  <a:srgbClr val="000000"/>
-                </a:solidFill>
-                <a:latin typeface="Courier New" panose="02070309020205020404" pitchFamily="49" charset="0"/>
-                <a:cs typeface="Courier New" panose="02070309020205020404" pitchFamily="49" charset="0"/>
-              </a:rPr>
-              <a:t>()</a:t>
+              <a:t>fopen()</a:t>
             </a:r>
             <a:r>
               <a:rPr lang="en-GB" sz="1400" dirty="0" smtClean="0">
@@ -27424,7 +27110,7 @@
               <a:t>We use </a:t>
             </a:r>
             <a:r>
-              <a:rPr lang="en-GB" sz="1400" dirty="0" err="1">
+              <a:rPr lang="en-GB" sz="1400" dirty="0">
                 <a:solidFill>
                   <a:srgbClr val="000000"/>
                 </a:solidFill>
@@ -27464,64 +27150,44 @@
               <a:t>to print 10 numbers and their squares to a file. Note how </a:t>
             </a:r>
             <a:r>
-              <a:rPr lang="en-GB" sz="1400" dirty="0" err="1">
+              <a:rPr lang="en-GB" sz="1400" dirty="0">
                 <a:solidFill>
                   <a:srgbClr val="000000"/>
                 </a:solidFill>
                 <a:latin typeface="Courier New" panose="02070309020205020404" pitchFamily="49" charset="0"/>
                 <a:cs typeface="Courier New" panose="02070309020205020404" pitchFamily="49" charset="0"/>
               </a:rPr>
-              <a:t>fprintf</a:t>
+              <a:t>fprintf()</a:t>
             </a:r>
             <a:r>
               <a:rPr lang="en-GB" sz="1400" dirty="0">
                 <a:solidFill>
+                  <a:srgbClr val="C2470C"/>
+                </a:solidFill>
+                <a:latin typeface="Arial" panose="020B0604020202020204"/>
+                <a:cs typeface="Courier New" panose="02070309020205020404" pitchFamily="49" charset="0"/>
+              </a:rPr>
+              <a:t> </a:t>
+            </a:r>
+            <a:r>
+              <a:rPr lang="en-GB" sz="1400" dirty="0" smtClean="0">
+                <a:solidFill>
+                  <a:srgbClr val="C2470C"/>
+                </a:solidFill>
+                <a:latin typeface="Arial" panose="020B0604020202020204"/>
+                <a:cs typeface="Courier New" panose="02070309020205020404" pitchFamily="49" charset="0"/>
+              </a:rPr>
+              <a:t>works like </a:t>
+            </a:r>
+            <a:r>
+              <a:rPr lang="en-GB" sz="1400" dirty="0" smtClean="0">
+                <a:solidFill>
                   <a:srgbClr val="000000"/>
                 </a:solidFill>
                 <a:latin typeface="Courier New" panose="02070309020205020404" pitchFamily="49" charset="0"/>
                 <a:cs typeface="Courier New" panose="02070309020205020404" pitchFamily="49" charset="0"/>
               </a:rPr>
-              <a:t>()</a:t>
-            </a:r>
-            <a:r>
-              <a:rPr lang="en-GB" sz="1400" dirty="0">
-                <a:solidFill>
-                  <a:srgbClr val="C2470C"/>
-                </a:solidFill>
-                <a:latin typeface="Arial" panose="020B0604020202020204"/>
-                <a:cs typeface="Courier New" panose="02070309020205020404" pitchFamily="49" charset="0"/>
-              </a:rPr>
-              <a:t> </a:t>
-            </a:r>
-            <a:r>
-              <a:rPr lang="en-GB" sz="1400" dirty="0" smtClean="0">
-                <a:solidFill>
-                  <a:srgbClr val="C2470C"/>
-                </a:solidFill>
-                <a:latin typeface="Arial" panose="020B0604020202020204"/>
-                <a:cs typeface="Courier New" panose="02070309020205020404" pitchFamily="49" charset="0"/>
-              </a:rPr>
-              <a:t>works like </a:t>
-            </a:r>
-            <a:r>
-              <a:rPr lang="en-GB" sz="1400" dirty="0" err="1" smtClean="0">
-                <a:solidFill>
-                  <a:srgbClr val="000000"/>
-                </a:solidFill>
-                <a:latin typeface="Courier New" panose="02070309020205020404" pitchFamily="49" charset="0"/>
-                <a:cs typeface="Courier New" panose="02070309020205020404" pitchFamily="49" charset="0"/>
-              </a:rPr>
-              <a:t>printf</a:t>
-            </a:r>
-            <a:r>
-              <a:rPr lang="en-GB" sz="1400" dirty="0" smtClean="0">
-                <a:solidFill>
-                  <a:srgbClr val="000000"/>
-                </a:solidFill>
-                <a:latin typeface="Courier New" panose="02070309020205020404" pitchFamily="49" charset="0"/>
-                <a:cs typeface="Courier New" panose="02070309020205020404" pitchFamily="49" charset="0"/>
-              </a:rPr>
-              <a:t>()</a:t>
+              <a:t>printf()</a:t>
             </a:r>
             <a:endParaRPr lang="en-GB" sz="1400" dirty="0">
               <a:solidFill>
@@ -27577,24 +27243,14 @@
               <a:t>We then use </a:t>
             </a:r>
             <a:r>
-              <a:rPr lang="en-GB" sz="1400" dirty="0" err="1" smtClean="0">
+              <a:rPr lang="en-GB" sz="1400" dirty="0" smtClean="0">
                 <a:solidFill>
                   <a:srgbClr val="000000"/>
                 </a:solidFill>
                 <a:latin typeface="Courier New" panose="02070309020205020404" pitchFamily="49" charset="0"/>
                 <a:cs typeface="Courier New" panose="02070309020205020404" pitchFamily="49" charset="0"/>
               </a:rPr>
-              <a:t>fscanf</a:t>
-            </a:r>
-            <a:r>
-              <a:rPr lang="en-GB" sz="1400" dirty="0" smtClean="0">
-                <a:solidFill>
-                  <a:srgbClr val="000000"/>
-                </a:solidFill>
-                <a:latin typeface="Courier New" panose="02070309020205020404" pitchFamily="49" charset="0"/>
-                <a:cs typeface="Courier New" panose="02070309020205020404" pitchFamily="49" charset="0"/>
-              </a:rPr>
-              <a:t>() </a:t>
+              <a:t>fscanf() </a:t>
             </a:r>
             <a:r>
               <a:rPr lang="en-GB" sz="1400" dirty="0" smtClean="0">
@@ -28634,7 +28290,27 @@
                 <a:latin typeface="Arial" panose="020B0604020202020204"/>
                 <a:cs typeface="Courier New" panose="02070309020205020404" pitchFamily="49" charset="0"/>
               </a:rPr>
-              <a:t>Lets return to our example code from Lecture two. We can modify this code so that is askes the user how many areas they want to calculate and then dynamically allocates memory for them.</a:t>
+              <a:t>Lets return to our example code from Lecture two. We can modify this code so that is </a:t>
+            </a:r>
+            <a:r>
+              <a:rPr lang="en-GB" sz="1400" dirty="0" smtClean="0">
+                <a:solidFill>
+                  <a:srgbClr val="C2470C"/>
+                </a:solidFill>
+                <a:latin typeface="Arial" panose="020B0604020202020204"/>
+                <a:cs typeface="Courier New" panose="02070309020205020404" pitchFamily="49" charset="0"/>
+              </a:rPr>
+              <a:t>asks </a:t>
+            </a:r>
+            <a:r>
+              <a:rPr lang="en-GB" sz="1400" dirty="0" smtClean="0">
+                <a:solidFill>
+                  <a:srgbClr val="C2470C"/>
+                </a:solidFill>
+                <a:latin typeface="Arial" panose="020B0604020202020204"/>
+                <a:cs typeface="Courier New" panose="02070309020205020404" pitchFamily="49" charset="0"/>
+              </a:rPr>
+              <a:t>the user how many areas they want to calculate and then dynamically allocates memory for them.</a:t>
             </a:r>
           </a:p>
           <a:p>
@@ -28725,24 +28401,14 @@
               <a:t>We then use </a:t>
             </a:r>
             <a:r>
-              <a:rPr lang="en-GB" sz="1400" dirty="0" err="1" smtClean="0">
+              <a:rPr lang="en-GB" sz="1400" dirty="0" smtClean="0">
                 <a:solidFill>
                   <a:srgbClr val="000000"/>
                 </a:solidFill>
                 <a:latin typeface="Courier New" panose="02070309020205020404" pitchFamily="49" charset="0"/>
                 <a:cs typeface="Courier New" panose="02070309020205020404" pitchFamily="49" charset="0"/>
               </a:rPr>
-              <a:t>scanf</a:t>
-            </a:r>
-            <a:r>
-              <a:rPr lang="en-GB" sz="1400" dirty="0" smtClean="0">
-                <a:solidFill>
-                  <a:srgbClr val="000000"/>
-                </a:solidFill>
-                <a:latin typeface="Courier New" panose="02070309020205020404" pitchFamily="49" charset="0"/>
-                <a:cs typeface="Courier New" panose="02070309020205020404" pitchFamily="49" charset="0"/>
-              </a:rPr>
-              <a:t>() </a:t>
+              <a:t>scanf() </a:t>
             </a:r>
             <a:r>
               <a:rPr lang="en-GB" sz="1400" dirty="0" smtClean="0">
@@ -28778,24 +28444,14 @@
               <a:t>We then use </a:t>
             </a:r>
             <a:r>
-              <a:rPr lang="en-GB" sz="1400" dirty="0" err="1" smtClean="0">
+              <a:rPr lang="en-GB" sz="1400" dirty="0" smtClean="0">
                 <a:solidFill>
                   <a:srgbClr val="000000"/>
                 </a:solidFill>
                 <a:latin typeface="Courier New" panose="02070309020205020404" pitchFamily="49" charset="0"/>
                 <a:cs typeface="Courier New" panose="02070309020205020404" pitchFamily="49" charset="0"/>
               </a:rPr>
-              <a:t>malloc</a:t>
-            </a:r>
-            <a:r>
-              <a:rPr lang="en-GB" sz="1400" dirty="0" smtClean="0">
-                <a:solidFill>
-                  <a:srgbClr val="000000"/>
-                </a:solidFill>
-                <a:latin typeface="Courier New" panose="02070309020205020404" pitchFamily="49" charset="0"/>
-                <a:cs typeface="Courier New" panose="02070309020205020404" pitchFamily="49" charset="0"/>
-              </a:rPr>
-              <a:t>()</a:t>
+              <a:t>malloc()</a:t>
             </a:r>
             <a:r>
               <a:rPr lang="en-GB" sz="1400" dirty="0" smtClean="0">
@@ -28831,7 +28487,7 @@
               <a:t>After this we use </a:t>
             </a:r>
             <a:r>
-              <a:rPr lang="en-GB" sz="1400" dirty="0" err="1">
+              <a:rPr lang="en-GB" sz="1400" dirty="0">
                 <a:solidFill>
                   <a:srgbClr val="000000"/>
                 </a:solidFill>
@@ -28875,7 +28531,7 @@
               <a:t>This time we accumulate directly to </a:t>
             </a:r>
             <a:r>
-              <a:rPr lang="en-GB" sz="1400" dirty="0" err="1" smtClean="0">
+              <a:rPr lang="en-GB" sz="1400" dirty="0" smtClean="0">
                 <a:solidFill>
                   <a:srgbClr val="000000"/>
                 </a:solidFill>
@@ -28884,13 +28540,6 @@
               </a:rPr>
               <a:t>total_area</a:t>
             </a:r>
-            <a:endParaRPr lang="en-GB" sz="1400" dirty="0" smtClean="0">
-              <a:solidFill>
-                <a:srgbClr val="000000"/>
-              </a:solidFill>
-              <a:latin typeface="Courier New" panose="02070309020205020404" pitchFamily="49" charset="0"/>
-              <a:cs typeface="Courier New" panose="02070309020205020404" pitchFamily="49" charset="0"/>
-            </a:endParaRPr>
           </a:p>
           <a:p>
             <a:pPr lvl="0"/>
@@ -29482,10 +29131,8 @@
                 <a:ea typeface="SimSun" panose="02010600030101010101" pitchFamily="2" charset="-122"/>
                 <a:cs typeface="Courier New" panose="02070309020205020404" pitchFamily="49" charset="0"/>
               </a:rPr>
-              <a:t>    free(area);</a:t>
-            </a:r>
-          </a:p>
-          <a:p>
+              <a:t>    return(0</a:t>
+            </a:r>
             <a:r>
               <a:rPr lang="pt-BR" sz="950" dirty="0" smtClean="0">
                 <a:solidFill>
@@ -29495,7 +29142,7 @@
                 <a:ea typeface="SimSun" panose="02010600030101010101" pitchFamily="2" charset="-122"/>
                 <a:cs typeface="Courier New" panose="02070309020205020404" pitchFamily="49" charset="0"/>
               </a:rPr>
-              <a:t>    return(0);</a:t>
+              <a:t>);</a:t>
             </a:r>
             <a:endParaRPr lang="pt-BR" sz="950" dirty="0">
               <a:solidFill>
@@ -29713,25 +29360,7 @@
                 </a:solidFill>
                 <a:latin typeface="Arial" panose="020B0604020202020204" pitchFamily="34" charset="0"/>
               </a:rPr>
-              <a:t>Working with memory – </a:t>
-            </a:r>
-            <a:r>
-              <a:rPr lang="en-GB" b="1" dirty="0" err="1" smtClean="0">
-                <a:solidFill>
-                  <a:schemeClr val="bg1"/>
-                </a:solidFill>
-                <a:latin typeface="Arial" panose="020B0604020202020204" pitchFamily="34" charset="0"/>
-              </a:rPr>
-              <a:t>malloc</a:t>
-            </a:r>
-            <a:r>
-              <a:rPr lang="en-GB" b="1" dirty="0" smtClean="0">
-                <a:solidFill>
-                  <a:schemeClr val="bg1"/>
-                </a:solidFill>
-                <a:latin typeface="Arial" panose="020B0604020202020204" pitchFamily="34" charset="0"/>
-              </a:rPr>
-              <a:t>()</a:t>
+              <a:t>Working with memory – malloc()</a:t>
             </a:r>
             <a:endParaRPr lang="en-GB" b="1" dirty="0">
               <a:solidFill>
@@ -29776,24 +29405,14 @@
               <a:t>Lets take a closer look at </a:t>
             </a:r>
             <a:r>
-              <a:rPr lang="en-GB" sz="1400" dirty="0" err="1" smtClean="0">
+              <a:rPr lang="en-GB" sz="1400" dirty="0" smtClean="0">
                 <a:solidFill>
                   <a:srgbClr val="000000"/>
                 </a:solidFill>
                 <a:latin typeface="Courier New" panose="02070309020205020404" pitchFamily="49" charset="0"/>
                 <a:cs typeface="Courier New" panose="02070309020205020404" pitchFamily="49" charset="0"/>
               </a:rPr>
-              <a:t>malloc</a:t>
-            </a:r>
-            <a:r>
-              <a:rPr lang="en-GB" sz="1400" dirty="0" smtClean="0">
-                <a:solidFill>
-                  <a:srgbClr val="000000"/>
-                </a:solidFill>
-                <a:latin typeface="Courier New" panose="02070309020205020404" pitchFamily="49" charset="0"/>
-                <a:cs typeface="Courier New" panose="02070309020205020404" pitchFamily="49" charset="0"/>
-              </a:rPr>
-              <a:t>()</a:t>
+              <a:t>malloc()</a:t>
             </a:r>
           </a:p>
           <a:p>
@@ -29818,7 +29437,7 @@
               <a:t>Both </a:t>
             </a:r>
             <a:r>
-              <a:rPr lang="en-GB" sz="1400" dirty="0" err="1">
+              <a:rPr lang="en-GB" sz="1400" dirty="0">
                 <a:solidFill>
                   <a:srgbClr val="000000"/>
                 </a:solidFill>
@@ -29868,7 +29487,7 @@
               <a:t> are defined in </a:t>
             </a:r>
             <a:r>
-              <a:rPr lang="en-GB" sz="1400" dirty="0" err="1" smtClean="0">
+              <a:rPr lang="en-GB" sz="1400" dirty="0" smtClean="0">
                 <a:solidFill>
                   <a:srgbClr val="000000"/>
                 </a:solidFill>
@@ -29911,24 +29530,14 @@
               <a:t>The function prototype for </a:t>
             </a:r>
             <a:r>
-              <a:rPr lang="en-GB" sz="1400" dirty="0" err="1" smtClean="0">
+              <a:rPr lang="en-GB" sz="1400" dirty="0" smtClean="0">
                 <a:solidFill>
                   <a:srgbClr val="000000"/>
                 </a:solidFill>
                 <a:latin typeface="Courier New" panose="02070309020205020404" pitchFamily="49" charset="0"/>
                 <a:cs typeface="Courier New" panose="02070309020205020404" pitchFamily="49" charset="0"/>
               </a:rPr>
-              <a:t>malloc</a:t>
-            </a:r>
-            <a:r>
-              <a:rPr lang="en-GB" sz="1400" dirty="0" smtClean="0">
-                <a:solidFill>
-                  <a:srgbClr val="000000"/>
-                </a:solidFill>
-                <a:latin typeface="Courier New" panose="02070309020205020404" pitchFamily="49" charset="0"/>
-                <a:cs typeface="Courier New" panose="02070309020205020404" pitchFamily="49" charset="0"/>
-              </a:rPr>
-              <a:t>() </a:t>
+              <a:t>malloc() </a:t>
             </a:r>
             <a:r>
               <a:rPr lang="en-GB" sz="1400" dirty="0" smtClean="0">
@@ -29971,67 +29580,7 @@
                 <a:latin typeface="Courier New" panose="02070309020205020404" pitchFamily="49" charset="0"/>
                 <a:cs typeface="Courier New" panose="02070309020205020404" pitchFamily="49" charset="0"/>
               </a:rPr>
-              <a:t>oid *</a:t>
-            </a:r>
-            <a:r>
-              <a:rPr lang="en-GB" sz="1400" dirty="0" err="1" smtClean="0">
-                <a:solidFill>
-                  <a:srgbClr val="000000"/>
-                </a:solidFill>
-                <a:latin typeface="Courier New" panose="02070309020205020404" pitchFamily="49" charset="0"/>
-                <a:cs typeface="Courier New" panose="02070309020205020404" pitchFamily="49" charset="0"/>
-              </a:rPr>
-              <a:t>malloc</a:t>
-            </a:r>
-            <a:r>
-              <a:rPr lang="en-GB" sz="1400" dirty="0" smtClean="0">
-                <a:solidFill>
-                  <a:srgbClr val="000000"/>
-                </a:solidFill>
-                <a:latin typeface="Courier New" panose="02070309020205020404" pitchFamily="49" charset="0"/>
-                <a:cs typeface="Courier New" panose="02070309020205020404" pitchFamily="49" charset="0"/>
-              </a:rPr>
-              <a:t>(</a:t>
-            </a:r>
-            <a:r>
-              <a:rPr lang="en-GB" sz="1400" dirty="0" err="1" smtClean="0">
-                <a:solidFill>
-                  <a:srgbClr val="000000"/>
-                </a:solidFill>
-                <a:latin typeface="Courier New" panose="02070309020205020404" pitchFamily="49" charset="0"/>
-                <a:cs typeface="Courier New" panose="02070309020205020404" pitchFamily="49" charset="0"/>
-              </a:rPr>
-              <a:t>size_t</a:t>
-            </a:r>
-            <a:r>
-              <a:rPr lang="en-GB" sz="1400" dirty="0" smtClean="0">
-                <a:solidFill>
-                  <a:srgbClr val="000000"/>
-                </a:solidFill>
-                <a:latin typeface="Courier New" panose="02070309020205020404" pitchFamily="49" charset="0"/>
-                <a:cs typeface="Courier New" panose="02070309020205020404" pitchFamily="49" charset="0"/>
-              </a:rPr>
-              <a:t> </a:t>
-            </a:r>
-            <a:r>
-              <a:rPr lang="en-GB" sz="1400" dirty="0" err="1" smtClean="0">
-                <a:solidFill>
-                  <a:srgbClr val="000000"/>
-                </a:solidFill>
-                <a:latin typeface="Courier New" panose="02070309020205020404" pitchFamily="49" charset="0"/>
-                <a:cs typeface="Courier New" panose="02070309020205020404" pitchFamily="49" charset="0"/>
-              </a:rPr>
-              <a:t>num</a:t>
-            </a:r>
-            <a:r>
-              <a:rPr lang="en-GB" sz="1400" dirty="0" smtClean="0">
-                <a:solidFill>
-                  <a:srgbClr val="000000"/>
-                </a:solidFill>
-                <a:latin typeface="Courier New" panose="02070309020205020404" pitchFamily="49" charset="0"/>
-                <a:cs typeface="Courier New" panose="02070309020205020404" pitchFamily="49" charset="0"/>
-              </a:rPr>
-              <a:t>);</a:t>
+              <a:t>oid *malloc(size_t num);</a:t>
             </a:r>
           </a:p>
           <a:p>
@@ -30047,7 +29596,7 @@
           <a:p>
             <a:pPr lvl="0"/>
             <a:r>
-              <a:rPr lang="en-GB" sz="1400" dirty="0" err="1" smtClean="0">
+              <a:rPr lang="en-GB" sz="1400" dirty="0" smtClean="0">
                 <a:solidFill>
                   <a:srgbClr val="000000"/>
                 </a:solidFill>
@@ -30067,52 +29616,35 @@
               <a:t> is an unsigned integral type and is used to represent the size of an object in bytes. The return type of the </a:t>
             </a:r>
             <a:r>
-              <a:rPr lang="en-GB" sz="1400" dirty="0" err="1" smtClean="0">
+              <a:rPr lang="en-GB" sz="1400" dirty="0" smtClean="0">
                 <a:solidFill>
                   <a:srgbClr val="000000"/>
                 </a:solidFill>
                 <a:latin typeface="Courier New" panose="02070309020205020404" pitchFamily="49" charset="0"/>
                 <a:cs typeface="Courier New" panose="02070309020205020404" pitchFamily="49" charset="0"/>
               </a:rPr>
-              <a:t>sizeof</a:t>
+              <a:t>sizeof() </a:t>
             </a:r>
             <a:r>
               <a:rPr lang="en-GB" sz="1400" dirty="0" smtClean="0">
                 <a:solidFill>
+                  <a:srgbClr val="C2470C"/>
+                </a:solidFill>
+                <a:latin typeface="Arial" panose="020B0604020202020204"/>
+                <a:cs typeface="Courier New" panose="02070309020205020404" pitchFamily="49" charset="0"/>
+              </a:rPr>
+              <a:t>operator is </a:t>
+            </a:r>
+            <a:r>
+              <a:rPr lang="en-GB" sz="1400" dirty="0" smtClean="0">
+                <a:solidFill>
                   <a:srgbClr val="000000"/>
                 </a:solidFill>
                 <a:latin typeface="Courier New" panose="02070309020205020404" pitchFamily="49" charset="0"/>
                 <a:cs typeface="Courier New" panose="02070309020205020404" pitchFamily="49" charset="0"/>
               </a:rPr>
-              <a:t>() </a:t>
-            </a:r>
-            <a:r>
-              <a:rPr lang="en-GB" sz="1400" dirty="0" smtClean="0">
-                <a:solidFill>
-                  <a:srgbClr val="C2470C"/>
-                </a:solidFill>
-                <a:latin typeface="Arial" panose="020B0604020202020204"/>
-                <a:cs typeface="Courier New" panose="02070309020205020404" pitchFamily="49" charset="0"/>
-              </a:rPr>
-              <a:t>operator is </a:t>
-            </a:r>
-            <a:r>
-              <a:rPr lang="en-GB" sz="1400" dirty="0" err="1" smtClean="0">
-                <a:solidFill>
-                  <a:srgbClr val="000000"/>
-                </a:solidFill>
-                <a:latin typeface="Courier New" panose="02070309020205020404" pitchFamily="49" charset="0"/>
-                <a:cs typeface="Courier New" panose="02070309020205020404" pitchFamily="49" charset="0"/>
-              </a:rPr>
               <a:t>size_t</a:t>
             </a:r>
-            <a:endParaRPr lang="en-GB" sz="1400" dirty="0" smtClean="0">
-              <a:solidFill>
-                <a:srgbClr val="000000"/>
-              </a:solidFill>
-              <a:latin typeface="Courier New" panose="02070309020205020404" pitchFamily="49" charset="0"/>
-              <a:cs typeface="Courier New" panose="02070309020205020404" pitchFamily="49" charset="0"/>
-            </a:endParaRPr>
           </a:p>
           <a:p>
             <a:pPr lvl="0"/>
@@ -30127,37 +29659,27 @@
           <a:p>
             <a:pPr lvl="0"/>
             <a:r>
-              <a:rPr lang="en-GB" sz="1400" dirty="0" err="1" smtClean="0">
+              <a:rPr lang="en-GB" sz="1400" dirty="0" smtClean="0">
                 <a:solidFill>
                   <a:srgbClr val="000000"/>
                 </a:solidFill>
                 <a:latin typeface="Courier New" panose="02070309020205020404" pitchFamily="49" charset="0"/>
                 <a:cs typeface="Courier New" panose="02070309020205020404" pitchFamily="49" charset="0"/>
               </a:rPr>
-              <a:t>malloc</a:t>
+              <a:t>malloc() </a:t>
             </a:r>
             <a:r>
               <a:rPr lang="en-GB" sz="1400" dirty="0" smtClean="0">
                 <a:solidFill>
-                  <a:srgbClr val="000000"/>
-                </a:solidFill>
-                <a:latin typeface="Courier New" panose="02070309020205020404" pitchFamily="49" charset="0"/>
-                <a:cs typeface="Courier New" panose="02070309020205020404" pitchFamily="49" charset="0"/>
-              </a:rPr>
-              <a:t>() </a:t>
+                  <a:srgbClr val="C2470C"/>
+                </a:solidFill>
+                <a:latin typeface="Arial" panose="020B0604020202020204"/>
+                <a:cs typeface="Courier New" panose="02070309020205020404" pitchFamily="49" charset="0"/>
+              </a:rPr>
+              <a:t>will return NULL if </a:t>
             </a:r>
             <a:r>
               <a:rPr lang="en-GB" sz="1400" dirty="0" smtClean="0">
-                <a:solidFill>
-                  <a:srgbClr val="C2470C"/>
-                </a:solidFill>
-                <a:latin typeface="Arial" panose="020B0604020202020204"/>
-                <a:cs typeface="Courier New" panose="02070309020205020404" pitchFamily="49" charset="0"/>
-              </a:rPr>
-              <a:t>will return NULL if </a:t>
-            </a:r>
-            <a:r>
-              <a:rPr lang="en-GB" sz="1400" dirty="0" err="1" smtClean="0">
                 <a:solidFill>
                   <a:srgbClr val="000000"/>
                 </a:solidFill>
@@ -30202,7 +29724,7 @@
           <a:lstStyle/>
           <a:p>
             <a:r>
-              <a:rPr lang="en-GB" sz="5400" dirty="0" err="1" smtClean="0">
+              <a:rPr lang="en-GB" sz="5400" dirty="0" smtClean="0">
                 <a:solidFill>
                   <a:srgbClr val="FF0000"/>
                 </a:solidFill>
@@ -30211,22 +29733,13 @@
               <a:t>m</a:t>
             </a:r>
             <a:r>
-              <a:rPr lang="en-GB" sz="5400" dirty="0" err="1" smtClean="0">
+              <a:rPr lang="en-GB" sz="5400" dirty="0" smtClean="0">
                 <a:solidFill>
                   <a:srgbClr val="00B050"/>
                 </a:solidFill>
                 <a:latin typeface="+mn-lt"/>
               </a:rPr>
-              <a:t>alloc</a:t>
-            </a:r>
-            <a:r>
-              <a:rPr lang="en-GB" sz="5400" dirty="0" smtClean="0">
-                <a:solidFill>
-                  <a:srgbClr val="00B050"/>
-                </a:solidFill>
-                <a:latin typeface="+mn-lt"/>
-              </a:rPr>
-              <a:t>(size)</a:t>
+              <a:t>alloc(size)</a:t>
             </a:r>
             <a:endParaRPr lang="en-GB" sz="5400" dirty="0">
               <a:solidFill>
@@ -30264,7 +29777,7 @@
           <a:effectLst/>
           <a:extLst>
             <a:ext uri="{AF507438-7753-43e0-B8FC-AC1667EBCBE1}">
-              <a14:hiddenEffects xmlns="" xmlns:a14="http://schemas.microsoft.com/office/drawing/2010/main">
+              <a14:hiddenEffects xmlns:a14="http://schemas.microsoft.com/office/drawing/2010/main" xmlns="">
                 <a:effectLst>
                   <a:outerShdw blurRad="63500" dist="38099" dir="2700000" algn="ctr" rotWithShape="0">
                     <a:schemeClr val="bg2">
@@ -30300,7 +29813,7 @@
               <a:buNone/>
               <a:tabLst/>
             </a:pPr>
-            <a:endParaRPr kumimoji="0" lang="en-GB" sz="2400" b="0" i="0" u="none" strike="noStrike" cap="none" normalizeH="0" baseline="0">
+            <a:endParaRPr kumimoji="0" lang="en-GB" sz="2400" b="0" i="0" u="none" strike="noStrike" cap="none" normalizeH="0" baseline="0" dirty="0">
               <a:ln>
                 <a:noFill/>
               </a:ln>
@@ -30341,7 +29854,7 @@
           <a:effectLst/>
           <a:extLst>
             <a:ext uri="{AF507438-7753-43e0-B8FC-AC1667EBCBE1}">
-              <a14:hiddenEffects xmlns="" xmlns:a14="http://schemas.microsoft.com/office/drawing/2010/main">
+              <a14:hiddenEffects xmlns:a14="http://schemas.microsoft.com/office/drawing/2010/main" xmlns="">
                 <a:effectLst>
                   <a:outerShdw blurRad="63500" dist="38099" dir="2700000" algn="ctr" rotWithShape="0">
                     <a:schemeClr val="bg2">
@@ -30377,7 +29890,7 @@
               <a:buNone/>
               <a:tabLst/>
             </a:pPr>
-            <a:endParaRPr kumimoji="0" lang="en-GB" sz="2400" b="0" i="0" u="none" strike="noStrike" cap="none" normalizeH="0" baseline="0">
+            <a:endParaRPr kumimoji="0" lang="en-GB" sz="2400" b="0" i="0" u="none" strike="noStrike" cap="none" normalizeH="0" baseline="0" dirty="0">
               <a:ln>
                 <a:noFill/>
               </a:ln>
@@ -30575,24 +30088,14 @@
               <a:t>Once we’ve finished working with the memory that we’ve allocated using </a:t>
             </a:r>
             <a:r>
-              <a:rPr lang="en-GB" sz="1400" dirty="0" err="1" smtClean="0">
+              <a:rPr lang="en-GB" sz="1400" dirty="0" smtClean="0">
                 <a:solidFill>
                   <a:srgbClr val="000000"/>
                 </a:solidFill>
                 <a:latin typeface="Courier New" panose="02070309020205020404" pitchFamily="49" charset="0"/>
                 <a:cs typeface="Courier New" panose="02070309020205020404" pitchFamily="49" charset="0"/>
               </a:rPr>
-              <a:t>malloc</a:t>
-            </a:r>
-            <a:r>
-              <a:rPr lang="en-GB" sz="1400" dirty="0" smtClean="0">
-                <a:solidFill>
-                  <a:srgbClr val="000000"/>
-                </a:solidFill>
-                <a:latin typeface="Courier New" panose="02070309020205020404" pitchFamily="49" charset="0"/>
-                <a:cs typeface="Courier New" panose="02070309020205020404" pitchFamily="49" charset="0"/>
-              </a:rPr>
-              <a:t>() </a:t>
+              <a:t>malloc() </a:t>
             </a:r>
             <a:r>
               <a:rPr lang="en-GB" sz="1400" dirty="0" smtClean="0">
@@ -30674,27 +30177,7 @@
                 <a:latin typeface="Courier New" panose="02070309020205020404" pitchFamily="49" charset="0"/>
                 <a:cs typeface="Courier New" panose="02070309020205020404" pitchFamily="49" charset="0"/>
               </a:rPr>
-              <a:t>oid free(void *</a:t>
-            </a:r>
-            <a:r>
-              <a:rPr lang="en-GB" sz="1400" dirty="0" err="1" smtClean="0">
-                <a:solidFill>
-                  <a:srgbClr val="000000"/>
-                </a:solidFill>
-                <a:latin typeface="Courier New" panose="02070309020205020404" pitchFamily="49" charset="0"/>
-                <a:cs typeface="Courier New" panose="02070309020205020404" pitchFamily="49" charset="0"/>
-              </a:rPr>
-              <a:t>ptr</a:t>
-            </a:r>
-            <a:r>
-              <a:rPr lang="en-GB" sz="1400" dirty="0" smtClean="0">
-                <a:solidFill>
-                  <a:srgbClr val="000000"/>
-                </a:solidFill>
-                <a:latin typeface="Courier New" panose="02070309020205020404" pitchFamily="49" charset="0"/>
-                <a:cs typeface="Courier New" panose="02070309020205020404" pitchFamily="49" charset="0"/>
-              </a:rPr>
-              <a:t>);</a:t>
+              <a:t>oid free(void *ptr);</a:t>
             </a:r>
           </a:p>
           <a:p>
@@ -30740,7 +30223,7 @@
               <a:t>releases the memory that is pointed to by </a:t>
             </a:r>
             <a:r>
-              <a:rPr lang="en-GB" sz="1400" dirty="0" err="1" smtClean="0">
+              <a:rPr lang="en-GB" sz="1400" dirty="0" smtClean="0">
                 <a:solidFill>
                   <a:srgbClr val="000000"/>
                 </a:solidFill>
@@ -30986,7 +30469,7 @@
           </a:p>
           <a:p>
             <a:r>
-              <a:rPr lang="en-GB" sz="1400" dirty="0" err="1">
+              <a:rPr lang="en-GB" sz="1400" dirty="0">
                 <a:solidFill>
                   <a:srgbClr val="000000"/>
                 </a:solidFill>
@@ -30994,18 +30477,7 @@
                 <a:ea typeface="ＭＳ Ｐゴシック" charset="0"/>
                 <a:cs typeface="Courier New" panose="02070309020205020404" pitchFamily="49" charset="0"/>
               </a:rPr>
-              <a:t>int</a:t>
-            </a:r>
-            <a:r>
-              <a:rPr lang="en-GB" sz="1400" dirty="0">
-                <a:solidFill>
-                  <a:srgbClr val="000000"/>
-                </a:solidFill>
-                <a:latin typeface="Courier New" panose="02070309020205020404" pitchFamily="49" charset="0"/>
-                <a:ea typeface="ＭＳ Ｐゴシック" charset="0"/>
-                <a:cs typeface="Courier New" panose="02070309020205020404" pitchFamily="49" charset="0"/>
-              </a:rPr>
-              <a:t> identity[3][3</a:t>
+              <a:t>int identity[3][3</a:t>
             </a:r>
             <a:r>
               <a:rPr lang="en-GB" sz="1400" dirty="0" smtClean="0">
@@ -31049,7 +30521,7 @@
               <a:t>How can we allocate memory for this using </a:t>
             </a:r>
             <a:r>
-              <a:rPr lang="en-GB" sz="1400" dirty="0" err="1">
+              <a:rPr lang="en-GB" sz="1400" dirty="0">
                 <a:solidFill>
                   <a:srgbClr val="000000"/>
                 </a:solidFill>
@@ -31136,7 +30608,7 @@
           <a:lstStyle/>
           <a:p>
             <a:r>
-              <a:rPr lang="en-GB" sz="1100" dirty="0" err="1">
+              <a:rPr lang="en-GB" sz="1100" dirty="0">
                 <a:solidFill>
                   <a:srgbClr val="000000"/>
                 </a:solidFill>
@@ -31146,24 +30618,14 @@
               <a:t>i</a:t>
             </a:r>
             <a:r>
-              <a:rPr lang="en-GB" sz="1100" dirty="0" err="1" smtClean="0">
+              <a:rPr lang="en-GB" sz="1100" dirty="0" smtClean="0">
                 <a:solidFill>
                   <a:srgbClr val="000000"/>
                 </a:solidFill>
                 <a:latin typeface="Courier New" panose="02070309020205020404" pitchFamily="49" charset="0"/>
                 <a:cs typeface="Courier New" panose="02070309020205020404" pitchFamily="49" charset="0"/>
               </a:rPr>
-              <a:t>nt</a:t>
-            </a:r>
-            <a:r>
-              <a:rPr lang="en-GB" sz="1100" dirty="0" smtClean="0">
-                <a:solidFill>
-                  <a:srgbClr val="000000"/>
-                </a:solidFill>
-                <a:latin typeface="Courier New" panose="02070309020205020404" pitchFamily="49" charset="0"/>
-                <a:cs typeface="Courier New" panose="02070309020205020404" pitchFamily="49" charset="0"/>
-              </a:rPr>
-              <a:t> ** identity;</a:t>
+              <a:t>nt ** identity;</a:t>
             </a:r>
           </a:p>
           <a:p>
@@ -31177,14 +30639,26 @@
           </a:p>
           <a:p>
             <a:r>
-              <a:rPr lang="en-GB" sz="1100" dirty="0" err="1" smtClean="0">
+              <a:rPr lang="en-GB" sz="1100" dirty="0" smtClean="0">
                 <a:solidFill>
                   <a:srgbClr val="000000"/>
                 </a:solidFill>
                 <a:latin typeface="Courier New" panose="02070309020205020404" pitchFamily="49" charset="0"/>
                 <a:cs typeface="Courier New" panose="02070309020205020404" pitchFamily="49" charset="0"/>
               </a:rPr>
-              <a:t>int</a:t>
+              <a:t>int num_rows = 3;</a:t>
+            </a:r>
+          </a:p>
+          <a:p>
+            <a:r>
+              <a:rPr lang="en-GB" sz="1100" dirty="0">
+                <a:solidFill>
+                  <a:srgbClr val="000000"/>
+                </a:solidFill>
+                <a:latin typeface="Courier New" panose="02070309020205020404" pitchFamily="49" charset="0"/>
+                <a:cs typeface="Courier New" panose="02070309020205020404" pitchFamily="49" charset="0"/>
+              </a:rPr>
+              <a:t>i</a:t>
             </a:r>
             <a:r>
               <a:rPr lang="en-GB" sz="1100" dirty="0" smtClean="0">
@@ -31194,79 +30668,7 @@
                 <a:latin typeface="Courier New" panose="02070309020205020404" pitchFamily="49" charset="0"/>
                 <a:cs typeface="Courier New" panose="02070309020205020404" pitchFamily="49" charset="0"/>
               </a:rPr>
-              <a:t> </a:t>
-            </a:r>
-            <a:r>
-              <a:rPr lang="en-GB" sz="1100" dirty="0" err="1" smtClean="0">
-                <a:solidFill>
-                  <a:srgbClr val="000000"/>
-                </a:solidFill>
-                <a:latin typeface="Courier New" panose="02070309020205020404" pitchFamily="49" charset="0"/>
-                <a:cs typeface="Courier New" panose="02070309020205020404" pitchFamily="49" charset="0"/>
-              </a:rPr>
-              <a:t>num_rows</a:t>
-            </a:r>
-            <a:r>
-              <a:rPr lang="en-GB" sz="1100" dirty="0" smtClean="0">
-                <a:solidFill>
-                  <a:srgbClr val="000000"/>
-                </a:solidFill>
-                <a:latin typeface="Courier New" panose="02070309020205020404" pitchFamily="49" charset="0"/>
-                <a:cs typeface="Courier New" panose="02070309020205020404" pitchFamily="49" charset="0"/>
-              </a:rPr>
-              <a:t> = 3;</a:t>
-            </a:r>
-          </a:p>
-          <a:p>
-            <a:r>
-              <a:rPr lang="en-GB" sz="1100" dirty="0" err="1">
-                <a:solidFill>
-                  <a:srgbClr val="000000"/>
-                </a:solidFill>
-                <a:latin typeface="Courier New" panose="02070309020205020404" pitchFamily="49" charset="0"/>
-                <a:cs typeface="Courier New" panose="02070309020205020404" pitchFamily="49" charset="0"/>
-              </a:rPr>
-              <a:t>i</a:t>
-            </a:r>
-            <a:r>
-              <a:rPr lang="en-GB" sz="1100" dirty="0" err="1" smtClean="0">
-                <a:solidFill>
-                  <a:srgbClr val="000000"/>
-                </a:solidFill>
-                <a:latin typeface="Courier New" panose="02070309020205020404" pitchFamily="49" charset="0"/>
-                <a:cs typeface="Courier New" panose="02070309020205020404" pitchFamily="49" charset="0"/>
-              </a:rPr>
-              <a:t>nt</a:t>
-            </a:r>
-            <a:r>
-              <a:rPr lang="en-GB" sz="1100" dirty="0" smtClean="0">
-                <a:solidFill>
-                  <a:srgbClr val="000000"/>
-                </a:solidFill>
-                <a:latin typeface="Courier New" panose="02070309020205020404" pitchFamily="49" charset="0"/>
-                <a:cs typeface="Courier New" panose="02070309020205020404" pitchFamily="49" charset="0"/>
-              </a:rPr>
-              <a:t> </a:t>
-            </a:r>
-            <a:r>
-              <a:rPr lang="en-GB" sz="1100" dirty="0" err="1" smtClean="0">
-                <a:solidFill>
-                  <a:srgbClr val="000000"/>
-                </a:solidFill>
-                <a:latin typeface="Courier New" panose="02070309020205020404" pitchFamily="49" charset="0"/>
-                <a:cs typeface="Courier New" panose="02070309020205020404" pitchFamily="49" charset="0"/>
-              </a:rPr>
-              <a:t>num_cols</a:t>
-            </a:r>
-            <a:r>
-              <a:rPr lang="en-GB" sz="1100" dirty="0" smtClean="0">
-                <a:solidFill>
-                  <a:srgbClr val="000000"/>
-                </a:solidFill>
-                <a:latin typeface="Courier New" panose="02070309020205020404" pitchFamily="49" charset="0"/>
-                <a:cs typeface="Courier New" panose="02070309020205020404" pitchFamily="49" charset="0"/>
-              </a:rPr>
-              <a:t> = 3;</a:t>
+              <a:t>nt num_cols = 3;</a:t>
             </a:r>
           </a:p>
           <a:p>
@@ -31335,17 +30737,17 @@
                 <a:latin typeface="Courier New" panose="02070309020205020404" pitchFamily="49" charset="0"/>
                 <a:cs typeface="Courier New" panose="02070309020205020404" pitchFamily="49" charset="0"/>
               </a:rPr>
-              <a:t>(</a:t>
-            </a:r>
-            <a:r>
-              <a:rPr lang="en-GB" sz="1100" dirty="0" err="1">
+              <a:t>(int **)</a:t>
+            </a:r>
+            <a:r>
+              <a:rPr lang="en-GB" sz="1100" dirty="0" smtClean="0">
                 <a:solidFill>
                   <a:srgbClr val="000000"/>
                 </a:solidFill>
                 <a:latin typeface="Courier New" panose="02070309020205020404" pitchFamily="49" charset="0"/>
                 <a:cs typeface="Courier New" panose="02070309020205020404" pitchFamily="49" charset="0"/>
               </a:rPr>
-              <a:t>int</a:t>
+              <a:t>malloc(num_rows </a:t>
             </a:r>
             <a:r>
               <a:rPr lang="en-GB" sz="1100" dirty="0">
@@ -31355,17 +30757,19 @@
                 <a:latin typeface="Courier New" panose="02070309020205020404" pitchFamily="49" charset="0"/>
                 <a:cs typeface="Courier New" panose="02070309020205020404" pitchFamily="49" charset="0"/>
               </a:rPr>
-              <a:t> **)</a:t>
-            </a:r>
-            <a:r>
-              <a:rPr lang="en-GB" sz="1100" dirty="0" err="1" smtClean="0">
+              <a:t>* sizeof(int*));</a:t>
+            </a:r>
+          </a:p>
+          <a:p>
+            <a:r>
+              <a:rPr lang="en-GB" sz="1100" dirty="0">
                 <a:solidFill>
                   <a:srgbClr val="000000"/>
                 </a:solidFill>
                 <a:latin typeface="Courier New" panose="02070309020205020404" pitchFamily="49" charset="0"/>
                 <a:cs typeface="Courier New" panose="02070309020205020404" pitchFamily="49" charset="0"/>
               </a:rPr>
-              <a:t>malloc</a:t>
+              <a:t>for(int </a:t>
             </a:r>
             <a:r>
               <a:rPr lang="en-GB" sz="1100" dirty="0" smtClean="0">
@@ -31375,17 +30779,17 @@
                 <a:latin typeface="Courier New" panose="02070309020205020404" pitchFamily="49" charset="0"/>
                 <a:cs typeface="Courier New" panose="02070309020205020404" pitchFamily="49" charset="0"/>
               </a:rPr>
-              <a:t>(</a:t>
-            </a:r>
-            <a:r>
-              <a:rPr lang="en-GB" sz="1100" dirty="0" err="1" smtClean="0">
+              <a:t>i=0</a:t>
+            </a:r>
+            <a:r>
+              <a:rPr lang="en-GB" sz="1100" dirty="0">
                 <a:solidFill>
                   <a:srgbClr val="000000"/>
                 </a:solidFill>
                 <a:latin typeface="Courier New" panose="02070309020205020404" pitchFamily="49" charset="0"/>
                 <a:cs typeface="Courier New" panose="02070309020205020404" pitchFamily="49" charset="0"/>
               </a:rPr>
-              <a:t>num_rows</a:t>
+              <a:t>; </a:t>
             </a:r>
             <a:r>
               <a:rPr lang="en-GB" sz="1100" dirty="0" smtClean="0">
@@ -31395,9 +30799,51 @@
                 <a:latin typeface="Courier New" panose="02070309020205020404" pitchFamily="49" charset="0"/>
                 <a:cs typeface="Courier New" panose="02070309020205020404" pitchFamily="49" charset="0"/>
               </a:rPr>
+              <a:t>i&lt;num_rows</a:t>
+            </a:r>
+            <a:r>
+              <a:rPr lang="en-GB" sz="1100" dirty="0">
+                <a:solidFill>
+                  <a:srgbClr val="000000"/>
+                </a:solidFill>
+                <a:latin typeface="Courier New" panose="02070309020205020404" pitchFamily="49" charset="0"/>
+                <a:cs typeface="Courier New" panose="02070309020205020404" pitchFamily="49" charset="0"/>
+              </a:rPr>
+              <a:t>; i++) </a:t>
+            </a:r>
+            <a:r>
+              <a:rPr lang="en-GB" sz="1100" dirty="0" smtClean="0">
+                <a:solidFill>
+                  <a:srgbClr val="000000"/>
+                </a:solidFill>
+                <a:latin typeface="Courier New" panose="02070309020205020404" pitchFamily="49" charset="0"/>
+                <a:cs typeface="Courier New" panose="02070309020205020404" pitchFamily="49" charset="0"/>
+              </a:rPr>
+              <a:t>{</a:t>
+            </a:r>
+          </a:p>
+          <a:p>
+            <a:r>
+              <a:rPr lang="en-GB" sz="1100" dirty="0">
+                <a:solidFill>
+                  <a:srgbClr val="000000"/>
+                </a:solidFill>
+                <a:latin typeface="Courier New" panose="02070309020205020404" pitchFamily="49" charset="0"/>
+                <a:cs typeface="Courier New" panose="02070309020205020404" pitchFamily="49" charset="0"/>
+              </a:rPr>
               <a:t> </a:t>
             </a:r>
             <a:r>
+              <a:rPr lang="en-GB" sz="1100" dirty="0" smtClean="0">
+                <a:solidFill>
+                  <a:srgbClr val="000000"/>
+                </a:solidFill>
+                <a:latin typeface="Courier New" panose="02070309020205020404" pitchFamily="49" charset="0"/>
+                <a:cs typeface="Courier New" panose="02070309020205020404" pitchFamily="49" charset="0"/>
+              </a:rPr>
+              <a:t>   identity[i</a:t>
+            </a:r>
+            <a:r>
               <a:rPr lang="en-GB" sz="1100" dirty="0">
                 <a:solidFill>
                   <a:srgbClr val="000000"/>
@@ -31405,17 +30851,17 @@
                 <a:latin typeface="Courier New" panose="02070309020205020404" pitchFamily="49" charset="0"/>
                 <a:cs typeface="Courier New" panose="02070309020205020404" pitchFamily="49" charset="0"/>
               </a:rPr>
-              <a:t>* </a:t>
-            </a:r>
-            <a:r>
-              <a:rPr lang="en-GB" sz="1100" dirty="0" err="1">
+              <a:t>] = (int *)</a:t>
+            </a:r>
+            <a:r>
+              <a:rPr lang="en-GB" sz="1100" dirty="0" smtClean="0">
                 <a:solidFill>
                   <a:srgbClr val="000000"/>
                 </a:solidFill>
                 <a:latin typeface="Courier New" panose="02070309020205020404" pitchFamily="49" charset="0"/>
                 <a:cs typeface="Courier New" panose="02070309020205020404" pitchFamily="49" charset="0"/>
               </a:rPr>
-              <a:t>sizeof</a:t>
+              <a:t>malloc(num_cols </a:t>
             </a:r>
             <a:r>
               <a:rPr lang="en-GB" sz="1100" dirty="0">
@@ -31425,301 +30871,7 @@
                 <a:latin typeface="Courier New" panose="02070309020205020404" pitchFamily="49" charset="0"/>
                 <a:cs typeface="Courier New" panose="02070309020205020404" pitchFamily="49" charset="0"/>
               </a:rPr>
-              <a:t>(</a:t>
-            </a:r>
-            <a:r>
-              <a:rPr lang="en-GB" sz="1100" dirty="0" err="1">
-                <a:solidFill>
-                  <a:srgbClr val="000000"/>
-                </a:solidFill>
-                <a:latin typeface="Courier New" panose="02070309020205020404" pitchFamily="49" charset="0"/>
-                <a:cs typeface="Courier New" panose="02070309020205020404" pitchFamily="49" charset="0"/>
-              </a:rPr>
-              <a:t>int</a:t>
-            </a:r>
-            <a:r>
-              <a:rPr lang="en-GB" sz="1100" dirty="0">
-                <a:solidFill>
-                  <a:srgbClr val="000000"/>
-                </a:solidFill>
-                <a:latin typeface="Courier New" panose="02070309020205020404" pitchFamily="49" charset="0"/>
-                <a:cs typeface="Courier New" panose="02070309020205020404" pitchFamily="49" charset="0"/>
-              </a:rPr>
-              <a:t>*));</a:t>
-            </a:r>
-          </a:p>
-          <a:p>
-            <a:r>
-              <a:rPr lang="en-GB" sz="1100" dirty="0">
-                <a:solidFill>
-                  <a:srgbClr val="000000"/>
-                </a:solidFill>
-                <a:latin typeface="Courier New" panose="02070309020205020404" pitchFamily="49" charset="0"/>
-                <a:cs typeface="Courier New" panose="02070309020205020404" pitchFamily="49" charset="0"/>
-              </a:rPr>
-              <a:t>for(</a:t>
-            </a:r>
-            <a:r>
-              <a:rPr lang="en-GB" sz="1100" dirty="0" err="1">
-                <a:solidFill>
-                  <a:srgbClr val="000000"/>
-                </a:solidFill>
-                <a:latin typeface="Courier New" panose="02070309020205020404" pitchFamily="49" charset="0"/>
-                <a:cs typeface="Courier New" panose="02070309020205020404" pitchFamily="49" charset="0"/>
-              </a:rPr>
-              <a:t>int</a:t>
-            </a:r>
-            <a:r>
-              <a:rPr lang="en-GB" sz="1100" dirty="0">
-                <a:solidFill>
-                  <a:srgbClr val="000000"/>
-                </a:solidFill>
-                <a:latin typeface="Courier New" panose="02070309020205020404" pitchFamily="49" charset="0"/>
-                <a:cs typeface="Courier New" panose="02070309020205020404" pitchFamily="49" charset="0"/>
-              </a:rPr>
-              <a:t> </a:t>
-            </a:r>
-            <a:r>
-              <a:rPr lang="en-GB" sz="1100" dirty="0" err="1" smtClean="0">
-                <a:solidFill>
-                  <a:srgbClr val="000000"/>
-                </a:solidFill>
-                <a:latin typeface="Courier New" panose="02070309020205020404" pitchFamily="49" charset="0"/>
-                <a:cs typeface="Courier New" panose="02070309020205020404" pitchFamily="49" charset="0"/>
-              </a:rPr>
-              <a:t>i</a:t>
-            </a:r>
-            <a:r>
-              <a:rPr lang="en-GB" sz="1100" dirty="0" smtClean="0">
-                <a:solidFill>
-                  <a:srgbClr val="000000"/>
-                </a:solidFill>
-                <a:latin typeface="Courier New" panose="02070309020205020404" pitchFamily="49" charset="0"/>
-                <a:cs typeface="Courier New" panose="02070309020205020404" pitchFamily="49" charset="0"/>
-              </a:rPr>
-              <a:t>=0</a:t>
-            </a:r>
-            <a:r>
-              <a:rPr lang="en-GB" sz="1100" dirty="0">
-                <a:solidFill>
-                  <a:srgbClr val="000000"/>
-                </a:solidFill>
-                <a:latin typeface="Courier New" panose="02070309020205020404" pitchFamily="49" charset="0"/>
-                <a:cs typeface="Courier New" panose="02070309020205020404" pitchFamily="49" charset="0"/>
-              </a:rPr>
-              <a:t>; </a:t>
-            </a:r>
-            <a:r>
-              <a:rPr lang="en-GB" sz="1100" dirty="0" err="1" smtClean="0">
-                <a:solidFill>
-                  <a:srgbClr val="000000"/>
-                </a:solidFill>
-                <a:latin typeface="Courier New" panose="02070309020205020404" pitchFamily="49" charset="0"/>
-                <a:cs typeface="Courier New" panose="02070309020205020404" pitchFamily="49" charset="0"/>
-              </a:rPr>
-              <a:t>i</a:t>
-            </a:r>
-            <a:r>
-              <a:rPr lang="en-GB" sz="1100" dirty="0" smtClean="0">
-                <a:solidFill>
-                  <a:srgbClr val="000000"/>
-                </a:solidFill>
-                <a:latin typeface="Courier New" panose="02070309020205020404" pitchFamily="49" charset="0"/>
-                <a:cs typeface="Courier New" panose="02070309020205020404" pitchFamily="49" charset="0"/>
-              </a:rPr>
-              <a:t>&lt;</a:t>
-            </a:r>
-            <a:r>
-              <a:rPr lang="en-GB" sz="1100" dirty="0" err="1" smtClean="0">
-                <a:solidFill>
-                  <a:srgbClr val="000000"/>
-                </a:solidFill>
-                <a:latin typeface="Courier New" panose="02070309020205020404" pitchFamily="49" charset="0"/>
-                <a:cs typeface="Courier New" panose="02070309020205020404" pitchFamily="49" charset="0"/>
-              </a:rPr>
-              <a:t>num_rows</a:t>
-            </a:r>
-            <a:r>
-              <a:rPr lang="en-GB" sz="1100" dirty="0">
-                <a:solidFill>
-                  <a:srgbClr val="000000"/>
-                </a:solidFill>
-                <a:latin typeface="Courier New" panose="02070309020205020404" pitchFamily="49" charset="0"/>
-                <a:cs typeface="Courier New" panose="02070309020205020404" pitchFamily="49" charset="0"/>
-              </a:rPr>
-              <a:t>; </a:t>
-            </a:r>
-            <a:r>
-              <a:rPr lang="en-GB" sz="1100" dirty="0" err="1">
-                <a:solidFill>
-                  <a:srgbClr val="000000"/>
-                </a:solidFill>
-                <a:latin typeface="Courier New" panose="02070309020205020404" pitchFamily="49" charset="0"/>
-                <a:cs typeface="Courier New" panose="02070309020205020404" pitchFamily="49" charset="0"/>
-              </a:rPr>
-              <a:t>i</a:t>
-            </a:r>
-            <a:r>
-              <a:rPr lang="en-GB" sz="1100" dirty="0">
-                <a:solidFill>
-                  <a:srgbClr val="000000"/>
-                </a:solidFill>
-                <a:latin typeface="Courier New" panose="02070309020205020404" pitchFamily="49" charset="0"/>
-                <a:cs typeface="Courier New" panose="02070309020205020404" pitchFamily="49" charset="0"/>
-              </a:rPr>
-              <a:t>++) </a:t>
-            </a:r>
-            <a:r>
-              <a:rPr lang="en-GB" sz="1100" dirty="0" smtClean="0">
-                <a:solidFill>
-                  <a:srgbClr val="000000"/>
-                </a:solidFill>
-                <a:latin typeface="Courier New" panose="02070309020205020404" pitchFamily="49" charset="0"/>
-                <a:cs typeface="Courier New" panose="02070309020205020404" pitchFamily="49" charset="0"/>
-              </a:rPr>
-              <a:t>{</a:t>
-            </a:r>
-          </a:p>
-          <a:p>
-            <a:r>
-              <a:rPr lang="en-GB" sz="1100" dirty="0">
-                <a:solidFill>
-                  <a:srgbClr val="000000"/>
-                </a:solidFill>
-                <a:latin typeface="Courier New" panose="02070309020205020404" pitchFamily="49" charset="0"/>
-                <a:cs typeface="Courier New" panose="02070309020205020404" pitchFamily="49" charset="0"/>
-              </a:rPr>
-              <a:t> </a:t>
-            </a:r>
-            <a:r>
-              <a:rPr lang="en-GB" sz="1100" dirty="0" smtClean="0">
-                <a:solidFill>
-                  <a:srgbClr val="000000"/>
-                </a:solidFill>
-                <a:latin typeface="Courier New" panose="02070309020205020404" pitchFamily="49" charset="0"/>
-                <a:cs typeface="Courier New" panose="02070309020205020404" pitchFamily="49" charset="0"/>
-              </a:rPr>
-              <a:t>   identity[</a:t>
-            </a:r>
-            <a:r>
-              <a:rPr lang="en-GB" sz="1100" dirty="0" err="1" smtClean="0">
-                <a:solidFill>
-                  <a:srgbClr val="000000"/>
-                </a:solidFill>
-                <a:latin typeface="Courier New" panose="02070309020205020404" pitchFamily="49" charset="0"/>
-                <a:cs typeface="Courier New" panose="02070309020205020404" pitchFamily="49" charset="0"/>
-              </a:rPr>
-              <a:t>i</a:t>
-            </a:r>
-            <a:r>
-              <a:rPr lang="en-GB" sz="1100" dirty="0">
-                <a:solidFill>
-                  <a:srgbClr val="000000"/>
-                </a:solidFill>
-                <a:latin typeface="Courier New" panose="02070309020205020404" pitchFamily="49" charset="0"/>
-                <a:cs typeface="Courier New" panose="02070309020205020404" pitchFamily="49" charset="0"/>
-              </a:rPr>
-              <a:t>] = (</a:t>
-            </a:r>
-            <a:r>
-              <a:rPr lang="en-GB" sz="1100" dirty="0" err="1">
-                <a:solidFill>
-                  <a:srgbClr val="000000"/>
-                </a:solidFill>
-                <a:latin typeface="Courier New" panose="02070309020205020404" pitchFamily="49" charset="0"/>
-                <a:cs typeface="Courier New" panose="02070309020205020404" pitchFamily="49" charset="0"/>
-              </a:rPr>
-              <a:t>int</a:t>
-            </a:r>
-            <a:r>
-              <a:rPr lang="en-GB" sz="1100" dirty="0">
-                <a:solidFill>
-                  <a:srgbClr val="000000"/>
-                </a:solidFill>
-                <a:latin typeface="Courier New" panose="02070309020205020404" pitchFamily="49" charset="0"/>
-                <a:cs typeface="Courier New" panose="02070309020205020404" pitchFamily="49" charset="0"/>
-              </a:rPr>
-              <a:t> *)</a:t>
-            </a:r>
-            <a:r>
-              <a:rPr lang="en-GB" sz="1100" dirty="0" err="1" smtClean="0">
-                <a:solidFill>
-                  <a:srgbClr val="000000"/>
-                </a:solidFill>
-                <a:latin typeface="Courier New" panose="02070309020205020404" pitchFamily="49" charset="0"/>
-                <a:cs typeface="Courier New" panose="02070309020205020404" pitchFamily="49" charset="0"/>
-              </a:rPr>
-              <a:t>malloc</a:t>
-            </a:r>
-            <a:r>
-              <a:rPr lang="en-GB" sz="1100" dirty="0" smtClean="0">
-                <a:solidFill>
-                  <a:srgbClr val="000000"/>
-                </a:solidFill>
-                <a:latin typeface="Courier New" panose="02070309020205020404" pitchFamily="49" charset="0"/>
-                <a:cs typeface="Courier New" panose="02070309020205020404" pitchFamily="49" charset="0"/>
-              </a:rPr>
-              <a:t>(</a:t>
-            </a:r>
-            <a:r>
-              <a:rPr lang="en-GB" sz="1100" dirty="0" err="1" smtClean="0">
-                <a:solidFill>
-                  <a:srgbClr val="000000"/>
-                </a:solidFill>
-                <a:latin typeface="Courier New" panose="02070309020205020404" pitchFamily="49" charset="0"/>
-                <a:cs typeface="Courier New" panose="02070309020205020404" pitchFamily="49" charset="0"/>
-              </a:rPr>
-              <a:t>num_cols</a:t>
-            </a:r>
-            <a:r>
-              <a:rPr lang="en-GB" sz="1100" dirty="0" smtClean="0">
-                <a:solidFill>
-                  <a:srgbClr val="000000"/>
-                </a:solidFill>
-                <a:latin typeface="Courier New" panose="02070309020205020404" pitchFamily="49" charset="0"/>
-                <a:cs typeface="Courier New" panose="02070309020205020404" pitchFamily="49" charset="0"/>
-              </a:rPr>
-              <a:t> </a:t>
-            </a:r>
-            <a:r>
-              <a:rPr lang="en-GB" sz="1100" dirty="0">
-                <a:solidFill>
-                  <a:srgbClr val="000000"/>
-                </a:solidFill>
-                <a:latin typeface="Courier New" panose="02070309020205020404" pitchFamily="49" charset="0"/>
-                <a:cs typeface="Courier New" panose="02070309020205020404" pitchFamily="49" charset="0"/>
-              </a:rPr>
-              <a:t>* </a:t>
-            </a:r>
-            <a:r>
-              <a:rPr lang="en-GB" sz="1100" dirty="0" err="1">
-                <a:solidFill>
-                  <a:srgbClr val="000000"/>
-                </a:solidFill>
-                <a:latin typeface="Courier New" panose="02070309020205020404" pitchFamily="49" charset="0"/>
-                <a:cs typeface="Courier New" panose="02070309020205020404" pitchFamily="49" charset="0"/>
-              </a:rPr>
-              <a:t>sizeof</a:t>
-            </a:r>
-            <a:r>
-              <a:rPr lang="en-GB" sz="1100" dirty="0">
-                <a:solidFill>
-                  <a:srgbClr val="000000"/>
-                </a:solidFill>
-                <a:latin typeface="Courier New" panose="02070309020205020404" pitchFamily="49" charset="0"/>
-                <a:cs typeface="Courier New" panose="02070309020205020404" pitchFamily="49" charset="0"/>
-              </a:rPr>
-              <a:t>(</a:t>
-            </a:r>
-            <a:r>
-              <a:rPr lang="en-GB" sz="1100" dirty="0" err="1">
-                <a:solidFill>
-                  <a:srgbClr val="000000"/>
-                </a:solidFill>
-                <a:latin typeface="Courier New" panose="02070309020205020404" pitchFamily="49" charset="0"/>
-                <a:cs typeface="Courier New" panose="02070309020205020404" pitchFamily="49" charset="0"/>
-              </a:rPr>
-              <a:t>int</a:t>
+              <a:t>* sizeof(int</a:t>
             </a:r>
             <a:r>
               <a:rPr lang="en-GB" sz="1100" dirty="0" smtClean="0">
@@ -31783,149 +30935,29 @@
                 <a:latin typeface="Courier New" panose="02070309020205020404" pitchFamily="49" charset="0"/>
                 <a:cs typeface="Courier New" panose="02070309020205020404" pitchFamily="49" charset="0"/>
               </a:rPr>
-              <a:t>for(</a:t>
-            </a:r>
-            <a:r>
-              <a:rPr lang="en-GB" sz="1100" dirty="0" err="1">
+              <a:t>for(int i=0; i&lt;num_rows; i++) {</a:t>
+            </a:r>
+          </a:p>
+          <a:p>
+            <a:r>
+              <a:rPr lang="en-GB" sz="1100" dirty="0">
                 <a:solidFill>
                   <a:srgbClr val="000000"/>
                 </a:solidFill>
                 <a:latin typeface="Courier New" panose="02070309020205020404" pitchFamily="49" charset="0"/>
                 <a:cs typeface="Courier New" panose="02070309020205020404" pitchFamily="49" charset="0"/>
               </a:rPr>
-              <a:t>int</a:t>
-            </a:r>
-            <a:r>
-              <a:rPr lang="en-GB" sz="1100" dirty="0">
+              <a:t>    </a:t>
+            </a:r>
+            <a:r>
+              <a:rPr lang="en-GB" sz="1100" dirty="0" smtClean="0">
                 <a:solidFill>
                   <a:srgbClr val="000000"/>
                 </a:solidFill>
                 <a:latin typeface="Courier New" panose="02070309020205020404" pitchFamily="49" charset="0"/>
                 <a:cs typeface="Courier New" panose="02070309020205020404" pitchFamily="49" charset="0"/>
               </a:rPr>
-              <a:t> </a:t>
-            </a:r>
-            <a:r>
-              <a:rPr lang="en-GB" sz="1100" dirty="0" err="1">
-                <a:solidFill>
-                  <a:srgbClr val="000000"/>
-                </a:solidFill>
-                <a:latin typeface="Courier New" panose="02070309020205020404" pitchFamily="49" charset="0"/>
-                <a:cs typeface="Courier New" panose="02070309020205020404" pitchFamily="49" charset="0"/>
-              </a:rPr>
-              <a:t>i</a:t>
-            </a:r>
-            <a:r>
-              <a:rPr lang="en-GB" sz="1100" dirty="0">
-                <a:solidFill>
-                  <a:srgbClr val="000000"/>
-                </a:solidFill>
-                <a:latin typeface="Courier New" panose="02070309020205020404" pitchFamily="49" charset="0"/>
-                <a:cs typeface="Courier New" panose="02070309020205020404" pitchFamily="49" charset="0"/>
-              </a:rPr>
-              <a:t>=0; </a:t>
-            </a:r>
-            <a:r>
-              <a:rPr lang="en-GB" sz="1100" dirty="0" err="1">
-                <a:solidFill>
-                  <a:srgbClr val="000000"/>
-                </a:solidFill>
-                <a:latin typeface="Courier New" panose="02070309020205020404" pitchFamily="49" charset="0"/>
-                <a:cs typeface="Courier New" panose="02070309020205020404" pitchFamily="49" charset="0"/>
-              </a:rPr>
-              <a:t>i</a:t>
-            </a:r>
-            <a:r>
-              <a:rPr lang="en-GB" sz="1100" dirty="0">
-                <a:solidFill>
-                  <a:srgbClr val="000000"/>
-                </a:solidFill>
-                <a:latin typeface="Courier New" panose="02070309020205020404" pitchFamily="49" charset="0"/>
-                <a:cs typeface="Courier New" panose="02070309020205020404" pitchFamily="49" charset="0"/>
-              </a:rPr>
-              <a:t>&lt;</a:t>
-            </a:r>
-            <a:r>
-              <a:rPr lang="en-GB" sz="1100" dirty="0" err="1">
-                <a:solidFill>
-                  <a:srgbClr val="000000"/>
-                </a:solidFill>
-                <a:latin typeface="Courier New" panose="02070309020205020404" pitchFamily="49" charset="0"/>
-                <a:cs typeface="Courier New" panose="02070309020205020404" pitchFamily="49" charset="0"/>
-              </a:rPr>
-              <a:t>num_rows</a:t>
-            </a:r>
-            <a:r>
-              <a:rPr lang="en-GB" sz="1100" dirty="0">
-                <a:solidFill>
-                  <a:srgbClr val="000000"/>
-                </a:solidFill>
-                <a:latin typeface="Courier New" panose="02070309020205020404" pitchFamily="49" charset="0"/>
-                <a:cs typeface="Courier New" panose="02070309020205020404" pitchFamily="49" charset="0"/>
-              </a:rPr>
-              <a:t>; </a:t>
-            </a:r>
-            <a:r>
-              <a:rPr lang="en-GB" sz="1100" dirty="0" err="1">
-                <a:solidFill>
-                  <a:srgbClr val="000000"/>
-                </a:solidFill>
-                <a:latin typeface="Courier New" panose="02070309020205020404" pitchFamily="49" charset="0"/>
-                <a:cs typeface="Courier New" panose="02070309020205020404" pitchFamily="49" charset="0"/>
-              </a:rPr>
-              <a:t>i</a:t>
-            </a:r>
-            <a:r>
-              <a:rPr lang="en-GB" sz="1100" dirty="0">
-                <a:solidFill>
-                  <a:srgbClr val="000000"/>
-                </a:solidFill>
-                <a:latin typeface="Courier New" panose="02070309020205020404" pitchFamily="49" charset="0"/>
-                <a:cs typeface="Courier New" panose="02070309020205020404" pitchFamily="49" charset="0"/>
-              </a:rPr>
-              <a:t>++) {</a:t>
-            </a:r>
-          </a:p>
-          <a:p>
-            <a:r>
-              <a:rPr lang="en-GB" sz="1100" dirty="0">
-                <a:solidFill>
-                  <a:srgbClr val="000000"/>
-                </a:solidFill>
-                <a:latin typeface="Courier New" panose="02070309020205020404" pitchFamily="49" charset="0"/>
-                <a:cs typeface="Courier New" panose="02070309020205020404" pitchFamily="49" charset="0"/>
-              </a:rPr>
-              <a:t>    </a:t>
-            </a:r>
-            <a:r>
-              <a:rPr lang="en-GB" sz="1100" dirty="0" smtClean="0">
-                <a:solidFill>
-                  <a:srgbClr val="000000"/>
-                </a:solidFill>
-                <a:latin typeface="Courier New" panose="02070309020205020404" pitchFamily="49" charset="0"/>
-                <a:cs typeface="Courier New" panose="02070309020205020404" pitchFamily="49" charset="0"/>
-              </a:rPr>
-              <a:t>free(identity[</a:t>
-            </a:r>
-            <a:r>
-              <a:rPr lang="en-GB" sz="1100" dirty="0" err="1" smtClean="0">
-                <a:solidFill>
-                  <a:srgbClr val="000000"/>
-                </a:solidFill>
-                <a:latin typeface="Courier New" panose="02070309020205020404" pitchFamily="49" charset="0"/>
-                <a:cs typeface="Courier New" panose="02070309020205020404" pitchFamily="49" charset="0"/>
-              </a:rPr>
-              <a:t>i</a:t>
-            </a:r>
-            <a:r>
-              <a:rPr lang="en-GB" sz="1100" dirty="0" smtClean="0">
-                <a:solidFill>
-                  <a:srgbClr val="000000"/>
-                </a:solidFill>
-                <a:latin typeface="Courier New" panose="02070309020205020404" pitchFamily="49" charset="0"/>
-                <a:cs typeface="Courier New" panose="02070309020205020404" pitchFamily="49" charset="0"/>
-              </a:rPr>
-              <a:t>]);</a:t>
+              <a:t>free(identity[i]);</a:t>
             </a:r>
             <a:endParaRPr lang="en-GB" sz="1100" dirty="0">
               <a:solidFill>
@@ -32128,7 +31160,7 @@
               <a:t>We begin by allocating a double pointer to type </a:t>
             </a:r>
             <a:r>
-              <a:rPr lang="en-GB" sz="1400" dirty="0" err="1">
+              <a:rPr lang="en-GB" sz="1400" dirty="0">
                 <a:solidFill>
                   <a:srgbClr val="000000"/>
                 </a:solidFill>
@@ -32158,24 +31190,14 @@
               <a:t>This in turn points to an array of pointers of type </a:t>
             </a:r>
             <a:r>
-              <a:rPr lang="en-GB" sz="1400" dirty="0" err="1" smtClean="0">
+              <a:rPr lang="en-GB" sz="1400" dirty="0" smtClean="0">
                 <a:solidFill>
                   <a:srgbClr val="000000"/>
                 </a:solidFill>
                 <a:latin typeface="Courier New" panose="02070309020205020404" pitchFamily="49" charset="0"/>
                 <a:cs typeface="Courier New" panose="02070309020205020404" pitchFamily="49" charset="0"/>
               </a:rPr>
-              <a:t>int</a:t>
-            </a:r>
-            <a:r>
-              <a:rPr lang="en-GB" sz="1400" dirty="0" smtClean="0">
-                <a:solidFill>
-                  <a:srgbClr val="000000"/>
-                </a:solidFill>
-                <a:latin typeface="Courier New" panose="02070309020205020404" pitchFamily="49" charset="0"/>
-                <a:cs typeface="Courier New" panose="02070309020205020404" pitchFamily="49" charset="0"/>
-              </a:rPr>
-              <a:t>* </a:t>
+              <a:t>int* </a:t>
             </a:r>
           </a:p>
           <a:p>
@@ -32291,7 +31313,7 @@
               <a:effectLst/>
               <a:extLst>
                 <a:ext uri="{AF507438-7753-43e0-B8FC-AC1667EBCBE1}">
-                  <a14:hiddenEffects xmlns="" xmlns:a14="http://schemas.microsoft.com/office/drawing/2010/main">
+                  <a14:hiddenEffects xmlns:a14="http://schemas.microsoft.com/office/drawing/2010/main" xmlns="">
                     <a:effectLst>
                       <a:outerShdw blurRad="63500" dist="38099" dir="2700000" algn="ctr" rotWithShape="0">
                         <a:schemeClr val="bg2">
@@ -32390,7 +31412,7 @@
               <a:effectLst/>
               <a:extLst>
                 <a:ext uri="{AF507438-7753-43e0-B8FC-AC1667EBCBE1}">
-                  <a14:hiddenEffects xmlns="" xmlns:a14="http://schemas.microsoft.com/office/drawing/2010/main">
+                  <a14:hiddenEffects xmlns:a14="http://schemas.microsoft.com/office/drawing/2010/main" xmlns="">
                     <a:effectLst>
                       <a:outerShdw blurRad="63500" dist="38099" dir="2700000" algn="ctr" rotWithShape="0">
                         <a:schemeClr val="bg2">
@@ -32490,7 +31512,7 @@
               <a:effectLst/>
               <a:extLst>
                 <a:ext uri="{AF507438-7753-43e0-B8FC-AC1667EBCBE1}">
-                  <a14:hiddenEffects xmlns="" xmlns:a14="http://schemas.microsoft.com/office/drawing/2010/main">
+                  <a14:hiddenEffects xmlns:a14="http://schemas.microsoft.com/office/drawing/2010/main" xmlns="">
                     <a:effectLst>
                       <a:outerShdw blurRad="63500" dist="38099" dir="2700000" algn="ctr" rotWithShape="0">
                         <a:schemeClr val="bg2">
@@ -32590,7 +31612,7 @@
             <a:effectLst/>
             <a:extLst>
               <a:ext uri="{AF507438-7753-43e0-B8FC-AC1667EBCBE1}">
-                <a14:hiddenEffects xmlns="" xmlns:a14="http://schemas.microsoft.com/office/drawing/2010/main">
+                <a14:hiddenEffects xmlns:a14="http://schemas.microsoft.com/office/drawing/2010/main" xmlns="">
                   <a:effectLst>
                     <a:outerShdw blurRad="63500" dist="38099" dir="2700000" algn="ctr" rotWithShape="0">
                       <a:schemeClr val="bg2">
@@ -32683,15 +31705,7 @@
                   <a:ea typeface="ＭＳ Ｐゴシック" charset="0"/>
                   <a:cs typeface="Courier New" panose="02070309020205020404" pitchFamily="49" charset="0"/>
                 </a:rPr>
-                <a:t>**</a:t>
-              </a:r>
-              <a:r>
-                <a:rPr lang="en-GB" dirty="0" err="1" smtClean="0">
-                  <a:latin typeface="Courier New" panose="02070309020205020404" pitchFamily="49" charset="0"/>
-                  <a:ea typeface="ＭＳ Ｐゴシック" charset="0"/>
-                  <a:cs typeface="Courier New" panose="02070309020205020404" pitchFamily="49" charset="0"/>
-                </a:rPr>
-                <a:t>int</a:t>
+                <a:t>**int</a:t>
               </a:r>
               <a:endParaRPr lang="en-GB" dirty="0"/>
             </a:p>
@@ -32724,15 +31738,7 @@
                   <a:ea typeface="ＭＳ Ｐゴシック" charset="0"/>
                   <a:cs typeface="Courier New" panose="02070309020205020404" pitchFamily="49" charset="0"/>
                 </a:rPr>
-                <a:t>*</a:t>
-              </a:r>
-              <a:r>
-                <a:rPr lang="en-GB" dirty="0" err="1" smtClean="0">
-                  <a:latin typeface="Courier New" panose="02070309020205020404" pitchFamily="49" charset="0"/>
-                  <a:ea typeface="ＭＳ Ｐゴシック" charset="0"/>
-                  <a:cs typeface="Courier New" panose="02070309020205020404" pitchFamily="49" charset="0"/>
-                </a:rPr>
-                <a:t>int</a:t>
+                <a:t>*int</a:t>
               </a:r>
               <a:endParaRPr lang="en-GB" dirty="0"/>
             </a:p>
@@ -32771,7 +31777,7 @@
             <a:effectLst/>
             <a:extLst>
               <a:ext uri="{AF507438-7753-43e0-B8FC-AC1667EBCBE1}">
-                <a14:hiddenEffects xmlns="" xmlns:a14="http://schemas.microsoft.com/office/drawing/2010/main">
+                <a14:hiddenEffects xmlns:a14="http://schemas.microsoft.com/office/drawing/2010/main" xmlns="">
                   <a:effectLst>
                     <a:outerShdw blurRad="63500" dist="38099" dir="2700000" algn="ctr" rotWithShape="0">
                       <a:schemeClr val="bg2">
@@ -32871,7 +31877,7 @@
             <a:effectLst/>
             <a:extLst>
               <a:ext uri="{AF507438-7753-43e0-B8FC-AC1667EBCBE1}">
-                <a14:hiddenEffects xmlns="" xmlns:a14="http://schemas.microsoft.com/office/drawing/2010/main">
+                <a14:hiddenEffects xmlns:a14="http://schemas.microsoft.com/office/drawing/2010/main" xmlns="">
                   <a:effectLst>
                     <a:outerShdw blurRad="63500" dist="38099" dir="2700000" algn="ctr" rotWithShape="0">
                       <a:schemeClr val="bg2">
@@ -32971,7 +31977,7 @@
             <a:effectLst/>
             <a:extLst>
               <a:ext uri="{AF507438-7753-43e0-B8FC-AC1667EBCBE1}">
-                <a14:hiddenEffects xmlns="" xmlns:a14="http://schemas.microsoft.com/office/drawing/2010/main">
+                <a14:hiddenEffects xmlns:a14="http://schemas.microsoft.com/office/drawing/2010/main" xmlns="">
                   <a:effectLst>
                     <a:outerShdw blurRad="63500" dist="38099" dir="2700000" algn="ctr" rotWithShape="0">
                       <a:schemeClr val="bg2">
@@ -33071,7 +32077,7 @@
             <a:effectLst/>
             <a:extLst>
               <a:ext uri="{AF507438-7753-43e0-B8FC-AC1667EBCBE1}">
-                <a14:hiddenEffects xmlns="" xmlns:a14="http://schemas.microsoft.com/office/drawing/2010/main">
+                <a14:hiddenEffects xmlns:a14="http://schemas.microsoft.com/office/drawing/2010/main" xmlns="">
                   <a:effectLst>
                     <a:outerShdw blurRad="63500" dist="38099" dir="2700000" algn="ctr" rotWithShape="0">
                       <a:schemeClr val="bg2">
@@ -33163,7 +32169,7 @@
             <a:effectLst/>
             <a:extLst>
               <a:ext uri="{AF507438-7753-43e0-B8FC-AC1667EBCBE1}">
-                <a14:hiddenEffects xmlns="" xmlns:a14="http://schemas.microsoft.com/office/drawing/2010/main">
+                <a14:hiddenEffects xmlns:a14="http://schemas.microsoft.com/office/drawing/2010/main" xmlns="">
                   <a:effectLst>
                     <a:outerShdw blurRad="63500" dist="38099" dir="2700000" algn="ctr" rotWithShape="0">
                       <a:schemeClr val="bg2">
@@ -33255,7 +32261,7 @@
             <a:effectLst/>
             <a:extLst>
               <a:ext uri="{AF507438-7753-43e0-B8FC-AC1667EBCBE1}">
-                <a14:hiddenEffects xmlns="" xmlns:a14="http://schemas.microsoft.com/office/drawing/2010/main">
+                <a14:hiddenEffects xmlns:a14="http://schemas.microsoft.com/office/drawing/2010/main" xmlns="">
                   <a:effectLst>
                     <a:outerShdw blurRad="63500" dist="38099" dir="2700000" algn="ctr" rotWithShape="0">
                       <a:schemeClr val="bg2">
@@ -33347,7 +32353,7 @@
             <a:effectLst/>
             <a:extLst>
               <a:ext uri="{AF507438-7753-43e0-B8FC-AC1667EBCBE1}">
-                <a14:hiddenEffects xmlns="" xmlns:a14="http://schemas.microsoft.com/office/drawing/2010/main">
+                <a14:hiddenEffects xmlns:a14="http://schemas.microsoft.com/office/drawing/2010/main" xmlns="">
                   <a:effectLst>
                     <a:outerShdw blurRad="63500" dist="38099" dir="2700000" algn="ctr" rotWithShape="0">
                       <a:schemeClr val="bg2">
@@ -33439,7 +32445,7 @@
             <a:effectLst/>
             <a:extLst>
               <a:ext uri="{AF507438-7753-43e0-B8FC-AC1667EBCBE1}">
-                <a14:hiddenEffects xmlns="" xmlns:a14="http://schemas.microsoft.com/office/drawing/2010/main">
+                <a14:hiddenEffects xmlns:a14="http://schemas.microsoft.com/office/drawing/2010/main" xmlns="">
                   <a:effectLst>
                     <a:outerShdw blurRad="63500" dist="38099" dir="2700000" algn="ctr" rotWithShape="0">
                       <a:schemeClr val="bg2">
@@ -33531,7 +32537,7 @@
             <a:effectLst/>
             <a:extLst>
               <a:ext uri="{AF507438-7753-43e0-B8FC-AC1667EBCBE1}">
-                <a14:hiddenEffects xmlns="" xmlns:a14="http://schemas.microsoft.com/office/drawing/2010/main">
+                <a14:hiddenEffects xmlns:a14="http://schemas.microsoft.com/office/drawing/2010/main" xmlns="">
                   <a:effectLst>
                     <a:outerShdw blurRad="63500" dist="38099" dir="2700000" algn="ctr" rotWithShape="0">
                       <a:schemeClr val="bg2">
@@ -33612,7 +32618,7 @@
             <a:lstStyle/>
             <a:p>
               <a:r>
-                <a:rPr lang="en-GB" dirty="0" err="1" smtClean="0">
+                <a:rPr lang="en-GB" dirty="0" smtClean="0">
                   <a:latin typeface="Courier New" panose="02070309020205020404" pitchFamily="49" charset="0"/>
                   <a:ea typeface="ＭＳ Ｐゴシック" charset="0"/>
                   <a:cs typeface="Courier New" panose="02070309020205020404" pitchFamily="49" charset="0"/>
@@ -33650,7 +32656,7 @@
             <a:effectLst/>
             <a:extLst>
               <a:ext uri="{AF507438-7753-43e0-B8FC-AC1667EBCBE1}">
-                <a14:hiddenEffects xmlns="" xmlns:a14="http://schemas.microsoft.com/office/drawing/2010/main">
+                <a14:hiddenEffects xmlns:a14="http://schemas.microsoft.com/office/drawing/2010/main" xmlns="">
                   <a:effectLst>
                     <a:outerShdw blurRad="63500" dist="38099" dir="2700000" algn="ctr" rotWithShape="0">
                       <a:schemeClr val="bg2">
@@ -33686,7 +32692,7 @@
                 <a:buNone/>
                 <a:tabLst/>
               </a:pPr>
-              <a:endParaRPr kumimoji="0" lang="en-GB" sz="2400" b="0" i="0" u="none" strike="noStrike" cap="none" normalizeH="0" baseline="0">
+              <a:endParaRPr kumimoji="0" lang="en-GB" sz="2400" b="0" i="0" u="none" strike="noStrike" cap="none" normalizeH="0" baseline="0" dirty="0">
                 <a:ln>
                   <a:noFill/>
                 </a:ln>
@@ -33727,7 +32733,7 @@
             <a:effectLst/>
             <a:extLst>
               <a:ext uri="{AF507438-7753-43e0-B8FC-AC1667EBCBE1}">
-                <a14:hiddenEffects xmlns="" xmlns:a14="http://schemas.microsoft.com/office/drawing/2010/main">
+                <a14:hiddenEffects xmlns:a14="http://schemas.microsoft.com/office/drawing/2010/main" xmlns="">
                   <a:effectLst>
                     <a:outerShdw blurRad="63500" dist="38099" dir="2700000" algn="ctr" rotWithShape="0">
                       <a:schemeClr val="bg2">
@@ -33763,7 +32769,7 @@
                 <a:buNone/>
                 <a:tabLst/>
               </a:pPr>
-              <a:endParaRPr kumimoji="0" lang="en-GB" sz="2400" b="0" i="0" u="none" strike="noStrike" cap="none" normalizeH="0" baseline="0">
+              <a:endParaRPr kumimoji="0" lang="en-GB" sz="2400" b="0" i="0" u="none" strike="noStrike" cap="none" normalizeH="0" baseline="0" dirty="0">
                 <a:ln>
                   <a:noFill/>
                 </a:ln>
@@ -33804,7 +32810,7 @@
             <a:effectLst/>
             <a:extLst>
               <a:ext uri="{AF507438-7753-43e0-B8FC-AC1667EBCBE1}">
-                <a14:hiddenEffects xmlns="" xmlns:a14="http://schemas.microsoft.com/office/drawing/2010/main">
+                <a14:hiddenEffects xmlns:a14="http://schemas.microsoft.com/office/drawing/2010/main" xmlns="">
                   <a:effectLst>
                     <a:outerShdw blurRad="63500" dist="38099" dir="2700000" algn="ctr" rotWithShape="0">
                       <a:schemeClr val="bg2">
@@ -33840,7 +32846,7 @@
                 <a:buNone/>
                 <a:tabLst/>
               </a:pPr>
-              <a:endParaRPr kumimoji="0" lang="en-GB" sz="2400" b="0" i="0" u="none" strike="noStrike" cap="none" normalizeH="0" baseline="0">
+              <a:endParaRPr kumimoji="0" lang="en-GB" sz="2400" b="0" i="0" u="none" strike="noStrike" cap="none" normalizeH="0" baseline="0" dirty="0">
                 <a:ln>
                   <a:noFill/>
                 </a:ln>
@@ -33886,7 +32892,7 @@
             <a:effectLst/>
             <a:extLst>
               <a:ext uri="{AF507438-7753-43e0-B8FC-AC1667EBCBE1}">
-                <a14:hiddenEffects xmlns="" xmlns:a14="http://schemas.microsoft.com/office/drawing/2010/main">
+                <a14:hiddenEffects xmlns:a14="http://schemas.microsoft.com/office/drawing/2010/main" xmlns="">
                   <a:effectLst>
                     <a:outerShdw blurRad="63500" dist="38099" dir="2700000" algn="ctr" rotWithShape="0">
                       <a:schemeClr val="bg2">
@@ -33931,7 +32937,7 @@
             <a:effectLst/>
             <a:extLst>
               <a:ext uri="{AF507438-7753-43e0-B8FC-AC1667EBCBE1}">
-                <a14:hiddenEffects xmlns="" xmlns:a14="http://schemas.microsoft.com/office/drawing/2010/main">
+                <a14:hiddenEffects xmlns:a14="http://schemas.microsoft.com/office/drawing/2010/main" xmlns="">
                   <a:effectLst>
                     <a:outerShdw blurRad="63500" dist="38099" dir="2700000" algn="ctr" rotWithShape="0">
                       <a:schemeClr val="bg2">
@@ -33976,7 +32982,7 @@
             <a:effectLst/>
             <a:extLst>
               <a:ext uri="{AF507438-7753-43e0-B8FC-AC1667EBCBE1}">
-                <a14:hiddenEffects xmlns="" xmlns:a14="http://schemas.microsoft.com/office/drawing/2010/main">
+                <a14:hiddenEffects xmlns:a14="http://schemas.microsoft.com/office/drawing/2010/main" xmlns="">
                   <a:effectLst>
                     <a:outerShdw blurRad="63500" dist="38099" dir="2700000" algn="ctr" rotWithShape="0">
                       <a:schemeClr val="bg2">
@@ -34021,7 +33027,7 @@
             <a:effectLst/>
             <a:extLst>
               <a:ext uri="{AF507438-7753-43e0-B8FC-AC1667EBCBE1}">
-                <a14:hiddenEffects xmlns="" xmlns:a14="http://schemas.microsoft.com/office/drawing/2010/main">
+                <a14:hiddenEffects xmlns:a14="http://schemas.microsoft.com/office/drawing/2010/main" xmlns="">
                   <a:effectLst>
                     <a:outerShdw blurRad="63500" dist="38099" dir="2700000" algn="ctr" rotWithShape="0">
                       <a:schemeClr val="bg2">
@@ -34858,47 +33864,17 @@
                 <a:latin typeface="Arial" panose="020B0604020202020204"/>
                 <a:cs typeface="Courier New" panose="02070309020205020404" pitchFamily="49" charset="0"/>
               </a:rPr>
-              <a:t>on CPUs using </a:t>
-            </a:r>
-            <a:r>
-              <a:rPr lang="en-GB" sz="1400" dirty="0" err="1">
+              <a:t>on CPUs using OpenMP</a:t>
+            </a:r>
+            <a:r>
+              <a:rPr lang="en-GB" sz="1400" dirty="0" smtClean="0">
                 <a:solidFill>
                   <a:srgbClr val="C2470C"/>
                 </a:solidFill>
                 <a:latin typeface="Arial" panose="020B0604020202020204"/>
                 <a:cs typeface="Courier New" panose="02070309020205020404" pitchFamily="49" charset="0"/>
               </a:rPr>
-              <a:t>OpenMP</a:t>
-            </a:r>
-            <a:r>
-              <a:rPr lang="en-GB" sz="1400" dirty="0" smtClean="0">
-                <a:solidFill>
-                  <a:srgbClr val="C2470C"/>
-                </a:solidFill>
-                <a:latin typeface="Arial" panose="020B0604020202020204"/>
-                <a:cs typeface="Courier New" panose="02070309020205020404" pitchFamily="49" charset="0"/>
-              </a:rPr>
-              <a:t>. You will learn about parallelism and concurrency. You will get to know </a:t>
-            </a:r>
-            <a:r>
-              <a:rPr lang="en-GB" sz="1400" dirty="0" err="1" smtClean="0">
-                <a:solidFill>
-                  <a:srgbClr val="C2470C"/>
-                </a:solidFill>
-                <a:latin typeface="Arial" panose="020B0604020202020204"/>
-                <a:cs typeface="Courier New" panose="02070309020205020404" pitchFamily="49" charset="0"/>
-              </a:rPr>
-              <a:t>OpenMP</a:t>
-            </a:r>
-            <a:r>
-              <a:rPr lang="en-GB" sz="1400" dirty="0" smtClean="0">
-                <a:solidFill>
-                  <a:srgbClr val="C2470C"/>
-                </a:solidFill>
-                <a:latin typeface="Arial" panose="020B0604020202020204"/>
-                <a:cs typeface="Courier New" panose="02070309020205020404" pitchFamily="49" charset="0"/>
-              </a:rPr>
-              <a:t> and how to use it to share work across cores in a CPU and across CPUs in a server.</a:t>
+              <a:t>. You will learn about parallelism and concurrency. You will get to know OpenMP and how to use it to share work across cores in a CPU and across CPUs in a server.</a:t>
             </a:r>
           </a:p>
         </p:txBody>
@@ -35242,7 +34218,7 @@
             <a:effectLst/>
             <a:extLst>
               <a:ext uri="{AF507438-7753-43e0-B8FC-AC1667EBCBE1}">
-                <a14:hiddenEffects xmlns="" xmlns:a14="http://schemas.microsoft.com/office/drawing/2010/main">
+                <a14:hiddenEffects xmlns:a14="http://schemas.microsoft.com/office/drawing/2010/main" xmlns="">
                   <a:effectLst>
                     <a:outerShdw blurRad="63500" dist="38099" dir="2700000" algn="ctr" rotWithShape="0">
                       <a:schemeClr val="bg2">
@@ -35341,7 +34317,7 @@
             <a:effectLst/>
             <a:extLst>
               <a:ext uri="{AF507438-7753-43e0-B8FC-AC1667EBCBE1}">
-                <a14:hiddenEffects xmlns="" xmlns:a14="http://schemas.microsoft.com/office/drawing/2010/main">
+                <a14:hiddenEffects xmlns:a14="http://schemas.microsoft.com/office/drawing/2010/main" xmlns="">
                   <a:effectLst>
                     <a:outerShdw blurRad="63500" dist="38099" dir="2700000" algn="ctr" rotWithShape="0">
                       <a:schemeClr val="bg2">
@@ -35440,7 +34416,7 @@
             <a:effectLst/>
             <a:extLst>
               <a:ext uri="{AF507438-7753-43e0-B8FC-AC1667EBCBE1}">
-                <a14:hiddenEffects xmlns="" xmlns:a14="http://schemas.microsoft.com/office/drawing/2010/main">
+                <a14:hiddenEffects xmlns:a14="http://schemas.microsoft.com/office/drawing/2010/main" xmlns="">
                   <a:effectLst>
                     <a:outerShdw blurRad="63500" dist="38099" dir="2700000" algn="ctr" rotWithShape="0">
                       <a:schemeClr val="bg2">
@@ -35539,7 +34515,7 @@
             <a:effectLst/>
             <a:extLst>
               <a:ext uri="{AF507438-7753-43e0-B8FC-AC1667EBCBE1}">
-                <a14:hiddenEffects xmlns="" xmlns:a14="http://schemas.microsoft.com/office/drawing/2010/main">
+                <a14:hiddenEffects xmlns:a14="http://schemas.microsoft.com/office/drawing/2010/main" xmlns="">
                   <a:effectLst>
                     <a:outerShdw blurRad="63500" dist="38099" dir="2700000" algn="ctr" rotWithShape="0">
                       <a:schemeClr val="bg2">
@@ -35625,7 +34601,7 @@
             <a:effectLst/>
             <a:extLst>
               <a:ext uri="{AF507438-7753-43e0-B8FC-AC1667EBCBE1}">
-                <a14:hiddenEffects xmlns="" xmlns:a14="http://schemas.microsoft.com/office/drawing/2010/main">
+                <a14:hiddenEffects xmlns:a14="http://schemas.microsoft.com/office/drawing/2010/main" xmlns="">
                   <a:effectLst>
                     <a:outerShdw blurRad="63500" dist="38099" dir="2700000" algn="ctr" rotWithShape="0">
                       <a:schemeClr val="bg2">
@@ -35661,7 +34637,7 @@
                 <a:buNone/>
                 <a:tabLst/>
               </a:pPr>
-              <a:endParaRPr kumimoji="0" lang="en-GB" sz="2000" b="0" i="0" u="none" strike="noStrike" cap="none" normalizeH="0" baseline="0">
+              <a:endParaRPr kumimoji="0" lang="en-GB" sz="2000" b="0" i="0" u="none" strike="noStrike" cap="none" normalizeH="0" baseline="0" dirty="0">
                 <a:ln>
                   <a:noFill/>
                 </a:ln>
@@ -35703,7 +34679,7 @@
             <a:effectLst/>
             <a:extLst>
               <a:ext uri="{AF507438-7753-43e0-B8FC-AC1667EBCBE1}">
-                <a14:hiddenEffects xmlns="" xmlns:a14="http://schemas.microsoft.com/office/drawing/2010/main">
+                <a14:hiddenEffects xmlns:a14="http://schemas.microsoft.com/office/drawing/2010/main" xmlns="">
                   <a:effectLst>
                     <a:outerShdw blurRad="63500" dist="38099" dir="2700000" algn="ctr" rotWithShape="0">
                       <a:schemeClr val="bg2">
@@ -35739,7 +34715,7 @@
                 <a:buNone/>
                 <a:tabLst/>
               </a:pPr>
-              <a:endParaRPr kumimoji="0" lang="en-GB" sz="2000" b="0" i="0" u="none" strike="noStrike" cap="none" normalizeH="0" baseline="0">
+              <a:endParaRPr kumimoji="0" lang="en-GB" sz="2000" b="0" i="0" u="none" strike="noStrike" cap="none" normalizeH="0" baseline="0" dirty="0">
                 <a:ln>
                   <a:noFill/>
                 </a:ln>
@@ -35781,7 +34757,7 @@
             <a:effectLst/>
             <a:extLst>
               <a:ext uri="{AF507438-7753-43e0-B8FC-AC1667EBCBE1}">
-                <a14:hiddenEffects xmlns="" xmlns:a14="http://schemas.microsoft.com/office/drawing/2010/main">
+                <a14:hiddenEffects xmlns:a14="http://schemas.microsoft.com/office/drawing/2010/main" xmlns="">
                   <a:effectLst>
                     <a:outerShdw blurRad="63500" dist="38099" dir="2700000" algn="ctr" rotWithShape="0">
                       <a:schemeClr val="bg2">
@@ -35817,7 +34793,7 @@
                 <a:buNone/>
                 <a:tabLst/>
               </a:pPr>
-              <a:endParaRPr kumimoji="0" lang="en-GB" sz="2000" b="0" i="0" u="none" strike="noStrike" cap="none" normalizeH="0" baseline="0">
+              <a:endParaRPr kumimoji="0" lang="en-GB" sz="2000" b="0" i="0" u="none" strike="noStrike" cap="none" normalizeH="0" baseline="0" dirty="0">
                 <a:ln>
                   <a:noFill/>
                 </a:ln>
@@ -35946,7 +34922,7 @@
             <a:p>
               <a:pPr algn="ctr"/>
               <a:r>
-                <a:rPr lang="en-GB" sz="1600" dirty="0" err="1">
+                <a:rPr lang="en-GB" sz="1600" dirty="0">
                   <a:solidFill>
                     <a:srgbClr val="000000"/>
                   </a:solidFill>
@@ -35957,17 +34933,6 @@
                 <a:t>i</a:t>
               </a:r>
               <a:r>
-                <a:rPr lang="en-GB" sz="1600" dirty="0" err="1" smtClean="0">
-                  <a:solidFill>
-                    <a:srgbClr val="000000"/>
-                  </a:solidFill>
-                  <a:latin typeface="Courier New" panose="02070309020205020404" pitchFamily="49" charset="0"/>
-                  <a:ea typeface="ＭＳ Ｐゴシック" charset="0"/>
-                  <a:cs typeface="Courier New" panose="02070309020205020404" pitchFamily="49" charset="0"/>
-                </a:rPr>
-                <a:t>nt</a:t>
-              </a:r>
-              <a:r>
                 <a:rPr lang="en-GB" sz="1600" dirty="0" smtClean="0">
                   <a:solidFill>
                     <a:srgbClr val="000000"/>
@@ -35976,7 +34941,7 @@
                   <a:ea typeface="ＭＳ Ｐゴシック" charset="0"/>
                   <a:cs typeface="Courier New" panose="02070309020205020404" pitchFamily="49" charset="0"/>
                 </a:rPr>
-                <a:t> array[n]</a:t>
+                <a:t>nt array[n]</a:t>
               </a:r>
               <a:endParaRPr lang="en-GB" sz="1600" dirty="0">
                 <a:solidFill>
@@ -36176,7 +35141,7 @@
           <a:p>
             <a:pPr algn="ctr"/>
             <a:r>
-              <a:rPr lang="en-GB" sz="1400" dirty="0" err="1">
+              <a:rPr lang="en-GB" sz="1400" dirty="0">
                 <a:solidFill>
                   <a:srgbClr val="000000"/>
                 </a:solidFill>
@@ -36184,18 +35149,7 @@
                 <a:ea typeface="ＭＳ Ｐゴシック" charset="0"/>
                 <a:cs typeface="Courier New" panose="02070309020205020404" pitchFamily="49" charset="0"/>
               </a:rPr>
-              <a:t>int</a:t>
-            </a:r>
-            <a:r>
-              <a:rPr lang="en-GB" sz="1400" dirty="0">
-                <a:solidFill>
-                  <a:srgbClr val="000000"/>
-                </a:solidFill>
-                <a:latin typeface="Courier New" panose="02070309020205020404" pitchFamily="49" charset="0"/>
-                <a:ea typeface="ＭＳ Ｐゴシック" charset="0"/>
-                <a:cs typeface="Courier New" panose="02070309020205020404" pitchFamily="49" charset="0"/>
-              </a:rPr>
-              <a:t> identity[3][3]</a:t>
+              <a:t>int identity[3][3]</a:t>
             </a:r>
           </a:p>
           <a:p>
@@ -36210,21 +35164,7 @@
                 <a:latin typeface="+mn-lt"/>
                 <a:cs typeface="Courier New" panose="02070309020205020404" pitchFamily="49" charset="0"/>
               </a:rPr>
-              <a:t>In C this would tell the compiler to create a linear contiguous area in memory to hold 3x3 = 9 </a:t>
-            </a:r>
-            <a:r>
-              <a:rPr lang="en-GB" sz="1400" dirty="0" err="1" smtClean="0">
-                <a:latin typeface="+mn-lt"/>
-                <a:cs typeface="Courier New" panose="02070309020205020404" pitchFamily="49" charset="0"/>
-              </a:rPr>
-              <a:t>ints</a:t>
-            </a:r>
-            <a:r>
-              <a:rPr lang="en-GB" sz="1400" dirty="0" smtClean="0">
-                <a:latin typeface="+mn-lt"/>
-                <a:cs typeface="Courier New" panose="02070309020205020404" pitchFamily="49" charset="0"/>
-              </a:rPr>
-              <a:t>.</a:t>
+              <a:t>In C this would tell the compiler to create a linear contiguous area in memory to hold 3x3 = 9 ints.</a:t>
             </a:r>
           </a:p>
           <a:p>
@@ -36501,19 +35441,7 @@
               <a:rPr lang="en-GB" sz="900" dirty="0">
                 <a:latin typeface="+mn-lt"/>
               </a:rPr>
-              <a:t>By </a:t>
-            </a:r>
-            <a:r>
-              <a:rPr lang="en-GB" sz="900" dirty="0" err="1">
-                <a:latin typeface="+mn-lt"/>
-              </a:rPr>
-              <a:t>Cmglee</a:t>
-            </a:r>
-            <a:r>
-              <a:rPr lang="en-GB" sz="900" dirty="0">
-                <a:latin typeface="+mn-lt"/>
-              </a:rPr>
-              <a:t> [CC BY-SA 4.0 (https://creativecommons.org/licenses/by-sa/4.0) or GFDL (http://www.gnu.org/copyleft/fdl.html)], from Wikimedia Commons</a:t>
+              <a:t>By Cmglee [CC BY-SA 4.0 (https://creativecommons.org/licenses/by-sa/4.0) or GFDL (http://www.gnu.org/copyleft/fdl.html)], from Wikimedia Commons</a:t>
             </a:r>
           </a:p>
         </p:txBody>
@@ -36714,7 +35642,7 @@
             <a:effectLst/>
             <a:extLst>
               <a:ext uri="{AF507438-7753-43e0-B8FC-AC1667EBCBE1}">
-                <a14:hiddenEffects xmlns="" xmlns:a14="http://schemas.microsoft.com/office/drawing/2010/main">
+                <a14:hiddenEffects xmlns:a14="http://schemas.microsoft.com/office/drawing/2010/main" xmlns="">
                   <a:effectLst>
                     <a:outerShdw blurRad="63500" dist="38099" dir="2700000" algn="ctr" rotWithShape="0">
                       <a:schemeClr val="bg2">
@@ -36813,7 +35741,7 @@
             <a:effectLst/>
             <a:extLst>
               <a:ext uri="{AF507438-7753-43e0-B8FC-AC1667EBCBE1}">
-                <a14:hiddenEffects xmlns="" xmlns:a14="http://schemas.microsoft.com/office/drawing/2010/main">
+                <a14:hiddenEffects xmlns:a14="http://schemas.microsoft.com/office/drawing/2010/main" xmlns="">
                   <a:effectLst>
                     <a:outerShdw blurRad="63500" dist="38099" dir="2700000" algn="ctr" rotWithShape="0">
                       <a:schemeClr val="bg2">
@@ -36905,7 +35833,7 @@
             <a:effectLst/>
             <a:extLst>
               <a:ext uri="{AF507438-7753-43e0-B8FC-AC1667EBCBE1}">
-                <a14:hiddenEffects xmlns="" xmlns:a14="http://schemas.microsoft.com/office/drawing/2010/main">
+                <a14:hiddenEffects xmlns:a14="http://schemas.microsoft.com/office/drawing/2010/main" xmlns="">
                   <a:effectLst>
                     <a:outerShdw blurRad="63500" dist="38099" dir="2700000" algn="ctr" rotWithShape="0">
                       <a:schemeClr val="bg2">
@@ -36991,7 +35919,7 @@
             <a:effectLst/>
             <a:extLst>
               <a:ext uri="{AF507438-7753-43e0-B8FC-AC1667EBCBE1}">
-                <a14:hiddenEffects xmlns="" xmlns:a14="http://schemas.microsoft.com/office/drawing/2010/main">
+                <a14:hiddenEffects xmlns:a14="http://schemas.microsoft.com/office/drawing/2010/main" xmlns="">
                   <a:effectLst>
                     <a:outerShdw blurRad="63500" dist="38099" dir="2700000" algn="ctr" rotWithShape="0">
                       <a:schemeClr val="bg2">
@@ -37027,7 +35955,7 @@
                 <a:buNone/>
                 <a:tabLst/>
               </a:pPr>
-              <a:endParaRPr kumimoji="0" lang="en-GB" sz="2000" b="0" i="0" u="none" strike="noStrike" cap="none" normalizeH="0" baseline="0">
+              <a:endParaRPr kumimoji="0" lang="en-GB" sz="2000" b="0" i="0" u="none" strike="noStrike" cap="none" normalizeH="0" baseline="0" dirty="0">
                 <a:ln>
                   <a:noFill/>
                 </a:ln>
@@ -37069,7 +35997,7 @@
             <a:effectLst/>
             <a:extLst>
               <a:ext uri="{AF507438-7753-43e0-B8FC-AC1667EBCBE1}">
-                <a14:hiddenEffects xmlns="" xmlns:a14="http://schemas.microsoft.com/office/drawing/2010/main">
+                <a14:hiddenEffects xmlns:a14="http://schemas.microsoft.com/office/drawing/2010/main" xmlns="">
                   <a:effectLst>
                     <a:outerShdw blurRad="63500" dist="38099" dir="2700000" algn="ctr" rotWithShape="0">
                       <a:schemeClr val="bg2">
@@ -37105,7 +36033,7 @@
                 <a:buNone/>
                 <a:tabLst/>
               </a:pPr>
-              <a:endParaRPr kumimoji="0" lang="en-GB" sz="2000" b="0" i="0" u="none" strike="noStrike" cap="none" normalizeH="0" baseline="0">
+              <a:endParaRPr kumimoji="0" lang="en-GB" sz="2000" b="0" i="0" u="none" strike="noStrike" cap="none" normalizeH="0" baseline="0" dirty="0">
                 <a:ln>
                   <a:noFill/>
                 </a:ln>
@@ -37189,7 +36117,7 @@
             <a:p>
               <a:pPr algn="ctr"/>
               <a:r>
-                <a:rPr lang="en-GB" sz="1600" dirty="0" err="1">
+                <a:rPr lang="en-GB" sz="1600" dirty="0">
                   <a:solidFill>
                     <a:srgbClr val="000000"/>
                   </a:solidFill>
@@ -37200,17 +36128,6 @@
                 <a:t>i</a:t>
               </a:r>
               <a:r>
-                <a:rPr lang="en-GB" sz="1600" dirty="0" err="1" smtClean="0">
-                  <a:solidFill>
-                    <a:srgbClr val="000000"/>
-                  </a:solidFill>
-                  <a:latin typeface="Courier New" panose="02070309020205020404" pitchFamily="49" charset="0"/>
-                  <a:ea typeface="ＭＳ Ｐゴシック" charset="0"/>
-                  <a:cs typeface="Courier New" panose="02070309020205020404" pitchFamily="49" charset="0"/>
-                </a:rPr>
-                <a:t>nt</a:t>
-              </a:r>
-              <a:r>
                 <a:rPr lang="en-GB" sz="1600" dirty="0" smtClean="0">
                   <a:solidFill>
                     <a:srgbClr val="000000"/>
@@ -37219,7 +36136,7 @@
                   <a:ea typeface="ＭＳ Ｐゴシック" charset="0"/>
                   <a:cs typeface="Courier New" panose="02070309020205020404" pitchFamily="49" charset="0"/>
                 </a:rPr>
-                <a:t> identity[3][3]</a:t>
+                <a:t>nt identity[3][3]</a:t>
               </a:r>
               <a:endParaRPr lang="en-GB" sz="1600" dirty="0">
                 <a:solidFill>
@@ -37265,7 +36182,7 @@
             <a:effectLst/>
             <a:extLst>
               <a:ext uri="{AF507438-7753-43e0-B8FC-AC1667EBCBE1}">
-                <a14:hiddenEffects xmlns="" xmlns:a14="http://schemas.microsoft.com/office/drawing/2010/main">
+                <a14:hiddenEffects xmlns:a14="http://schemas.microsoft.com/office/drawing/2010/main" xmlns="">
                   <a:effectLst>
                     <a:outerShdw blurRad="63500" dist="38099" dir="2700000" algn="ctr" rotWithShape="0">
                       <a:schemeClr val="bg2">
@@ -37357,7 +36274,7 @@
             <a:effectLst/>
             <a:extLst>
               <a:ext uri="{AF507438-7753-43e0-B8FC-AC1667EBCBE1}">
-                <a14:hiddenEffects xmlns="" xmlns:a14="http://schemas.microsoft.com/office/drawing/2010/main">
+                <a14:hiddenEffects xmlns:a14="http://schemas.microsoft.com/office/drawing/2010/main" xmlns="">
                   <a:effectLst>
                     <a:outerShdw blurRad="63500" dist="38099" dir="2700000" algn="ctr" rotWithShape="0">
                       <a:schemeClr val="bg2">
@@ -37449,7 +36366,7 @@
             <a:effectLst/>
             <a:extLst>
               <a:ext uri="{AF507438-7753-43e0-B8FC-AC1667EBCBE1}">
-                <a14:hiddenEffects xmlns="" xmlns:a14="http://schemas.microsoft.com/office/drawing/2010/main">
+                <a14:hiddenEffects xmlns:a14="http://schemas.microsoft.com/office/drawing/2010/main" xmlns="">
                   <a:effectLst>
                     <a:outerShdw blurRad="63500" dist="38099" dir="2700000" algn="ctr" rotWithShape="0">
                       <a:schemeClr val="bg2">
@@ -37541,7 +36458,7 @@
             <a:effectLst/>
             <a:extLst>
               <a:ext uri="{AF507438-7753-43e0-B8FC-AC1667EBCBE1}">
-                <a14:hiddenEffects xmlns="" xmlns:a14="http://schemas.microsoft.com/office/drawing/2010/main">
+                <a14:hiddenEffects xmlns:a14="http://schemas.microsoft.com/office/drawing/2010/main" xmlns="">
                   <a:effectLst>
                     <a:outerShdw blurRad="63500" dist="38099" dir="2700000" algn="ctr" rotWithShape="0">
                       <a:schemeClr val="bg2">
@@ -37640,7 +36557,7 @@
             <a:effectLst/>
             <a:extLst>
               <a:ext uri="{AF507438-7753-43e0-B8FC-AC1667EBCBE1}">
-                <a14:hiddenEffects xmlns="" xmlns:a14="http://schemas.microsoft.com/office/drawing/2010/main">
+                <a14:hiddenEffects xmlns:a14="http://schemas.microsoft.com/office/drawing/2010/main" xmlns="">
                   <a:effectLst>
                     <a:outerShdw blurRad="63500" dist="38099" dir="2700000" algn="ctr" rotWithShape="0">
                       <a:schemeClr val="bg2">
@@ -37732,7 +36649,7 @@
             <a:effectLst/>
             <a:extLst>
               <a:ext uri="{AF507438-7753-43e0-B8FC-AC1667EBCBE1}">
-                <a14:hiddenEffects xmlns="" xmlns:a14="http://schemas.microsoft.com/office/drawing/2010/main">
+                <a14:hiddenEffects xmlns:a14="http://schemas.microsoft.com/office/drawing/2010/main" xmlns="">
                   <a:effectLst>
                     <a:outerShdw blurRad="63500" dist="38099" dir="2700000" algn="ctr" rotWithShape="0">
                       <a:schemeClr val="bg2">
@@ -37818,7 +36735,7 @@
             <a:effectLst/>
             <a:extLst>
               <a:ext uri="{AF507438-7753-43e0-B8FC-AC1667EBCBE1}">
-                <a14:hiddenEffects xmlns="" xmlns:a14="http://schemas.microsoft.com/office/drawing/2010/main">
+                <a14:hiddenEffects xmlns:a14="http://schemas.microsoft.com/office/drawing/2010/main" xmlns="">
                   <a:effectLst>
                     <a:outerShdw blurRad="63500" dist="38099" dir="2700000" algn="ctr" rotWithShape="0">
                       <a:schemeClr val="bg2">
@@ -37854,7 +36771,7 @@
                 <a:buNone/>
                 <a:tabLst/>
               </a:pPr>
-              <a:endParaRPr kumimoji="0" lang="en-GB" sz="2000" b="0" i="0" u="none" strike="noStrike" cap="none" normalizeH="0" baseline="0">
+              <a:endParaRPr kumimoji="0" lang="en-GB" sz="2000" b="0" i="0" u="none" strike="noStrike" cap="none" normalizeH="0" baseline="0" dirty="0">
                 <a:ln>
                   <a:noFill/>
                 </a:ln>
@@ -37941,7 +36858,7 @@
             <a:effectLst/>
             <a:extLst>
               <a:ext uri="{AF507438-7753-43e0-B8FC-AC1667EBCBE1}">
-                <a14:hiddenEffects xmlns="" xmlns:a14="http://schemas.microsoft.com/office/drawing/2010/main">
+                <a14:hiddenEffects xmlns:a14="http://schemas.microsoft.com/office/drawing/2010/main" xmlns="">
                   <a:effectLst>
                     <a:outerShdw blurRad="63500" dist="38099" dir="2700000" algn="ctr" rotWithShape="0">
                       <a:schemeClr val="bg2">
@@ -37977,7 +36894,7 @@
                 <a:buNone/>
                 <a:tabLst/>
               </a:pPr>
-              <a:endParaRPr kumimoji="0" lang="en-GB" sz="2000" b="0" i="0" u="none" strike="noStrike" cap="none" normalizeH="0" baseline="0">
+              <a:endParaRPr kumimoji="0" lang="en-GB" sz="2000" b="0" i="0" u="none" strike="noStrike" cap="none" normalizeH="0" baseline="0" dirty="0">
                 <a:ln>
                   <a:noFill/>
                 </a:ln>
@@ -38064,7 +36981,7 @@
             <a:effectLst/>
             <a:extLst>
               <a:ext uri="{AF507438-7753-43e0-B8FC-AC1667EBCBE1}">
-                <a14:hiddenEffects xmlns="" xmlns:a14="http://schemas.microsoft.com/office/drawing/2010/main">
+                <a14:hiddenEffects xmlns:a14="http://schemas.microsoft.com/office/drawing/2010/main" xmlns="">
                   <a:effectLst>
                     <a:outerShdw blurRad="63500" dist="38099" dir="2700000" algn="ctr" rotWithShape="0">
                       <a:schemeClr val="bg2">
@@ -38100,7 +37017,7 @@
                 <a:buNone/>
                 <a:tabLst/>
               </a:pPr>
-              <a:endParaRPr kumimoji="0" lang="en-GB" sz="2000" b="0" i="0" u="none" strike="noStrike" cap="none" normalizeH="0" baseline="0">
+              <a:endParaRPr kumimoji="0" lang="en-GB" sz="2000" b="0" i="0" u="none" strike="noStrike" cap="none" normalizeH="0" baseline="0" dirty="0">
                 <a:ln>
                   <a:noFill/>
                 </a:ln>
@@ -38187,7 +37104,7 @@
             <a:effectLst/>
             <a:extLst>
               <a:ext uri="{AF507438-7753-43e0-B8FC-AC1667EBCBE1}">
-                <a14:hiddenEffects xmlns="" xmlns:a14="http://schemas.microsoft.com/office/drawing/2010/main">
+                <a14:hiddenEffects xmlns:a14="http://schemas.microsoft.com/office/drawing/2010/main" xmlns="">
                   <a:effectLst>
                     <a:outerShdw blurRad="63500" dist="38099" dir="2700000" algn="ctr" rotWithShape="0">
                       <a:schemeClr val="bg2">
@@ -38223,7 +37140,7 @@
                 <a:buNone/>
                 <a:tabLst/>
               </a:pPr>
-              <a:endParaRPr kumimoji="0" lang="en-GB" sz="2000" b="0" i="0" u="none" strike="noStrike" cap="none" normalizeH="0" baseline="0">
+              <a:endParaRPr kumimoji="0" lang="en-GB" sz="2000" b="0" i="0" u="none" strike="noStrike" cap="none" normalizeH="0" baseline="0" dirty="0">
                 <a:ln>
                   <a:noFill/>
                 </a:ln>
@@ -38332,7 +37249,7 @@
             <a:effectLst/>
             <a:extLst>
               <a:ext uri="{AF507438-7753-43e0-B8FC-AC1667EBCBE1}">
-                <a14:hiddenEffects xmlns="" xmlns:a14="http://schemas.microsoft.com/office/drawing/2010/main">
+                <a14:hiddenEffects xmlns:a14="http://schemas.microsoft.com/office/drawing/2010/main" xmlns="">
                   <a:effectLst>
                     <a:outerShdw blurRad="63500" dist="38099" dir="2700000" algn="ctr" rotWithShape="0">
                       <a:schemeClr val="bg2">
@@ -38368,7 +37285,7 @@
                 <a:buNone/>
                 <a:tabLst/>
               </a:pPr>
-              <a:endParaRPr kumimoji="0" lang="en-GB" sz="2000" b="0" i="0" u="none" strike="noStrike" cap="none" normalizeH="0" baseline="0">
+              <a:endParaRPr kumimoji="0" lang="en-GB" sz="2000" b="0" i="0" u="none" strike="noStrike" cap="none" normalizeH="0" baseline="0" dirty="0">
                 <a:ln>
                   <a:noFill/>
                 </a:ln>
@@ -38685,7 +37602,7 @@
           <a:p>
             <a:pPr algn="ctr"/>
             <a:r>
-              <a:rPr lang="en-GB" sz="1400" dirty="0" err="1">
+              <a:rPr lang="en-GB" sz="1400" dirty="0">
                 <a:solidFill>
                   <a:srgbClr val="000000"/>
                 </a:solidFill>
@@ -38693,18 +37610,7 @@
                 <a:ea typeface="ＭＳ Ｐゴシック" charset="0"/>
                 <a:cs typeface="Courier New" panose="02070309020205020404" pitchFamily="49" charset="0"/>
               </a:rPr>
-              <a:t>int</a:t>
-            </a:r>
-            <a:r>
-              <a:rPr lang="en-GB" sz="1400" dirty="0">
-                <a:solidFill>
-                  <a:srgbClr val="000000"/>
-                </a:solidFill>
-                <a:latin typeface="Courier New" panose="02070309020205020404" pitchFamily="49" charset="0"/>
-                <a:ea typeface="ＭＳ Ｐゴシック" charset="0"/>
-                <a:cs typeface="Courier New" panose="02070309020205020404" pitchFamily="49" charset="0"/>
-              </a:rPr>
-              <a:t> array[3] = {1,3,5};</a:t>
+              <a:t>int array[3] = {1,3,5};</a:t>
             </a:r>
           </a:p>
           <a:p>
@@ -38736,7 +37642,7 @@
           <a:p>
             <a:pPr algn="ctr"/>
             <a:r>
-              <a:rPr lang="en-GB" sz="1400" dirty="0" err="1" smtClean="0">
+              <a:rPr lang="en-GB" sz="1400" dirty="0" smtClean="0">
                 <a:solidFill>
                   <a:srgbClr val="000000"/>
                 </a:solidFill>
@@ -38744,18 +37650,7 @@
                 <a:ea typeface="ＭＳ Ｐゴシック" charset="0"/>
                 <a:cs typeface="Courier New" panose="02070309020205020404" pitchFamily="49" charset="0"/>
               </a:rPr>
-              <a:t>int</a:t>
-            </a:r>
-            <a:r>
-              <a:rPr lang="en-GB" sz="1400" dirty="0" smtClean="0">
-                <a:solidFill>
-                  <a:srgbClr val="000000"/>
-                </a:solidFill>
-                <a:latin typeface="Courier New" panose="02070309020205020404" pitchFamily="49" charset="0"/>
-                <a:ea typeface="ＭＳ Ｐゴシック" charset="0"/>
-                <a:cs typeface="Courier New" panose="02070309020205020404" pitchFamily="49" charset="0"/>
-              </a:rPr>
-              <a:t> identity[3][3] </a:t>
+              <a:t>int identity[3][3] </a:t>
             </a:r>
             <a:r>
               <a:rPr lang="en-GB" sz="1400" dirty="0">
@@ -38882,7 +37777,7 @@
           <a:p>
             <a:pPr algn="ctr"/>
             <a:r>
-              <a:rPr lang="en-GB" sz="1400" dirty="0" err="1">
+              <a:rPr lang="en-GB" sz="1400" dirty="0">
                 <a:solidFill>
                   <a:srgbClr val="000000"/>
                 </a:solidFill>
@@ -38890,18 +37785,7 @@
                 <a:ea typeface="ＭＳ Ｐゴシック" charset="0"/>
                 <a:cs typeface="Courier New" panose="02070309020205020404" pitchFamily="49" charset="0"/>
               </a:rPr>
-              <a:t>int</a:t>
-            </a:r>
-            <a:r>
-              <a:rPr lang="en-GB" sz="1400" dirty="0">
-                <a:solidFill>
-                  <a:srgbClr val="000000"/>
-                </a:solidFill>
-                <a:latin typeface="Courier New" panose="02070309020205020404" pitchFamily="49" charset="0"/>
-                <a:ea typeface="ＭＳ Ｐゴシック" charset="0"/>
-                <a:cs typeface="Courier New" panose="02070309020205020404" pitchFamily="49" charset="0"/>
-              </a:rPr>
-              <a:t> </a:t>
+              <a:t>int </a:t>
             </a:r>
             <a:r>
               <a:rPr lang="en-GB" sz="1400" dirty="0" smtClean="0">
@@ -39192,24 +38076,14 @@
           <a:p>
             <a:pPr algn="ctr"/>
             <a:r>
-              <a:rPr lang="en-GB" sz="1400" dirty="0" err="1" smtClean="0">
+              <a:rPr lang="en-GB" sz="1400" dirty="0" smtClean="0">
                 <a:solidFill>
                   <a:srgbClr val="000000"/>
                 </a:solidFill>
                 <a:latin typeface="Courier New" panose="02070309020205020404" pitchFamily="49" charset="0"/>
                 <a:cs typeface="Courier New" panose="02070309020205020404" pitchFamily="49" charset="0"/>
               </a:rPr>
-              <a:t>int</a:t>
-            </a:r>
-            <a:r>
-              <a:rPr lang="en-GB" sz="1400" dirty="0" smtClean="0">
-                <a:solidFill>
-                  <a:srgbClr val="000000"/>
-                </a:solidFill>
-                <a:latin typeface="Courier New" panose="02070309020205020404" pitchFamily="49" charset="0"/>
-                <a:cs typeface="Courier New" panose="02070309020205020404" pitchFamily="49" charset="0"/>
-              </a:rPr>
-              <a:t> rand(void);</a:t>
+              <a:t>int rand(void);</a:t>
             </a:r>
           </a:p>
           <a:p>
@@ -39237,7 +38111,7 @@
               <a:t>hich is included in </a:t>
             </a:r>
             <a:r>
-              <a:rPr lang="en-GB" sz="1400" dirty="0" err="1" smtClean="0">
+              <a:rPr lang="en-GB" sz="1400" dirty="0" smtClean="0">
                 <a:solidFill>
                   <a:srgbClr val="000000"/>
                 </a:solidFill>
@@ -39246,13 +38120,6 @@
               </a:rPr>
               <a:t>stdlib.h</a:t>
             </a:r>
-            <a:endParaRPr lang="en-GB" sz="1400" dirty="0" smtClean="0">
-              <a:solidFill>
-                <a:srgbClr val="000000"/>
-              </a:solidFill>
-              <a:latin typeface="Courier New" panose="02070309020205020404" pitchFamily="49" charset="0"/>
-              <a:cs typeface="Courier New" panose="02070309020205020404" pitchFamily="49" charset="0"/>
-            </a:endParaRPr>
           </a:p>
         </p:txBody>
       </p:sp>
@@ -40391,7 +39258,7 @@
         <a:effectLst/>
         <a:extLst>
           <a:ext uri="{AF507438-7753-43e0-B8FC-AC1667EBCBE1}">
-            <a14:hiddenEffects xmlns="" xmlns:a14="http://schemas.microsoft.com/office/drawing/2010/main">
+            <a14:hiddenEffects xmlns:a14="http://schemas.microsoft.com/office/drawing/2010/main" xmlns="">
               <a:effectLst>
                 <a:outerShdw blurRad="63500" dist="38099" dir="2700000" algn="ctr" rotWithShape="0">
                   <a:schemeClr val="bg2">
@@ -40467,7 +39334,7 @@
         <a:effectLst/>
         <a:extLst>
           <a:ext uri="{AF507438-7753-43e0-B8FC-AC1667EBCBE1}">
-            <a14:hiddenEffects xmlns="" xmlns:a14="http://schemas.microsoft.com/office/drawing/2010/main">
+            <a14:hiddenEffects xmlns:a14="http://schemas.microsoft.com/office/drawing/2010/main" xmlns="">
               <a:effectLst>
                 <a:outerShdw blurRad="63500" dist="38099" dir="2700000" algn="ctr" rotWithShape="0">
                   <a:schemeClr val="bg2">
@@ -41530,12 +40397,12 @@
 </file>
 
 <file path=customXml/item1.xml><?xml version="1.0" encoding="utf-8"?>
-<?mso-contentType ?>
-<FormTemplates xmlns="http://schemas.microsoft.com/sharepoint/v3/contenttype/forms">
-  <Display>DocumentLibraryForm</Display>
-  <Edit>DocumentLibraryForm</Edit>
-  <New>DocumentLibraryForm</New>
-</FormTemplates>
+<p:properties xmlns:p="http://schemas.microsoft.com/office/2006/metadata/properties" xmlns:xsi="http://www.w3.org/2001/XMLSchema-instance" xmlns:pc="http://schemas.microsoft.com/office/infopath/2007/PartnerControls">
+  <documentManagement>
+    <PublishingExpirationDate xmlns="http://schemas.microsoft.com/sharepoint/v3" xsi:nil="true"/>
+    <PublishingStartDate xmlns="http://schemas.microsoft.com/sharepoint/v3" xsi:nil="true"/>
+  </documentManagement>
+</p:properties>
 </file>
 
 <file path=customXml/item2.xml><?xml version="1.0" encoding="utf-8"?>
@@ -41671,18 +40538,26 @@
 </file>
 
 <file path=customXml/item3.xml><?xml version="1.0" encoding="utf-8"?>
-<p:properties xmlns:p="http://schemas.microsoft.com/office/2006/metadata/properties" xmlns:xsi="http://www.w3.org/2001/XMLSchema-instance" xmlns:pc="http://schemas.microsoft.com/office/infopath/2007/PartnerControls">
-  <documentManagement>
-    <PublishingExpirationDate xmlns="http://schemas.microsoft.com/sharepoint/v3" xsi:nil="true"/>
-    <PublishingStartDate xmlns="http://schemas.microsoft.com/sharepoint/v3" xsi:nil="true"/>
-  </documentManagement>
-</p:properties>
+<?mso-contentType ?>
+<FormTemplates xmlns="http://schemas.microsoft.com/sharepoint/v3/contenttype/forms">
+  <Display>DocumentLibraryForm</Display>
+  <Edit>DocumentLibraryForm</Edit>
+  <New>DocumentLibraryForm</New>
+</FormTemplates>
 </file>
 
 <file path=customXml/itemProps1.xml><?xml version="1.0" encoding="utf-8"?>
-<ds:datastoreItem xmlns:ds="http://schemas.openxmlformats.org/officeDocument/2006/customXml" ds:itemID="{2E0637EC-CEA5-409F-B139-003005A14145}">
+<ds:datastoreItem xmlns:ds="http://schemas.openxmlformats.org/officeDocument/2006/customXml" ds:itemID="{D83787E9-855B-43BD-8382-B7C63B9BC33D}">
   <ds:schemaRefs>
-    <ds:schemaRef ds:uri="http://schemas.microsoft.com/sharepoint/v3/contenttype/forms"/>
+    <ds:schemaRef ds:uri="http://schemas.openxmlformats.org/package/2006/metadata/core-properties"/>
+    <ds:schemaRef ds:uri="http://purl.org/dc/elements/1.1/"/>
+    <ds:schemaRef ds:uri="http://schemas.microsoft.com/office/infopath/2007/PartnerControls"/>
+    <ds:schemaRef ds:uri="http://schemas.microsoft.com/office/2006/metadata/properties"/>
+    <ds:schemaRef ds:uri="http://purl.org/dc/terms/"/>
+    <ds:schemaRef ds:uri="http://schemas.microsoft.com/sharepoint/v3"/>
+    <ds:schemaRef ds:uri="http://schemas.microsoft.com/office/2006/documentManagement/types"/>
+    <ds:schemaRef ds:uri="http://www.w3.org/XML/1998/namespace"/>
+    <ds:schemaRef ds:uri="http://purl.org/dc/dcmitype/"/>
   </ds:schemaRefs>
 </ds:datastoreItem>
 </file>
@@ -41706,17 +40581,9 @@
 </file>
 
 <file path=customXml/itemProps3.xml><?xml version="1.0" encoding="utf-8"?>
-<ds:datastoreItem xmlns:ds="http://schemas.openxmlformats.org/officeDocument/2006/customXml" ds:itemID="{D83787E9-855B-43BD-8382-B7C63B9BC33D}">
+<ds:datastoreItem xmlns:ds="http://schemas.openxmlformats.org/officeDocument/2006/customXml" ds:itemID="{2E0637EC-CEA5-409F-B139-003005A14145}">
   <ds:schemaRefs>
-    <ds:schemaRef ds:uri="http://schemas.microsoft.com/sharepoint/v3"/>
-    <ds:schemaRef ds:uri="http://purl.org/dc/terms/"/>
-    <ds:schemaRef ds:uri="http://schemas.openxmlformats.org/package/2006/metadata/core-properties"/>
-    <ds:schemaRef ds:uri="http://schemas.microsoft.com/office/2006/documentManagement/types"/>
-    <ds:schemaRef ds:uri="http://schemas.microsoft.com/office/infopath/2007/PartnerControls"/>
-    <ds:schemaRef ds:uri="http://purl.org/dc/elements/1.1/"/>
-    <ds:schemaRef ds:uri="http://schemas.microsoft.com/office/2006/metadata/properties"/>
-    <ds:schemaRef ds:uri="http://www.w3.org/XML/1998/namespace"/>
-    <ds:schemaRef ds:uri="http://purl.org/dc/dcmitype/"/>
+    <ds:schemaRef ds:uri="http://schemas.microsoft.com/sharepoint/v3/contenttype/forms"/>
   </ds:schemaRefs>
 </ds:datastoreItem>
 </file>
</xml_diff>